<commit_message>
update notes - add pry to slides
</commit_message>
<xml_diff>
--- a/HT-debugging-basics.pptx
+++ b/HT-debugging-basics.pptx
@@ -5,18 +5,25 @@
     <p:sldMasterId id="2147483660" r:id="rId1"/>
   </p:sldMasterIdLst>
   <p:notesMasterIdLst>
-    <p:notesMasterId r:id="rId8"/>
+    <p:notesMasterId r:id="rId15"/>
   </p:notesMasterIdLst>
   <p:handoutMasterIdLst>
-    <p:handoutMasterId r:id="rId9"/>
+    <p:handoutMasterId r:id="rId16"/>
   </p:handoutMasterIdLst>
   <p:sldIdLst>
     <p:sldId id="256" r:id="rId2"/>
     <p:sldId id="257" r:id="rId3"/>
-    <p:sldId id="342" r:id="rId4"/>
-    <p:sldId id="344" r:id="rId5"/>
-    <p:sldId id="343" r:id="rId6"/>
-    <p:sldId id="341" r:id="rId7"/>
+    <p:sldId id="346" r:id="rId4"/>
+    <p:sldId id="351" r:id="rId5"/>
+    <p:sldId id="347" r:id="rId6"/>
+    <p:sldId id="348" r:id="rId7"/>
+    <p:sldId id="345" r:id="rId8"/>
+    <p:sldId id="349" r:id="rId9"/>
+    <p:sldId id="350" r:id="rId10"/>
+    <p:sldId id="342" r:id="rId11"/>
+    <p:sldId id="344" r:id="rId12"/>
+    <p:sldId id="343" r:id="rId13"/>
+    <p:sldId id="341" r:id="rId14"/>
   </p:sldIdLst>
   <p:sldSz cx="9144000" cy="6858000" type="screen4x3"/>
   <p:notesSz cx="6858000" cy="9144000"/>
@@ -2219,6 +2226,558 @@
 </p:sld>
 </file>
 
+<file path=ppt/slides/slide10.xml><?xml version="1.0" encoding="utf-8"?>
+<p:sld xmlns:a="http://schemas.openxmlformats.org/drawingml/2006/main" xmlns:r="http://schemas.openxmlformats.org/officeDocument/2006/relationships" xmlns:p="http://schemas.openxmlformats.org/presentationml/2006/main">
+  <p:cSld>
+    <p:spTree>
+      <p:nvGrpSpPr>
+        <p:cNvPr id="1" name=""/>
+        <p:cNvGrpSpPr/>
+        <p:nvPr/>
+      </p:nvGrpSpPr>
+      <p:grpSpPr>
+        <a:xfrm>
+          <a:off x="0" y="0"/>
+          <a:ext cx="0" cy="0"/>
+          <a:chOff x="0" y="0"/>
+          <a:chExt cx="0" cy="0"/>
+        </a:xfrm>
+      </p:grpSpPr>
+      <p:sp>
+        <p:nvSpPr>
+          <p:cNvPr id="2" name="Title 1"/>
+          <p:cNvSpPr>
+            <a:spLocks noGrp="1"/>
+          </p:cNvSpPr>
+          <p:nvPr>
+            <p:ph type="title"/>
+          </p:nvPr>
+        </p:nvSpPr>
+        <p:spPr/>
+        <p:txBody>
+          <a:bodyPr/>
+          <a:lstStyle/>
+          <a:p>
+            <a:r>
+              <a:rPr lang="en-US" sz="4400" b="1" kern="1200" dirty="0" smtClean="0">
+                <a:solidFill>
+                  <a:schemeClr val="accent1"/>
+                </a:solidFill>
+                <a:effectLst/>
+                <a:latin typeface="+mj-lt"/>
+                <a:ea typeface="+mj-ea"/>
+                <a:cs typeface="+mj-cs"/>
+              </a:rPr>
+              <a:t>Raise an Error</a:t>
+            </a:r>
+            <a:endParaRPr lang="en-US" dirty="0"/>
+          </a:p>
+        </p:txBody>
+      </p:sp>
+      <p:sp>
+        <p:nvSpPr>
+          <p:cNvPr id="4" name="Footer Placeholder 3"/>
+          <p:cNvSpPr>
+            <a:spLocks noGrp="1"/>
+          </p:cNvSpPr>
+          <p:nvPr>
+            <p:ph type="ftr" sz="quarter" idx="3"/>
+          </p:nvPr>
+        </p:nvSpPr>
+        <p:spPr/>
+        <p:txBody>
+          <a:bodyPr/>
+          <a:lstStyle/>
+          <a:p>
+            <a:r>
+              <a:rPr lang="en-US" dirty="0" smtClean="0"/>
+              <a:t>HT- Debugging</a:t>
+            </a:r>
+            <a:endParaRPr lang="en-US" dirty="0"/>
+          </a:p>
+        </p:txBody>
+      </p:sp>
+      <p:sp>
+        <p:nvSpPr>
+          <p:cNvPr id="7" name="TextBox 6"/>
+          <p:cNvSpPr txBox="1"/>
+          <p:nvPr/>
+        </p:nvSpPr>
+        <p:spPr>
+          <a:xfrm>
+            <a:off x="259762" y="1822592"/>
+            <a:ext cx="8741663" cy="1077218"/>
+          </a:xfrm>
+          <a:prstGeom prst="rect">
+            <a:avLst/>
+          </a:prstGeom>
+          <a:noFill/>
+        </p:spPr>
+        <p:txBody>
+          <a:bodyPr wrap="square" rtlCol="0">
+            <a:spAutoFit/>
+          </a:bodyPr>
+          <a:lstStyle/>
+          <a:p>
+            <a:r>
+              <a:rPr lang="en-US" sz="3200" dirty="0" smtClean="0"/>
+              <a:t>Careful:</a:t>
+            </a:r>
+          </a:p>
+          <a:p>
+            <a:r>
+              <a:rPr lang="en-US" sz="3200" dirty="0" smtClean="0"/>
+              <a:t>Rescue isn’t the bug free savior you might think</a:t>
+            </a:r>
+            <a:endParaRPr lang="en-US" sz="3200" dirty="0"/>
+          </a:p>
+        </p:txBody>
+      </p:sp>
+    </p:spTree>
+    <p:extLst>
+      <p:ext uri="{BB962C8B-B14F-4D97-AF65-F5344CB8AC3E}">
+        <p14:creationId xmlns:p14="http://schemas.microsoft.com/office/powerpoint/2010/main" val="650808683"/>
+      </p:ext>
+    </p:extLst>
+  </p:cSld>
+  <p:clrMapOvr>
+    <a:masterClrMapping/>
+  </p:clrMapOvr>
+  <p:timing>
+    <p:tnLst>
+      <p:par>
+        <p:cTn xmlns:p14="http://schemas.microsoft.com/office/powerpoint/2010/main" id="1" dur="indefinite" restart="never" nodeType="tmRoot"/>
+      </p:par>
+    </p:tnLst>
+  </p:timing>
+</p:sld>
+</file>
+
+<file path=ppt/slides/slide11.xml><?xml version="1.0" encoding="utf-8"?>
+<p:sld xmlns:a="http://schemas.openxmlformats.org/drawingml/2006/main" xmlns:r="http://schemas.openxmlformats.org/officeDocument/2006/relationships" xmlns:p="http://schemas.openxmlformats.org/presentationml/2006/main">
+  <p:cSld>
+    <p:spTree>
+      <p:nvGrpSpPr>
+        <p:cNvPr id="1" name=""/>
+        <p:cNvGrpSpPr/>
+        <p:nvPr/>
+      </p:nvGrpSpPr>
+      <p:grpSpPr>
+        <a:xfrm>
+          <a:off x="0" y="0"/>
+          <a:ext cx="0" cy="0"/>
+          <a:chOff x="0" y="0"/>
+          <a:chExt cx="0" cy="0"/>
+        </a:xfrm>
+      </p:grpSpPr>
+      <p:sp>
+        <p:nvSpPr>
+          <p:cNvPr id="2" name="Title 1"/>
+          <p:cNvSpPr>
+            <a:spLocks noGrp="1"/>
+          </p:cNvSpPr>
+          <p:nvPr>
+            <p:ph type="title"/>
+          </p:nvPr>
+        </p:nvSpPr>
+        <p:spPr/>
+        <p:txBody>
+          <a:bodyPr/>
+          <a:lstStyle/>
+          <a:p>
+            <a:r>
+              <a:rPr lang="en-US" sz="4400" b="1" kern="1200" dirty="0" smtClean="0">
+                <a:solidFill>
+                  <a:schemeClr val="accent1"/>
+                </a:solidFill>
+                <a:effectLst/>
+                <a:latin typeface="+mj-lt"/>
+                <a:ea typeface="+mj-ea"/>
+                <a:cs typeface="+mj-cs"/>
+              </a:rPr>
+              <a:t>Rescue</a:t>
+            </a:r>
+            <a:endParaRPr lang="en-US" dirty="0"/>
+          </a:p>
+        </p:txBody>
+      </p:sp>
+      <p:sp>
+        <p:nvSpPr>
+          <p:cNvPr id="4" name="Footer Placeholder 3"/>
+          <p:cNvSpPr>
+            <a:spLocks noGrp="1"/>
+          </p:cNvSpPr>
+          <p:nvPr>
+            <p:ph type="ftr" sz="quarter" idx="3"/>
+          </p:nvPr>
+        </p:nvSpPr>
+        <p:spPr/>
+        <p:txBody>
+          <a:bodyPr/>
+          <a:lstStyle/>
+          <a:p>
+            <a:r>
+              <a:rPr lang="en-US" dirty="0" smtClean="0"/>
+              <a:t>HT- Debugging</a:t>
+            </a:r>
+            <a:endParaRPr lang="en-US" dirty="0"/>
+          </a:p>
+        </p:txBody>
+      </p:sp>
+      <p:sp>
+        <p:nvSpPr>
+          <p:cNvPr id="7" name="TextBox 6"/>
+          <p:cNvSpPr txBox="1"/>
+          <p:nvPr/>
+        </p:nvSpPr>
+        <p:spPr>
+          <a:xfrm>
+            <a:off x="259762" y="1822592"/>
+            <a:ext cx="8741663" cy="1077218"/>
+          </a:xfrm>
+          <a:prstGeom prst="rect">
+            <a:avLst/>
+          </a:prstGeom>
+          <a:noFill/>
+        </p:spPr>
+        <p:txBody>
+          <a:bodyPr wrap="square" rtlCol="0">
+            <a:spAutoFit/>
+          </a:bodyPr>
+          <a:lstStyle/>
+          <a:p>
+            <a:r>
+              <a:rPr lang="en-US" sz="3200" dirty="0" smtClean="0"/>
+              <a:t>Careful:</a:t>
+            </a:r>
+          </a:p>
+          <a:p>
+            <a:r>
+              <a:rPr lang="en-US" sz="3200" dirty="0" smtClean="0"/>
+              <a:t>Rescue isn’t the bug free savior you might think</a:t>
+            </a:r>
+            <a:endParaRPr lang="en-US" sz="3200" dirty="0"/>
+          </a:p>
+        </p:txBody>
+      </p:sp>
+    </p:spTree>
+    <p:extLst>
+      <p:ext uri="{BB962C8B-B14F-4D97-AF65-F5344CB8AC3E}">
+        <p14:creationId xmlns:p14="http://schemas.microsoft.com/office/powerpoint/2010/main" val="3627005062"/>
+      </p:ext>
+    </p:extLst>
+  </p:cSld>
+  <p:clrMapOvr>
+    <a:masterClrMapping/>
+  </p:clrMapOvr>
+  <p:timing>
+    <p:tnLst>
+      <p:par>
+        <p:cTn xmlns:p14="http://schemas.microsoft.com/office/powerpoint/2010/main" id="1" dur="indefinite" restart="never" nodeType="tmRoot"/>
+      </p:par>
+    </p:tnLst>
+  </p:timing>
+</p:sld>
+</file>
+
+<file path=ppt/slides/slide12.xml><?xml version="1.0" encoding="utf-8"?>
+<p:sld xmlns:a="http://schemas.openxmlformats.org/drawingml/2006/main" xmlns:r="http://schemas.openxmlformats.org/officeDocument/2006/relationships" xmlns:p="http://schemas.openxmlformats.org/presentationml/2006/main">
+  <p:cSld>
+    <p:spTree>
+      <p:nvGrpSpPr>
+        <p:cNvPr id="1" name=""/>
+        <p:cNvGrpSpPr/>
+        <p:nvPr/>
+      </p:nvGrpSpPr>
+      <p:grpSpPr>
+        <a:xfrm>
+          <a:off x="0" y="0"/>
+          <a:ext cx="0" cy="0"/>
+          <a:chOff x="0" y="0"/>
+          <a:chExt cx="0" cy="0"/>
+        </a:xfrm>
+      </p:grpSpPr>
+      <p:sp>
+        <p:nvSpPr>
+          <p:cNvPr id="2" name="Title 1"/>
+          <p:cNvSpPr>
+            <a:spLocks noGrp="1"/>
+          </p:cNvSpPr>
+          <p:nvPr>
+            <p:ph type="title"/>
+          </p:nvPr>
+        </p:nvSpPr>
+        <p:spPr/>
+        <p:txBody>
+          <a:bodyPr/>
+          <a:lstStyle/>
+          <a:p>
+            <a:r>
+              <a:rPr lang="en-US" sz="4400" b="1" kern="1200" dirty="0" smtClean="0">
+                <a:solidFill>
+                  <a:schemeClr val="accent1"/>
+                </a:solidFill>
+                <a:effectLst/>
+                <a:latin typeface="+mj-lt"/>
+                <a:ea typeface="+mj-ea"/>
+                <a:cs typeface="+mj-cs"/>
+              </a:rPr>
+              <a:t>Rescue to the Rescue?</a:t>
+            </a:r>
+            <a:endParaRPr lang="en-US" dirty="0"/>
+          </a:p>
+        </p:txBody>
+      </p:sp>
+      <p:sp>
+        <p:nvSpPr>
+          <p:cNvPr id="4" name="Footer Placeholder 3"/>
+          <p:cNvSpPr>
+            <a:spLocks noGrp="1"/>
+          </p:cNvSpPr>
+          <p:nvPr>
+            <p:ph type="ftr" sz="quarter" idx="3"/>
+          </p:nvPr>
+        </p:nvSpPr>
+        <p:spPr/>
+        <p:txBody>
+          <a:bodyPr/>
+          <a:lstStyle/>
+          <a:p>
+            <a:r>
+              <a:rPr lang="en-US" dirty="0" smtClean="0"/>
+              <a:t>HT- Debugging</a:t>
+            </a:r>
+            <a:endParaRPr lang="en-US" dirty="0"/>
+          </a:p>
+        </p:txBody>
+      </p:sp>
+      <p:sp>
+        <p:nvSpPr>
+          <p:cNvPr id="7" name="TextBox 6"/>
+          <p:cNvSpPr txBox="1"/>
+          <p:nvPr/>
+        </p:nvSpPr>
+        <p:spPr>
+          <a:xfrm>
+            <a:off x="259762" y="1822592"/>
+            <a:ext cx="8741663" cy="1077218"/>
+          </a:xfrm>
+          <a:prstGeom prst="rect">
+            <a:avLst/>
+          </a:prstGeom>
+          <a:noFill/>
+        </p:spPr>
+        <p:txBody>
+          <a:bodyPr wrap="square" rtlCol="0">
+            <a:spAutoFit/>
+          </a:bodyPr>
+          <a:lstStyle/>
+          <a:p>
+            <a:r>
+              <a:rPr lang="en-US" sz="3200" dirty="0" smtClean="0"/>
+              <a:t>Careful:</a:t>
+            </a:r>
+          </a:p>
+          <a:p>
+            <a:r>
+              <a:rPr lang="en-US" sz="3200" dirty="0" smtClean="0"/>
+              <a:t>Rescue isn’t the bug free savior you might think</a:t>
+            </a:r>
+            <a:endParaRPr lang="en-US" sz="3200" dirty="0"/>
+          </a:p>
+        </p:txBody>
+      </p:sp>
+      <p:sp>
+        <p:nvSpPr>
+          <p:cNvPr id="3" name="Rectangle 2"/>
+          <p:cNvSpPr/>
+          <p:nvPr/>
+        </p:nvSpPr>
+        <p:spPr>
+          <a:xfrm>
+            <a:off x="1962650" y="4184787"/>
+            <a:ext cx="6061124" cy="369332"/>
+          </a:xfrm>
+          <a:prstGeom prst="rect">
+            <a:avLst/>
+          </a:prstGeom>
+        </p:spPr>
+        <p:txBody>
+          <a:bodyPr wrap="square">
+            <a:spAutoFit/>
+          </a:bodyPr>
+          <a:lstStyle/>
+          <a:p>
+            <a:r>
+              <a:rPr lang="en-US" dirty="0" smtClean="0">
+                <a:solidFill>
+                  <a:srgbClr val="0000FF"/>
+                </a:solidFill>
+                <a:hlinkClick r:id="rId2"/>
+              </a:rPr>
+              <a:t>Why You Should Never Rescue Exception in Ruby</a:t>
+            </a:r>
+            <a:endParaRPr lang="en-US" dirty="0">
+              <a:solidFill>
+                <a:srgbClr val="0000FF"/>
+              </a:solidFill>
+            </a:endParaRPr>
+          </a:p>
+        </p:txBody>
+      </p:sp>
+    </p:spTree>
+    <p:extLst>
+      <p:ext uri="{BB962C8B-B14F-4D97-AF65-F5344CB8AC3E}">
+        <p14:creationId xmlns:p14="http://schemas.microsoft.com/office/powerpoint/2010/main" val="44699507"/>
+      </p:ext>
+    </p:extLst>
+  </p:cSld>
+  <p:clrMapOvr>
+    <a:masterClrMapping/>
+  </p:clrMapOvr>
+  <p:timing>
+    <p:tnLst>
+      <p:par>
+        <p:cTn xmlns:p14="http://schemas.microsoft.com/office/powerpoint/2010/main" id="1" dur="indefinite" restart="never" nodeType="tmRoot"/>
+      </p:par>
+    </p:tnLst>
+  </p:timing>
+</p:sld>
+</file>
+
+<file path=ppt/slides/slide13.xml><?xml version="1.0" encoding="utf-8"?>
+<p:sld xmlns:a="http://schemas.openxmlformats.org/drawingml/2006/main" xmlns:r="http://schemas.openxmlformats.org/officeDocument/2006/relationships" xmlns:p="http://schemas.openxmlformats.org/presentationml/2006/main">
+  <p:cSld>
+    <p:spTree>
+      <p:nvGrpSpPr>
+        <p:cNvPr id="1" name=""/>
+        <p:cNvGrpSpPr/>
+        <p:nvPr/>
+      </p:nvGrpSpPr>
+      <p:grpSpPr>
+        <a:xfrm>
+          <a:off x="0" y="0"/>
+          <a:ext cx="0" cy="0"/>
+          <a:chOff x="0" y="0"/>
+          <a:chExt cx="0" cy="0"/>
+        </a:xfrm>
+      </p:grpSpPr>
+      <p:sp>
+        <p:nvSpPr>
+          <p:cNvPr id="2" name="Title 1"/>
+          <p:cNvSpPr>
+            <a:spLocks noGrp="1"/>
+          </p:cNvSpPr>
+          <p:nvPr>
+            <p:ph type="title"/>
+          </p:nvPr>
+        </p:nvSpPr>
+        <p:spPr/>
+        <p:txBody>
+          <a:bodyPr/>
+          <a:lstStyle/>
+          <a:p>
+            <a:r>
+              <a:rPr lang="en-US" sz="4400" b="1" kern="1200" dirty="0" smtClean="0">
+                <a:solidFill>
+                  <a:schemeClr val="accent1"/>
+                </a:solidFill>
+                <a:effectLst/>
+                <a:latin typeface="+mj-lt"/>
+                <a:ea typeface="+mj-ea"/>
+                <a:cs typeface="+mj-cs"/>
+              </a:rPr>
+              <a:t>Debugging </a:t>
+            </a:r>
+            <a:r>
+              <a:rPr lang="en-US" sz="4400" b="1" kern="1200" dirty="0" err="1" smtClean="0">
+                <a:solidFill>
+                  <a:schemeClr val="accent1"/>
+                </a:solidFill>
+                <a:effectLst/>
+                <a:latin typeface="+mj-lt"/>
+                <a:ea typeface="+mj-ea"/>
+                <a:cs typeface="+mj-cs"/>
+              </a:rPr>
+              <a:t>Wrapup</a:t>
+            </a:r>
+            <a:endParaRPr lang="en-US" dirty="0"/>
+          </a:p>
+        </p:txBody>
+      </p:sp>
+      <p:sp>
+        <p:nvSpPr>
+          <p:cNvPr id="4" name="Footer Placeholder 3"/>
+          <p:cNvSpPr>
+            <a:spLocks noGrp="1"/>
+          </p:cNvSpPr>
+          <p:nvPr>
+            <p:ph type="ftr" sz="quarter" idx="3"/>
+          </p:nvPr>
+        </p:nvSpPr>
+        <p:spPr/>
+        <p:txBody>
+          <a:bodyPr/>
+          <a:lstStyle/>
+          <a:p>
+            <a:r>
+              <a:rPr lang="en-US" dirty="0" smtClean="0"/>
+              <a:t>HT- Debugging</a:t>
+            </a:r>
+            <a:endParaRPr lang="en-US" dirty="0"/>
+          </a:p>
+        </p:txBody>
+      </p:sp>
+      <p:sp>
+        <p:nvSpPr>
+          <p:cNvPr id="7" name="TextBox 6"/>
+          <p:cNvSpPr txBox="1"/>
+          <p:nvPr/>
+        </p:nvSpPr>
+        <p:spPr>
+          <a:xfrm>
+            <a:off x="3296550" y="2996474"/>
+            <a:ext cx="2986214" cy="830997"/>
+          </a:xfrm>
+          <a:prstGeom prst="rect">
+            <a:avLst/>
+          </a:prstGeom>
+          <a:noFill/>
+        </p:spPr>
+        <p:txBody>
+          <a:bodyPr wrap="none" rtlCol="0">
+            <a:spAutoFit/>
+          </a:bodyPr>
+          <a:lstStyle/>
+          <a:p>
+            <a:r>
+              <a:rPr lang="en-US" sz="4800" dirty="0" smtClean="0"/>
+              <a:t>Questions?</a:t>
+            </a:r>
+            <a:endParaRPr lang="en-US" sz="4800" dirty="0"/>
+          </a:p>
+        </p:txBody>
+      </p:sp>
+    </p:spTree>
+    <p:extLst>
+      <p:ext uri="{BB962C8B-B14F-4D97-AF65-F5344CB8AC3E}">
+        <p14:creationId xmlns:p14="http://schemas.microsoft.com/office/powerpoint/2010/main" val="791299107"/>
+      </p:ext>
+    </p:extLst>
+  </p:cSld>
+  <p:clrMapOvr>
+    <a:masterClrMapping/>
+  </p:clrMapOvr>
+  <p:timing>
+    <p:tnLst>
+      <p:par>
+        <p:cTn xmlns:p14="http://schemas.microsoft.com/office/powerpoint/2010/main" id="1" dur="indefinite" restart="never" nodeType="tmRoot"/>
+      </p:par>
+    </p:tnLst>
+  </p:timing>
+</p:sld>
+</file>
+
 <file path=ppt/slides/slide2.xml><?xml version="1.0" encoding="utf-8"?>
 <p:sld xmlns:a="http://schemas.openxmlformats.org/drawingml/2006/main" xmlns:r="http://schemas.openxmlformats.org/officeDocument/2006/relationships" xmlns:p="http://schemas.openxmlformats.org/presentationml/2006/main">
   <p:cSld>
@@ -2388,16 +2947,8 @@
           <a:lstStyle/>
           <a:p>
             <a:r>
-              <a:rPr lang="en-US" sz="4400" b="1" kern="1200" dirty="0" smtClean="0">
-                <a:solidFill>
-                  <a:schemeClr val="accent1"/>
-                </a:solidFill>
-                <a:effectLst/>
-                <a:latin typeface="+mj-lt"/>
-                <a:ea typeface="+mj-ea"/>
-                <a:cs typeface="+mj-cs"/>
-              </a:rPr>
-              <a:t>Raise an Error</a:t>
+              <a:rPr lang="en-US" dirty="0" smtClean="0"/>
+              <a:t>History</a:t>
             </a:r>
             <a:endParaRPr lang="en-US" dirty="0"/>
           </a:p>
@@ -2426,46 +2977,34 @@
           </a:p>
         </p:txBody>
       </p:sp>
-      <p:sp>
-        <p:nvSpPr>
-          <p:cNvPr id="7" name="TextBox 6"/>
-          <p:cNvSpPr txBox="1"/>
+      <p:pic>
+        <p:nvPicPr>
+          <p:cNvPr id="5" name="Picture 4"/>
+          <p:cNvPicPr>
+            <a:picLocks noChangeAspect="1"/>
+          </p:cNvPicPr>
           <p:nvPr/>
-        </p:nvSpPr>
+        </p:nvPicPr>
+        <p:blipFill>
+          <a:blip r:embed="rId2"/>
+          <a:stretch>
+            <a:fillRect/>
+          </a:stretch>
+        </p:blipFill>
         <p:spPr>
           <a:xfrm>
-            <a:off x="259762" y="1822592"/>
-            <a:ext cx="8741663" cy="1077218"/>
+            <a:off x="1818337" y="1475760"/>
+            <a:ext cx="5617579" cy="4664293"/>
           </a:xfrm>
           <a:prstGeom prst="rect">
             <a:avLst/>
           </a:prstGeom>
-          <a:noFill/>
         </p:spPr>
-        <p:txBody>
-          <a:bodyPr wrap="square" rtlCol="0">
-            <a:spAutoFit/>
-          </a:bodyPr>
-          <a:lstStyle/>
-          <a:p>
-            <a:r>
-              <a:rPr lang="en-US" sz="3200" dirty="0" smtClean="0"/>
-              <a:t>Careful:</a:t>
-            </a:r>
-          </a:p>
-          <a:p>
-            <a:r>
-              <a:rPr lang="en-US" sz="3200" dirty="0" smtClean="0"/>
-              <a:t>Rescue isn’t the bug free savior you might think</a:t>
-            </a:r>
-            <a:endParaRPr lang="en-US" sz="3200" dirty="0"/>
-          </a:p>
-        </p:txBody>
-      </p:sp>
+      </p:pic>
     </p:spTree>
     <p:extLst>
       <p:ext uri="{BB962C8B-B14F-4D97-AF65-F5344CB8AC3E}">
-        <p14:creationId xmlns:p14="http://schemas.microsoft.com/office/powerpoint/2010/main" val="650808683"/>
+        <p14:creationId xmlns:p14="http://schemas.microsoft.com/office/powerpoint/2010/main" val="4001643536"/>
       </p:ext>
     </p:extLst>
   </p:cSld>
@@ -2515,16 +3054,8 @@
           <a:lstStyle/>
           <a:p>
             <a:r>
-              <a:rPr lang="en-US" sz="4400" b="1" kern="1200" dirty="0" smtClean="0">
-                <a:solidFill>
-                  <a:schemeClr val="accent1"/>
-                </a:solidFill>
-                <a:effectLst/>
-                <a:latin typeface="+mj-lt"/>
-                <a:ea typeface="+mj-ea"/>
-                <a:cs typeface="+mj-cs"/>
-              </a:rPr>
-              <a:t>Rescue</a:t>
+              <a:rPr lang="en-US" dirty="0" smtClean="0"/>
+              <a:t>Error Messages</a:t>
             </a:r>
             <a:endParaRPr lang="en-US" dirty="0"/>
           </a:p>
@@ -2553,46 +3084,40 @@
           </a:p>
         </p:txBody>
       </p:sp>
-      <p:sp>
-        <p:nvSpPr>
-          <p:cNvPr id="7" name="TextBox 6"/>
-          <p:cNvSpPr txBox="1"/>
+      <p:pic>
+        <p:nvPicPr>
+          <p:cNvPr id="3" name="Picture 2" descr="fail.gif"/>
+          <p:cNvPicPr>
+            <a:picLocks noChangeAspect="1"/>
+          </p:cNvPicPr>
           <p:nvPr/>
-        </p:nvSpPr>
+        </p:nvPicPr>
+        <p:blipFill>
+          <a:blip r:embed="rId2">
+            <a:extLst>
+              <a:ext uri="{28A0092B-C50C-407E-A947-70E740481C1C}">
+                <a14:useLocalDpi xmlns:a14="http://schemas.microsoft.com/office/drawing/2010/main" val="0"/>
+              </a:ext>
+            </a:extLst>
+          </a:blip>
+          <a:stretch>
+            <a:fillRect/>
+          </a:stretch>
+        </p:blipFill>
         <p:spPr>
           <a:xfrm>
-            <a:off x="259762" y="1822592"/>
-            <a:ext cx="8741663" cy="1077218"/>
+            <a:off x="1876062" y="1361069"/>
+            <a:ext cx="4892194" cy="4592201"/>
           </a:xfrm>
           <a:prstGeom prst="rect">
             <a:avLst/>
           </a:prstGeom>
-          <a:noFill/>
         </p:spPr>
-        <p:txBody>
-          <a:bodyPr wrap="square" rtlCol="0">
-            <a:spAutoFit/>
-          </a:bodyPr>
-          <a:lstStyle/>
-          <a:p>
-            <a:r>
-              <a:rPr lang="en-US" sz="3200" dirty="0" smtClean="0"/>
-              <a:t>Careful:</a:t>
-            </a:r>
-          </a:p>
-          <a:p>
-            <a:r>
-              <a:rPr lang="en-US" sz="3200" dirty="0" smtClean="0"/>
-              <a:t>Rescue isn’t the bug free savior you might think</a:t>
-            </a:r>
-            <a:endParaRPr lang="en-US" sz="3200" dirty="0"/>
-          </a:p>
-        </p:txBody>
-      </p:sp>
+      </p:pic>
     </p:spTree>
     <p:extLst>
       <p:ext uri="{BB962C8B-B14F-4D97-AF65-F5344CB8AC3E}">
-        <p14:creationId xmlns:p14="http://schemas.microsoft.com/office/powerpoint/2010/main" val="3627005062"/>
+        <p14:creationId xmlns:p14="http://schemas.microsoft.com/office/powerpoint/2010/main" val="648479146"/>
       </p:ext>
     </p:extLst>
   </p:cSld>
@@ -2642,16 +3167,8 @@
           <a:lstStyle/>
           <a:p>
             <a:r>
-              <a:rPr lang="en-US" sz="4400" b="1" kern="1200" dirty="0" smtClean="0">
-                <a:solidFill>
-                  <a:schemeClr val="accent1"/>
-                </a:solidFill>
-                <a:effectLst/>
-                <a:latin typeface="+mj-lt"/>
-                <a:ea typeface="+mj-ea"/>
-                <a:cs typeface="+mj-cs"/>
-              </a:rPr>
-              <a:t>Rescue to the Rescue?</a:t>
+              <a:rPr lang="en-US" dirty="0" smtClean="0"/>
+              <a:t>Error Messages</a:t>
             </a:r>
             <a:endParaRPr lang="en-US" dirty="0"/>
           </a:p>
@@ -2682,14 +3199,14 @@
       </p:sp>
       <p:sp>
         <p:nvSpPr>
-          <p:cNvPr id="7" name="TextBox 6"/>
+          <p:cNvPr id="3" name="TextBox 2"/>
           <p:cNvSpPr txBox="1"/>
           <p:nvPr/>
         </p:nvSpPr>
         <p:spPr>
           <a:xfrm>
-            <a:off x="259762" y="1822592"/>
-            <a:ext cx="8741663" cy="1077218"/>
+            <a:off x="2049237" y="1875939"/>
+            <a:ext cx="4748014" cy="2554545"/>
           </a:xfrm>
           <a:prstGeom prst="rect">
             <a:avLst/>
@@ -2697,67 +3214,41 @@
           <a:noFill/>
         </p:spPr>
         <p:txBody>
-          <a:bodyPr wrap="square" rtlCol="0">
+          <a:bodyPr wrap="none" rtlCol="0">
             <a:spAutoFit/>
           </a:bodyPr>
           <a:lstStyle/>
           <a:p>
             <a:r>
               <a:rPr lang="en-US" sz="3200" dirty="0" smtClean="0"/>
-              <a:t>Careful:</a:t>
-            </a:r>
-          </a:p>
-          <a:p>
+              <a:t>The First rule of debugging:</a:t>
+            </a:r>
+          </a:p>
+          <a:p>
+            <a:endParaRPr lang="en-US" sz="3200" dirty="0" smtClean="0"/>
+          </a:p>
+          <a:p>
+            <a:pPr marL="457200" indent="-457200">
+              <a:buFont typeface="Arial"/>
+              <a:buChar char="•"/>
+            </a:pPr>
             <a:r>
               <a:rPr lang="en-US" sz="3200" dirty="0" smtClean="0"/>
-              <a:t>Rescue isn’t the bug free savior you might think</a:t>
-            </a:r>
+              <a:t>Read the error message!</a:t>
+            </a:r>
+          </a:p>
+          <a:p>
+            <a:endParaRPr lang="en-US" sz="3200" dirty="0" smtClean="0"/>
+          </a:p>
+          <a:p>
             <a:endParaRPr lang="en-US" sz="3200" dirty="0"/>
-          </a:p>
-        </p:txBody>
-      </p:sp>
-      <p:sp>
-        <p:nvSpPr>
-          <p:cNvPr id="3" name="Rectangle 2"/>
-          <p:cNvSpPr/>
-          <p:nvPr/>
-        </p:nvSpPr>
-        <p:spPr>
-          <a:xfrm>
-            <a:off x="1962650" y="4184787"/>
-            <a:ext cx="6061124" cy="369332"/>
-          </a:xfrm>
-          <a:prstGeom prst="rect">
-            <a:avLst/>
-          </a:prstGeom>
-        </p:spPr>
-        <p:txBody>
-          <a:bodyPr wrap="square">
-            <a:spAutoFit/>
-          </a:bodyPr>
-          <a:lstStyle/>
-          <a:p>
-            <a:r>
-              <a:rPr lang="en-US" dirty="0" smtClean="0">
-                <a:solidFill>
-                  <a:srgbClr val="0000FF"/>
-                </a:solidFill>
-                <a:hlinkClick r:id="rId2"/>
-              </a:rPr>
-              <a:t>Why You Should Never Rescue Exception in Ruby</a:t>
-            </a:r>
-            <a:endParaRPr lang="en-US" dirty="0">
-              <a:solidFill>
-                <a:srgbClr val="0000FF"/>
-              </a:solidFill>
-            </a:endParaRPr>
           </a:p>
         </p:txBody>
       </p:sp>
     </p:spTree>
     <p:extLst>
       <p:ext uri="{BB962C8B-B14F-4D97-AF65-F5344CB8AC3E}">
-        <p14:creationId xmlns:p14="http://schemas.microsoft.com/office/powerpoint/2010/main" val="44699507"/>
+        <p14:creationId xmlns:p14="http://schemas.microsoft.com/office/powerpoint/2010/main" val="3883953552"/>
       </p:ext>
     </p:extLst>
   </p:cSld>
@@ -2807,6 +3298,168 @@
           <a:lstStyle/>
           <a:p>
             <a:r>
+              <a:rPr lang="en-US" dirty="0" smtClean="0"/>
+              <a:t>Error Messages</a:t>
+            </a:r>
+            <a:endParaRPr lang="en-US" dirty="0"/>
+          </a:p>
+        </p:txBody>
+      </p:sp>
+      <p:sp>
+        <p:nvSpPr>
+          <p:cNvPr id="4" name="Footer Placeholder 3"/>
+          <p:cNvSpPr>
+            <a:spLocks noGrp="1"/>
+          </p:cNvSpPr>
+          <p:nvPr>
+            <p:ph type="ftr" sz="quarter" idx="3"/>
+          </p:nvPr>
+        </p:nvSpPr>
+        <p:spPr/>
+        <p:txBody>
+          <a:bodyPr/>
+          <a:lstStyle/>
+          <a:p>
+            <a:r>
+              <a:rPr lang="en-US" dirty="0" smtClean="0"/>
+              <a:t>HT- Debugging</a:t>
+            </a:r>
+            <a:endParaRPr lang="en-US" dirty="0"/>
+          </a:p>
+        </p:txBody>
+      </p:sp>
+      <p:sp>
+        <p:nvSpPr>
+          <p:cNvPr id="3" name="TextBox 2"/>
+          <p:cNvSpPr txBox="1"/>
+          <p:nvPr/>
+        </p:nvSpPr>
+        <p:spPr>
+          <a:xfrm>
+            <a:off x="2049237" y="1875939"/>
+            <a:ext cx="5238133" cy="4031873"/>
+          </a:xfrm>
+          <a:prstGeom prst="rect">
+            <a:avLst/>
+          </a:prstGeom>
+          <a:noFill/>
+        </p:spPr>
+        <p:txBody>
+          <a:bodyPr wrap="none" rtlCol="0">
+            <a:spAutoFit/>
+          </a:bodyPr>
+          <a:lstStyle/>
+          <a:p>
+            <a:r>
+              <a:rPr lang="en-US" sz="3200" dirty="0" smtClean="0"/>
+              <a:t>The First rule of debugging:</a:t>
+            </a:r>
+          </a:p>
+          <a:p>
+            <a:endParaRPr lang="en-US" sz="3200" dirty="0" smtClean="0"/>
+          </a:p>
+          <a:p>
+            <a:pPr marL="457200" indent="-457200">
+              <a:buFont typeface="Arial"/>
+              <a:buChar char="•"/>
+            </a:pPr>
+            <a:r>
+              <a:rPr lang="en-US" sz="3200" dirty="0" smtClean="0"/>
+              <a:t>Read the error message!</a:t>
+            </a:r>
+          </a:p>
+          <a:p>
+            <a:endParaRPr lang="en-US" sz="3200" dirty="0" smtClean="0"/>
+          </a:p>
+          <a:p>
+            <a:r>
+              <a:rPr lang="en-US" sz="3200" dirty="0"/>
+              <a:t>The </a:t>
+            </a:r>
+            <a:r>
+              <a:rPr lang="en-US" sz="3200" dirty="0" smtClean="0"/>
+              <a:t>Second </a:t>
+            </a:r>
+            <a:r>
+              <a:rPr lang="en-US" sz="3200" dirty="0"/>
+              <a:t>rule of debugging</a:t>
+            </a:r>
+            <a:r>
+              <a:rPr lang="en-US" sz="3200" dirty="0" smtClean="0"/>
+              <a:t>:</a:t>
+            </a:r>
+          </a:p>
+          <a:p>
+            <a:endParaRPr lang="en-US" sz="3200" dirty="0"/>
+          </a:p>
+          <a:p>
+            <a:pPr marL="457200" indent="-457200">
+              <a:buFont typeface="Arial"/>
+              <a:buChar char="•"/>
+            </a:pPr>
+            <a:r>
+              <a:rPr lang="en-US" sz="3200" dirty="0"/>
+              <a:t>Read the error message!</a:t>
+            </a:r>
+          </a:p>
+          <a:p>
+            <a:endParaRPr lang="en-US" sz="3200" dirty="0"/>
+          </a:p>
+        </p:txBody>
+      </p:sp>
+    </p:spTree>
+    <p:extLst>
+      <p:ext uri="{BB962C8B-B14F-4D97-AF65-F5344CB8AC3E}">
+        <p14:creationId xmlns:p14="http://schemas.microsoft.com/office/powerpoint/2010/main" val="1542419866"/>
+      </p:ext>
+    </p:extLst>
+  </p:cSld>
+  <p:clrMapOvr>
+    <a:masterClrMapping/>
+  </p:clrMapOvr>
+  <p:timing>
+    <p:tnLst>
+      <p:par>
+        <p:cTn xmlns:p14="http://schemas.microsoft.com/office/powerpoint/2010/main" id="1" dur="indefinite" restart="never" nodeType="tmRoot"/>
+      </p:par>
+    </p:tnLst>
+  </p:timing>
+</p:sld>
+</file>
+
+<file path=ppt/slides/slide7.xml><?xml version="1.0" encoding="utf-8"?>
+<p:sld xmlns:a="http://schemas.openxmlformats.org/drawingml/2006/main" xmlns:r="http://schemas.openxmlformats.org/officeDocument/2006/relationships" xmlns:p="http://schemas.openxmlformats.org/presentationml/2006/main">
+  <p:cSld>
+    <p:spTree>
+      <p:nvGrpSpPr>
+        <p:cNvPr id="1" name=""/>
+        <p:cNvGrpSpPr/>
+        <p:nvPr/>
+      </p:nvGrpSpPr>
+      <p:grpSpPr>
+        <a:xfrm>
+          <a:off x="0" y="0"/>
+          <a:ext cx="0" cy="0"/>
+          <a:chOff x="0" y="0"/>
+          <a:chExt cx="0" cy="0"/>
+        </a:xfrm>
+      </p:grpSpPr>
+      <p:sp>
+        <p:nvSpPr>
+          <p:cNvPr id="2" name="Title 1"/>
+          <p:cNvSpPr>
+            <a:spLocks noGrp="1"/>
+          </p:cNvSpPr>
+          <p:nvPr>
+            <p:ph type="title"/>
+          </p:nvPr>
+        </p:nvSpPr>
+        <p:spPr/>
+        <p:txBody>
+          <a:bodyPr/>
+          <a:lstStyle/>
+          <a:p>
+            <a:r>
               <a:rPr lang="en-US" sz="4400" b="1" kern="1200" dirty="0" smtClean="0">
                 <a:solidFill>
                   <a:schemeClr val="accent1"/>
@@ -2816,10 +3469,164 @@
                 <a:ea typeface="+mj-ea"/>
                 <a:cs typeface="+mj-cs"/>
               </a:rPr>
-              <a:t>Debugging </a:t>
-            </a:r>
-            <a:r>
-              <a:rPr lang="en-US" sz="4400" b="1" kern="1200" dirty="0" err="1" smtClean="0">
+              <a:t>PRY – Th</a:t>
+            </a:r>
+            <a:r>
+              <a:rPr lang="en-US" dirty="0" smtClean="0"/>
+              <a:t>e IRB Alternative</a:t>
+            </a:r>
+            <a:endParaRPr lang="en-US" dirty="0"/>
+          </a:p>
+        </p:txBody>
+      </p:sp>
+      <p:sp>
+        <p:nvSpPr>
+          <p:cNvPr id="4" name="Footer Placeholder 3"/>
+          <p:cNvSpPr>
+            <a:spLocks noGrp="1"/>
+          </p:cNvSpPr>
+          <p:nvPr>
+            <p:ph type="ftr" sz="quarter" idx="3"/>
+          </p:nvPr>
+        </p:nvSpPr>
+        <p:spPr/>
+        <p:txBody>
+          <a:bodyPr/>
+          <a:lstStyle/>
+          <a:p>
+            <a:r>
+              <a:rPr lang="en-US" dirty="0" smtClean="0"/>
+              <a:t>HT- Debugging</a:t>
+            </a:r>
+            <a:endParaRPr lang="en-US" dirty="0"/>
+          </a:p>
+        </p:txBody>
+      </p:sp>
+      <p:sp>
+        <p:nvSpPr>
+          <p:cNvPr id="7" name="TextBox 6"/>
+          <p:cNvSpPr txBox="1"/>
+          <p:nvPr/>
+        </p:nvSpPr>
+        <p:spPr>
+          <a:xfrm>
+            <a:off x="259762" y="1822592"/>
+            <a:ext cx="8741663" cy="3046988"/>
+          </a:xfrm>
+          <a:prstGeom prst="rect">
+            <a:avLst/>
+          </a:prstGeom>
+          <a:noFill/>
+        </p:spPr>
+        <p:txBody>
+          <a:bodyPr wrap="square" rtlCol="0">
+            <a:spAutoFit/>
+          </a:bodyPr>
+          <a:lstStyle/>
+          <a:p>
+            <a:r>
+              <a:rPr lang="en-US" sz="3200" dirty="0"/>
+              <a:t>Pry is a REPL (Read-</a:t>
+            </a:r>
+            <a:r>
+              <a:rPr lang="en-US" sz="3200" dirty="0" err="1"/>
+              <a:t>Eval</a:t>
+            </a:r>
+            <a:r>
+              <a:rPr lang="en-US" sz="3200" dirty="0"/>
+              <a:t>-Print-Loop) much like IRB but with 3 additional key features:</a:t>
+            </a:r>
+          </a:p>
+          <a:p>
+            <a:endParaRPr lang="en-US" sz="3200" dirty="0"/>
+          </a:p>
+          <a:p>
+            <a:pPr marL="457200" indent="-457200">
+              <a:buFont typeface="Arial"/>
+              <a:buChar char="•"/>
+            </a:pPr>
+            <a:r>
+              <a:rPr lang="en-US" sz="3200" dirty="0"/>
+              <a:t>Syntax Highlighting</a:t>
+            </a:r>
+          </a:p>
+          <a:p>
+            <a:pPr marL="457200" indent="-457200">
+              <a:buFont typeface="Arial"/>
+              <a:buChar char="•"/>
+            </a:pPr>
+            <a:r>
+              <a:rPr lang="en-US" sz="3200" dirty="0"/>
+              <a:t>Built in methods</a:t>
+            </a:r>
+          </a:p>
+          <a:p>
+            <a:pPr marL="457200" indent="-457200">
+              <a:buFont typeface="Arial"/>
+              <a:buChar char="•"/>
+            </a:pPr>
+            <a:r>
+              <a:rPr lang="en-US" sz="3200" dirty="0"/>
+              <a:t>A Debugger</a:t>
+            </a:r>
+            <a:endParaRPr lang="en-US" sz="3200" dirty="0"/>
+          </a:p>
+        </p:txBody>
+      </p:sp>
+    </p:spTree>
+    <p:extLst>
+      <p:ext uri="{BB962C8B-B14F-4D97-AF65-F5344CB8AC3E}">
+        <p14:creationId xmlns:p14="http://schemas.microsoft.com/office/powerpoint/2010/main" val="2023413776"/>
+      </p:ext>
+    </p:extLst>
+  </p:cSld>
+  <p:clrMapOvr>
+    <a:masterClrMapping/>
+  </p:clrMapOvr>
+  <p:timing>
+    <p:tnLst>
+      <p:par>
+        <p:cTn xmlns:p14="http://schemas.microsoft.com/office/powerpoint/2010/main" id="1" dur="indefinite" restart="never" nodeType="tmRoot"/>
+      </p:par>
+    </p:tnLst>
+  </p:timing>
+</p:sld>
+</file>
+
+<file path=ppt/slides/slide8.xml><?xml version="1.0" encoding="utf-8"?>
+<p:sld xmlns:a="http://schemas.openxmlformats.org/drawingml/2006/main" xmlns:r="http://schemas.openxmlformats.org/officeDocument/2006/relationships" xmlns:p="http://schemas.openxmlformats.org/presentationml/2006/main">
+  <p:cSld>
+    <p:spTree>
+      <p:nvGrpSpPr>
+        <p:cNvPr id="1" name=""/>
+        <p:cNvGrpSpPr/>
+        <p:nvPr/>
+      </p:nvGrpSpPr>
+      <p:grpSpPr>
+        <a:xfrm>
+          <a:off x="0" y="0"/>
+          <a:ext cx="0" cy="0"/>
+          <a:chOff x="0" y="0"/>
+          <a:chExt cx="0" cy="0"/>
+        </a:xfrm>
+      </p:grpSpPr>
+      <p:sp>
+        <p:nvSpPr>
+          <p:cNvPr id="2" name="Title 1"/>
+          <p:cNvSpPr>
+            <a:spLocks noGrp="1"/>
+          </p:cNvSpPr>
+          <p:nvPr>
+            <p:ph type="title"/>
+          </p:nvPr>
+        </p:nvSpPr>
+        <p:spPr/>
+        <p:txBody>
+          <a:bodyPr/>
+          <a:lstStyle/>
+          <a:p>
+            <a:r>
+              <a:rPr lang="en-US" sz="4400" b="1" kern="1200" dirty="0" smtClean="0">
                 <a:solidFill>
                   <a:schemeClr val="accent1"/>
                 </a:solidFill>
@@ -2828,7 +3635,7 @@
                 <a:ea typeface="+mj-ea"/>
                 <a:cs typeface="+mj-cs"/>
               </a:rPr>
-              <a:t>Wrapup</a:t>
+              <a:t>PRY – Install</a:t>
             </a:r>
             <a:endParaRPr lang="en-US" dirty="0"/>
           </a:p>
@@ -2865,8 +3672,8 @@
         </p:nvSpPr>
         <p:spPr>
           <a:xfrm>
-            <a:off x="3296550" y="2996474"/>
-            <a:ext cx="2986214" cy="830997"/>
+            <a:off x="259762" y="1822592"/>
+            <a:ext cx="8741663" cy="2554545"/>
           </a:xfrm>
           <a:prstGeom prst="rect">
             <a:avLst/>
@@ -2874,23 +3681,193 @@
           <a:noFill/>
         </p:spPr>
         <p:txBody>
-          <a:bodyPr wrap="none" rtlCol="0">
+          <a:bodyPr wrap="square" rtlCol="0">
             <a:spAutoFit/>
           </a:bodyPr>
           <a:lstStyle/>
           <a:p>
             <a:r>
-              <a:rPr lang="en-US" sz="4800" dirty="0" smtClean="0"/>
-              <a:t>Questions?</a:t>
-            </a:r>
-            <a:endParaRPr lang="en-US" sz="4800" dirty="0"/>
+              <a:rPr lang="en-US" sz="3200" dirty="0"/>
+              <a:t>g</a:t>
+            </a:r>
+            <a:r>
+              <a:rPr lang="en-US" sz="3200" dirty="0" smtClean="0"/>
+              <a:t>em install pry</a:t>
+            </a:r>
+          </a:p>
+          <a:p>
+            <a:r>
+              <a:rPr lang="en-US" sz="3200" dirty="0"/>
+              <a:t>g</a:t>
+            </a:r>
+            <a:r>
+              <a:rPr lang="en-US" sz="3200" dirty="0" smtClean="0"/>
+              <a:t>em install pry-doc</a:t>
+            </a:r>
+          </a:p>
+          <a:p>
+            <a:r>
+              <a:rPr lang="en-US" sz="3200" dirty="0" smtClean="0"/>
+              <a:t>gem install pry-</a:t>
+            </a:r>
+            <a:r>
+              <a:rPr lang="en-US" sz="3200" dirty="0" err="1" smtClean="0"/>
+              <a:t>byebug</a:t>
+            </a:r>
+            <a:endParaRPr lang="en-US" sz="3200" dirty="0" smtClean="0"/>
+          </a:p>
+          <a:p>
+            <a:r>
+              <a:rPr lang="en-US" sz="3200" dirty="0" err="1"/>
+              <a:t>r</a:t>
+            </a:r>
+            <a:r>
+              <a:rPr lang="en-US" sz="3200" dirty="0" err="1" smtClean="0"/>
+              <a:t>benv</a:t>
+            </a:r>
+            <a:r>
+              <a:rPr lang="en-US" sz="3200" dirty="0" smtClean="0"/>
+              <a:t> rehash</a:t>
+            </a:r>
+          </a:p>
+          <a:p>
+            <a:endParaRPr lang="en-US" sz="3200" dirty="0"/>
           </a:p>
         </p:txBody>
       </p:sp>
     </p:spTree>
     <p:extLst>
       <p:ext uri="{BB962C8B-B14F-4D97-AF65-F5344CB8AC3E}">
-        <p14:creationId xmlns:p14="http://schemas.microsoft.com/office/powerpoint/2010/main" val="791299107"/>
+        <p14:creationId xmlns:p14="http://schemas.microsoft.com/office/powerpoint/2010/main" val="1635942972"/>
+      </p:ext>
+    </p:extLst>
+  </p:cSld>
+  <p:clrMapOvr>
+    <a:masterClrMapping/>
+  </p:clrMapOvr>
+  <p:timing>
+    <p:tnLst>
+      <p:par>
+        <p:cTn xmlns:p14="http://schemas.microsoft.com/office/powerpoint/2010/main" id="1" dur="indefinite" restart="never" nodeType="tmRoot"/>
+      </p:par>
+    </p:tnLst>
+  </p:timing>
+</p:sld>
+</file>
+
+<file path=ppt/slides/slide9.xml><?xml version="1.0" encoding="utf-8"?>
+<p:sld xmlns:a="http://schemas.openxmlformats.org/drawingml/2006/main" xmlns:r="http://schemas.openxmlformats.org/officeDocument/2006/relationships" xmlns:p="http://schemas.openxmlformats.org/presentationml/2006/main">
+  <p:cSld>
+    <p:bg>
+      <p:bgPr>
+        <a:solidFill>
+          <a:schemeClr val="bg1"/>
+        </a:solidFill>
+        <a:effectLst/>
+      </p:bgPr>
+    </p:bg>
+    <p:spTree>
+      <p:nvGrpSpPr>
+        <p:cNvPr id="1" name=""/>
+        <p:cNvGrpSpPr/>
+        <p:nvPr/>
+      </p:nvGrpSpPr>
+      <p:grpSpPr>
+        <a:xfrm>
+          <a:off x="0" y="0"/>
+          <a:ext cx="0" cy="0"/>
+          <a:chOff x="0" y="0"/>
+          <a:chExt cx="0" cy="0"/>
+        </a:xfrm>
+      </p:grpSpPr>
+      <p:sp>
+        <p:nvSpPr>
+          <p:cNvPr id="2" name="Title 1"/>
+          <p:cNvSpPr>
+            <a:spLocks noGrp="1"/>
+          </p:cNvSpPr>
+          <p:nvPr>
+            <p:ph type="title"/>
+          </p:nvPr>
+        </p:nvSpPr>
+        <p:spPr/>
+        <p:txBody>
+          <a:bodyPr/>
+          <a:lstStyle/>
+          <a:p>
+            <a:r>
+              <a:rPr lang="en-US" sz="4400" b="1" kern="1200" dirty="0" smtClean="0">
+                <a:solidFill>
+                  <a:schemeClr val="accent1"/>
+                </a:solidFill>
+                <a:effectLst/>
+                <a:latin typeface="+mj-lt"/>
+                <a:ea typeface="+mj-ea"/>
+                <a:cs typeface="+mj-cs"/>
+              </a:rPr>
+              <a:t>show-doc</a:t>
+            </a:r>
+            <a:endParaRPr lang="en-US" dirty="0"/>
+          </a:p>
+        </p:txBody>
+      </p:sp>
+      <p:sp>
+        <p:nvSpPr>
+          <p:cNvPr id="4" name="Footer Placeholder 3"/>
+          <p:cNvSpPr>
+            <a:spLocks noGrp="1"/>
+          </p:cNvSpPr>
+          <p:nvPr>
+            <p:ph type="ftr" sz="quarter" idx="3"/>
+          </p:nvPr>
+        </p:nvSpPr>
+        <p:spPr/>
+        <p:txBody>
+          <a:bodyPr/>
+          <a:lstStyle/>
+          <a:p>
+            <a:r>
+              <a:rPr lang="en-US" dirty="0" smtClean="0"/>
+              <a:t>HT- Debugging</a:t>
+            </a:r>
+            <a:endParaRPr lang="en-US" dirty="0"/>
+          </a:p>
+        </p:txBody>
+      </p:sp>
+      <p:pic>
+        <p:nvPicPr>
+          <p:cNvPr id="3" name="Picture 2" descr="pry-show-doc.tiff"/>
+          <p:cNvPicPr>
+            <a:picLocks noChangeAspect="1"/>
+          </p:cNvPicPr>
+          <p:nvPr/>
+        </p:nvPicPr>
+        <p:blipFill>
+          <a:blip r:embed="rId2">
+            <a:extLst>
+              <a:ext uri="{28A0092B-C50C-407E-A947-70E740481C1C}">
+                <a14:useLocalDpi xmlns:a14="http://schemas.microsoft.com/office/drawing/2010/main" val="0"/>
+              </a:ext>
+            </a:extLst>
+          </a:blip>
+          <a:stretch>
+            <a:fillRect/>
+          </a:stretch>
+        </p:blipFill>
+        <p:spPr>
+          <a:xfrm>
+            <a:off x="1930400" y="1534938"/>
+            <a:ext cx="5283200" cy="4394200"/>
+          </a:xfrm>
+          <a:prstGeom prst="rect">
+            <a:avLst/>
+          </a:prstGeom>
+        </p:spPr>
+      </p:pic>
+    </p:spTree>
+    <p:extLst>
+      <p:ext uri="{BB962C8B-B14F-4D97-AF65-F5344CB8AC3E}">
+        <p14:creationId xmlns:p14="http://schemas.microsoft.com/office/powerpoint/2010/main" val="3906024378"/>
       </p:ext>
     </p:extLst>
   </p:cSld>

</xml_diff>

<commit_message>
r1 slides & notes
</commit_message>
<xml_diff>
--- a/HT-debugging-basics.pptx
+++ b/HT-debugging-basics.pptx
@@ -5,25 +5,37 @@
     <p:sldMasterId id="2147483660" r:id="rId1"/>
   </p:sldMasterIdLst>
   <p:notesMasterIdLst>
-    <p:notesMasterId r:id="rId15"/>
+    <p:notesMasterId r:id="rId27"/>
   </p:notesMasterIdLst>
   <p:handoutMasterIdLst>
-    <p:handoutMasterId r:id="rId16"/>
+    <p:handoutMasterId r:id="rId28"/>
   </p:handoutMasterIdLst>
   <p:sldIdLst>
     <p:sldId id="256" r:id="rId2"/>
     <p:sldId id="257" r:id="rId3"/>
-    <p:sldId id="346" r:id="rId4"/>
-    <p:sldId id="351" r:id="rId5"/>
-    <p:sldId id="347" r:id="rId6"/>
-    <p:sldId id="348" r:id="rId7"/>
-    <p:sldId id="345" r:id="rId8"/>
-    <p:sldId id="349" r:id="rId9"/>
-    <p:sldId id="350" r:id="rId10"/>
-    <p:sldId id="342" r:id="rId11"/>
-    <p:sldId id="344" r:id="rId12"/>
-    <p:sldId id="343" r:id="rId13"/>
-    <p:sldId id="341" r:id="rId14"/>
+    <p:sldId id="355" r:id="rId4"/>
+    <p:sldId id="346" r:id="rId5"/>
+    <p:sldId id="359" r:id="rId6"/>
+    <p:sldId id="351" r:id="rId7"/>
+    <p:sldId id="347" r:id="rId8"/>
+    <p:sldId id="348" r:id="rId9"/>
+    <p:sldId id="361" r:id="rId10"/>
+    <p:sldId id="360" r:id="rId11"/>
+    <p:sldId id="362" r:id="rId12"/>
+    <p:sldId id="363" r:id="rId13"/>
+    <p:sldId id="352" r:id="rId14"/>
+    <p:sldId id="353" r:id="rId15"/>
+    <p:sldId id="345" r:id="rId16"/>
+    <p:sldId id="349" r:id="rId17"/>
+    <p:sldId id="356" r:id="rId18"/>
+    <p:sldId id="350" r:id="rId19"/>
+    <p:sldId id="354" r:id="rId20"/>
+    <p:sldId id="358" r:id="rId21"/>
+    <p:sldId id="342" r:id="rId22"/>
+    <p:sldId id="344" r:id="rId23"/>
+    <p:sldId id="343" r:id="rId24"/>
+    <p:sldId id="341" r:id="rId25"/>
+    <p:sldId id="357" r:id="rId26"/>
   </p:sldIdLst>
   <p:sldSz cx="9144000" cy="6858000" type="screen4x3"/>
   <p:notesSz cx="6858000" cy="9144000"/>
@@ -2259,16 +2271,8 @@
           <a:lstStyle/>
           <a:p>
             <a:r>
-              <a:rPr lang="en-US" sz="4400" b="1" kern="1200" dirty="0" smtClean="0">
-                <a:solidFill>
-                  <a:schemeClr val="accent1"/>
-                </a:solidFill>
-                <a:effectLst/>
-                <a:latin typeface="+mj-lt"/>
-                <a:ea typeface="+mj-ea"/>
-                <a:cs typeface="+mj-cs"/>
-              </a:rPr>
-              <a:t>Raise an Error</a:t>
+              <a:rPr lang="en-US" dirty="0" smtClean="0"/>
+              <a:t>Strategies</a:t>
             </a:r>
             <a:endParaRPr lang="en-US" dirty="0"/>
           </a:p>
@@ -2299,44 +2303,90 @@
       </p:sp>
       <p:sp>
         <p:nvSpPr>
-          <p:cNvPr id="7" name="TextBox 6"/>
-          <p:cNvSpPr txBox="1"/>
+          <p:cNvPr id="3" name="Rectangle 2"/>
+          <p:cNvSpPr/>
           <p:nvPr/>
         </p:nvSpPr>
         <p:spPr>
           <a:xfrm>
-            <a:off x="259762" y="1822592"/>
-            <a:ext cx="8741663" cy="1077218"/>
+            <a:off x="457200" y="1671589"/>
+            <a:ext cx="8229599" cy="3046988"/>
           </a:xfrm>
           <a:prstGeom prst="rect">
             <a:avLst/>
           </a:prstGeom>
-          <a:noFill/>
         </p:spPr>
         <p:txBody>
-          <a:bodyPr wrap="square" rtlCol="0">
+          <a:bodyPr wrap="square">
             <a:spAutoFit/>
           </a:bodyPr>
           <a:lstStyle/>
           <a:p>
-            <a:r>
-              <a:rPr lang="en-US" sz="3200" dirty="0" smtClean="0"/>
-              <a:t>Careful:</a:t>
-            </a:r>
-          </a:p>
-          <a:p>
-            <a:r>
-              <a:rPr lang="en-US" sz="3200" dirty="0" smtClean="0"/>
-              <a:t>Rescue isn’t the bug free savior you might think</a:t>
-            </a:r>
-            <a:endParaRPr lang="en-US" sz="3200" dirty="0"/>
+            <a:pPr marL="457200" indent="-457200">
+              <a:buFont typeface="Arial"/>
+              <a:buChar char="•"/>
+            </a:pPr>
+            <a:r>
+              <a:rPr lang="en-US" sz="3200" dirty="0"/>
+              <a:t>Read the error messages!</a:t>
+            </a:r>
+          </a:p>
+          <a:p>
+            <a:pPr marL="457200" indent="-457200">
+              <a:buFont typeface="Arial"/>
+              <a:buChar char="•"/>
+            </a:pPr>
+            <a:r>
+              <a:rPr lang="en-US" sz="3200" dirty="0"/>
+              <a:t>Know what your expected behavior is.</a:t>
+            </a:r>
+          </a:p>
+          <a:p>
+            <a:pPr marL="457200" indent="-457200">
+              <a:buFont typeface="Arial"/>
+              <a:buChar char="•"/>
+            </a:pPr>
+            <a:r>
+              <a:rPr lang="en-US" sz="3200" dirty="0"/>
+              <a:t>Understand the input(s).</a:t>
+            </a:r>
+          </a:p>
+          <a:p>
+            <a:pPr marL="457200" indent="-457200">
+              <a:buFont typeface="Arial"/>
+              <a:buChar char="•"/>
+            </a:pPr>
+            <a:r>
+              <a:rPr lang="en-US" sz="3200" dirty="0"/>
+              <a:t>Understand the program state.</a:t>
+            </a:r>
+          </a:p>
+          <a:p>
+            <a:pPr marL="457200" indent="-457200">
+              <a:buFont typeface="Arial"/>
+              <a:buChar char="•"/>
+            </a:pPr>
+            <a:r>
+              <a:rPr lang="en-US" sz="3200" dirty="0"/>
+              <a:t>Make incremental changes.</a:t>
+            </a:r>
+          </a:p>
+          <a:p>
+            <a:pPr marL="457200" indent="-457200">
+              <a:buFont typeface="Arial"/>
+              <a:buChar char="•"/>
+            </a:pPr>
+            <a:r>
+              <a:rPr lang="en-US" sz="3200" dirty="0"/>
+              <a:t>Check your assumptions.</a:t>
+            </a:r>
           </a:p>
         </p:txBody>
       </p:sp>
     </p:spTree>
     <p:extLst>
       <p:ext uri="{BB962C8B-B14F-4D97-AF65-F5344CB8AC3E}">
-        <p14:creationId xmlns:p14="http://schemas.microsoft.com/office/powerpoint/2010/main" val="650808683"/>
+        <p14:creationId xmlns:p14="http://schemas.microsoft.com/office/powerpoint/2010/main" val="1054351687"/>
       </p:ext>
     </p:extLst>
   </p:cSld>
@@ -2386,16 +2436,8 @@
           <a:lstStyle/>
           <a:p>
             <a:r>
-              <a:rPr lang="en-US" sz="4400" b="1" kern="1200" dirty="0" smtClean="0">
-                <a:solidFill>
-                  <a:schemeClr val="accent1"/>
-                </a:solidFill>
-                <a:effectLst/>
-                <a:latin typeface="+mj-lt"/>
-                <a:ea typeface="+mj-ea"/>
-                <a:cs typeface="+mj-cs"/>
-              </a:rPr>
-              <a:t>Rescue</a:t>
+              <a:rPr lang="en-US" dirty="0" smtClean="0"/>
+              <a:t>Strategies</a:t>
             </a:r>
             <a:endParaRPr lang="en-US" dirty="0"/>
           </a:p>
@@ -2426,35 +2468,70 @@
       </p:sp>
       <p:sp>
         <p:nvSpPr>
-          <p:cNvPr id="7" name="TextBox 6"/>
-          <p:cNvSpPr txBox="1"/>
+          <p:cNvPr id="3" name="Rectangle 2"/>
+          <p:cNvSpPr/>
           <p:nvPr/>
         </p:nvSpPr>
         <p:spPr>
           <a:xfrm>
-            <a:off x="259762" y="1822592"/>
-            <a:ext cx="8741663" cy="1077218"/>
+            <a:off x="457200" y="1671589"/>
+            <a:ext cx="8229599" cy="2062103"/>
           </a:xfrm>
           <a:prstGeom prst="rect">
             <a:avLst/>
           </a:prstGeom>
-          <a:noFill/>
         </p:spPr>
         <p:txBody>
-          <a:bodyPr wrap="square" rtlCol="0">
+          <a:bodyPr wrap="square">
             <a:spAutoFit/>
           </a:bodyPr>
           <a:lstStyle/>
           <a:p>
+            <a:pPr marL="457200" indent="-457200">
+              <a:buFont typeface="Arial"/>
+              <a:buChar char="•"/>
+            </a:pPr>
             <a:r>
               <a:rPr lang="en-US" sz="3200" dirty="0" smtClean="0"/>
-              <a:t>Careful:</a:t>
-            </a:r>
-          </a:p>
-          <a:p>
+              <a:t>Debug “inline”</a:t>
+            </a:r>
+          </a:p>
+          <a:p>
+            <a:pPr marL="457200" indent="-457200">
+              <a:buFont typeface="Arial"/>
+              <a:buChar char="•"/>
+            </a:pPr>
             <a:r>
               <a:rPr lang="en-US" sz="3200" dirty="0" smtClean="0"/>
-              <a:t>Rescue isn’t the bug free savior you might think</a:t>
+              <a:t>Use a REPL (</a:t>
+            </a:r>
+            <a:r>
+              <a:rPr lang="en-US" sz="3200" dirty="0" err="1" smtClean="0"/>
+              <a:t>irb</a:t>
+            </a:r>
+            <a:r>
+              <a:rPr lang="en-US" sz="3200" dirty="0" smtClean="0"/>
+              <a:t> || pry)</a:t>
+            </a:r>
+          </a:p>
+          <a:p>
+            <a:pPr marL="457200" indent="-457200">
+              <a:buFont typeface="Arial"/>
+              <a:buChar char="•"/>
+            </a:pPr>
+            <a:r>
+              <a:rPr lang="en-US" sz="3200" dirty="0" smtClean="0"/>
+              <a:t>Guess &amp;&amp; Check</a:t>
+            </a:r>
+          </a:p>
+          <a:p>
+            <a:pPr marL="457200" indent="-457200">
+              <a:buFont typeface="Arial"/>
+              <a:buChar char="•"/>
+            </a:pPr>
+            <a:r>
+              <a:rPr lang="en-US" sz="3200" dirty="0" smtClean="0"/>
+              <a:t>Raise – Rescue</a:t>
             </a:r>
             <a:endParaRPr lang="en-US" sz="3200" dirty="0"/>
           </a:p>
@@ -2463,7 +2540,7 @@
     </p:spTree>
     <p:extLst>
       <p:ext uri="{BB962C8B-B14F-4D97-AF65-F5344CB8AC3E}">
-        <p14:creationId xmlns:p14="http://schemas.microsoft.com/office/powerpoint/2010/main" val="3627005062"/>
+        <p14:creationId xmlns:p14="http://schemas.microsoft.com/office/powerpoint/2010/main" val="3214389839"/>
       </p:ext>
     </p:extLst>
   </p:cSld>
@@ -2513,16 +2590,8 @@
           <a:lstStyle/>
           <a:p>
             <a:r>
-              <a:rPr lang="en-US" sz="4400" b="1" kern="1200" dirty="0" smtClean="0">
-                <a:solidFill>
-                  <a:schemeClr val="accent1"/>
-                </a:solidFill>
-                <a:effectLst/>
-                <a:latin typeface="+mj-lt"/>
-                <a:ea typeface="+mj-ea"/>
-                <a:cs typeface="+mj-cs"/>
-              </a:rPr>
-              <a:t>Rescue to the Rescue?</a:t>
+              <a:rPr lang="en-US" dirty="0" smtClean="0"/>
+              <a:t>Debugging “inline”</a:t>
             </a:r>
             <a:endParaRPr lang="en-US" dirty="0"/>
           </a:p>
@@ -2548,42 +2617,6 @@
               <a:t>HT- Debugging</a:t>
             </a:r>
             <a:endParaRPr lang="en-US" dirty="0"/>
-          </a:p>
-        </p:txBody>
-      </p:sp>
-      <p:sp>
-        <p:nvSpPr>
-          <p:cNvPr id="7" name="TextBox 6"/>
-          <p:cNvSpPr txBox="1"/>
-          <p:nvPr/>
-        </p:nvSpPr>
-        <p:spPr>
-          <a:xfrm>
-            <a:off x="259762" y="1822592"/>
-            <a:ext cx="8741663" cy="1077218"/>
-          </a:xfrm>
-          <a:prstGeom prst="rect">
-            <a:avLst/>
-          </a:prstGeom>
-          <a:noFill/>
-        </p:spPr>
-        <p:txBody>
-          <a:bodyPr wrap="square" rtlCol="0">
-            <a:spAutoFit/>
-          </a:bodyPr>
-          <a:lstStyle/>
-          <a:p>
-            <a:r>
-              <a:rPr lang="en-US" sz="3200" dirty="0" smtClean="0"/>
-              <a:t>Careful:</a:t>
-            </a:r>
-          </a:p>
-          <a:p>
-            <a:r>
-              <a:rPr lang="en-US" sz="3200" dirty="0" smtClean="0"/>
-              <a:t>Rescue isn’t the bug free savior you might think</a:t>
-            </a:r>
-            <a:endParaRPr lang="en-US" sz="3200" dirty="0"/>
           </a:p>
         </p:txBody>
       </p:sp>
@@ -2595,8 +2628,8 @@
         </p:nvSpPr>
         <p:spPr>
           <a:xfrm>
-            <a:off x="1962650" y="4184787"/>
-            <a:ext cx="6061124" cy="369332"/>
+            <a:off x="274194" y="1671589"/>
+            <a:ext cx="8412605" cy="2400657"/>
           </a:xfrm>
           <a:prstGeom prst="rect">
             <a:avLst/>
@@ -2608,27 +2641,57 @@
           </a:bodyPr>
           <a:lstStyle/>
           <a:p>
-            <a:r>
-              <a:rPr lang="en-US" dirty="0" smtClean="0">
-                <a:solidFill>
-                  <a:srgbClr val="0000FF"/>
-                </a:solidFill>
-                <a:hlinkClick r:id="rId2"/>
-              </a:rPr>
-              <a:t>Why You Should Never Rescue Exception in Ruby</a:t>
-            </a:r>
-            <a:endParaRPr lang="en-US" dirty="0">
-              <a:solidFill>
-                <a:srgbClr val="0000FF"/>
-              </a:solidFill>
-            </a:endParaRPr>
+            <a:pPr marL="457200" indent="-457200">
+              <a:buFont typeface="Arial"/>
+              <a:buChar char="•"/>
+            </a:pPr>
+            <a:r>
+              <a:rPr lang="en-US" sz="3000" dirty="0" smtClean="0"/>
+              <a:t>Use p statements to quickly show variable’s value</a:t>
+            </a:r>
+            <a:br>
+              <a:rPr lang="en-US" sz="3000" dirty="0" smtClean="0"/>
+            </a:br>
+            <a:endParaRPr lang="en-US" sz="3000" dirty="0" smtClean="0"/>
+          </a:p>
+          <a:p>
+            <a:pPr marL="457200" indent="-457200">
+              <a:buFont typeface="Arial"/>
+              <a:buChar char="•"/>
+            </a:pPr>
+            <a:r>
+              <a:rPr lang="en-US" sz="3000" dirty="0" smtClean="0"/>
+              <a:t>Quickly determine if you are reaching a method </a:t>
+            </a:r>
+          </a:p>
+          <a:p>
+            <a:pPr marL="457200" indent="-457200">
+              <a:buFont typeface="Arial"/>
+              <a:buChar char="•"/>
+            </a:pPr>
+            <a:r>
+              <a:rPr lang="en-US" sz="3000" dirty="0" smtClean="0"/>
+              <a:t>Use “signaling code” to easily flag your spot</a:t>
+            </a:r>
+            <a:br>
+              <a:rPr lang="en-US" sz="3000" dirty="0" smtClean="0"/>
+            </a:br>
+            <a:r>
+              <a:rPr lang="en-US" sz="3000" dirty="0" err="1" smtClean="0"/>
+              <a:t>ie</a:t>
+            </a:r>
+            <a:r>
+              <a:rPr lang="en-US" sz="3000" dirty="0" smtClean="0"/>
+              <a:t>: p “~” * 80</a:t>
+            </a:r>
+            <a:endParaRPr lang="en-US" sz="3000" dirty="0"/>
           </a:p>
         </p:txBody>
       </p:sp>
     </p:spTree>
     <p:extLst>
       <p:ext uri="{BB962C8B-B14F-4D97-AF65-F5344CB8AC3E}">
-        <p14:creationId xmlns:p14="http://schemas.microsoft.com/office/powerpoint/2010/main" val="44699507"/>
+        <p14:creationId xmlns:p14="http://schemas.microsoft.com/office/powerpoint/2010/main" val="2408565748"/>
       </p:ext>
     </p:extLst>
   </p:cSld>
@@ -2678,6 +2741,303 @@
           <a:lstStyle/>
           <a:p>
             <a:r>
+              <a:rPr lang="en-US" dirty="0" smtClean="0"/>
+              <a:t>Tools</a:t>
+            </a:r>
+            <a:endParaRPr lang="en-US" dirty="0"/>
+          </a:p>
+        </p:txBody>
+      </p:sp>
+      <p:sp>
+        <p:nvSpPr>
+          <p:cNvPr id="4" name="Footer Placeholder 3"/>
+          <p:cNvSpPr>
+            <a:spLocks noGrp="1"/>
+          </p:cNvSpPr>
+          <p:nvPr>
+            <p:ph type="ftr" sz="quarter" idx="3"/>
+          </p:nvPr>
+        </p:nvSpPr>
+        <p:spPr/>
+        <p:txBody>
+          <a:bodyPr/>
+          <a:lstStyle/>
+          <a:p>
+            <a:r>
+              <a:rPr lang="en-US" dirty="0" smtClean="0"/>
+              <a:t>HT- Debugging</a:t>
+            </a:r>
+            <a:endParaRPr lang="en-US" dirty="0"/>
+          </a:p>
+        </p:txBody>
+      </p:sp>
+      <p:pic>
+        <p:nvPicPr>
+          <p:cNvPr id="5" name="Picture 4" descr="tools.png"/>
+          <p:cNvPicPr>
+            <a:picLocks noChangeAspect="1"/>
+          </p:cNvPicPr>
+          <p:nvPr/>
+        </p:nvPicPr>
+        <p:blipFill>
+          <a:blip r:embed="rId2">
+            <a:extLst>
+              <a:ext uri="{28A0092B-C50C-407E-A947-70E740481C1C}">
+                <a14:useLocalDpi xmlns:a14="http://schemas.microsoft.com/office/drawing/2010/main" val="0"/>
+              </a:ext>
+            </a:extLst>
+          </a:blip>
+          <a:stretch>
+            <a:fillRect/>
+          </a:stretch>
+        </p:blipFill>
+        <p:spPr>
+          <a:xfrm>
+            <a:off x="2236838" y="1685466"/>
+            <a:ext cx="4736019" cy="4736019"/>
+          </a:xfrm>
+          <a:prstGeom prst="rect">
+            <a:avLst/>
+          </a:prstGeom>
+        </p:spPr>
+      </p:pic>
+    </p:spTree>
+    <p:extLst>
+      <p:ext uri="{BB962C8B-B14F-4D97-AF65-F5344CB8AC3E}">
+        <p14:creationId xmlns:p14="http://schemas.microsoft.com/office/powerpoint/2010/main" val="2093079635"/>
+      </p:ext>
+    </p:extLst>
+  </p:cSld>
+  <p:clrMapOvr>
+    <a:masterClrMapping/>
+  </p:clrMapOvr>
+  <p:timing>
+    <p:tnLst>
+      <p:par>
+        <p:cTn xmlns:p14="http://schemas.microsoft.com/office/powerpoint/2010/main" id="1" dur="indefinite" restart="never" nodeType="tmRoot"/>
+      </p:par>
+    </p:tnLst>
+  </p:timing>
+</p:sld>
+</file>
+
+<file path=ppt/slides/slide14.xml><?xml version="1.0" encoding="utf-8"?>
+<p:sld xmlns:a="http://schemas.openxmlformats.org/drawingml/2006/main" xmlns:r="http://schemas.openxmlformats.org/officeDocument/2006/relationships" xmlns:p="http://schemas.openxmlformats.org/presentationml/2006/main">
+  <p:cSld>
+    <p:spTree>
+      <p:nvGrpSpPr>
+        <p:cNvPr id="1" name=""/>
+        <p:cNvGrpSpPr/>
+        <p:nvPr/>
+      </p:nvGrpSpPr>
+      <p:grpSpPr>
+        <a:xfrm>
+          <a:off x="0" y="0"/>
+          <a:ext cx="0" cy="0"/>
+          <a:chOff x="0" y="0"/>
+          <a:chExt cx="0" cy="0"/>
+        </a:xfrm>
+      </p:grpSpPr>
+      <p:sp>
+        <p:nvSpPr>
+          <p:cNvPr id="2" name="Title 1"/>
+          <p:cNvSpPr>
+            <a:spLocks noGrp="1"/>
+          </p:cNvSpPr>
+          <p:nvPr>
+            <p:ph type="title"/>
+          </p:nvPr>
+        </p:nvSpPr>
+        <p:spPr/>
+        <p:txBody>
+          <a:bodyPr/>
+          <a:lstStyle/>
+          <a:p>
+            <a:r>
+              <a:rPr lang="en-US" dirty="0" err="1"/>
+              <a:t>a</a:t>
+            </a:r>
+            <a:r>
+              <a:rPr lang="en-US" dirty="0" err="1" smtClean="0"/>
+              <a:t>wesome_print</a:t>
+            </a:r>
+            <a:endParaRPr lang="en-US" dirty="0"/>
+          </a:p>
+        </p:txBody>
+      </p:sp>
+      <p:sp>
+        <p:nvSpPr>
+          <p:cNvPr id="4" name="Footer Placeholder 3"/>
+          <p:cNvSpPr>
+            <a:spLocks noGrp="1"/>
+          </p:cNvSpPr>
+          <p:nvPr>
+            <p:ph type="ftr" sz="quarter" idx="3"/>
+          </p:nvPr>
+        </p:nvSpPr>
+        <p:spPr/>
+        <p:txBody>
+          <a:bodyPr/>
+          <a:lstStyle/>
+          <a:p>
+            <a:r>
+              <a:rPr lang="en-US" dirty="0" smtClean="0"/>
+              <a:t>HT- Debugging</a:t>
+            </a:r>
+            <a:endParaRPr lang="en-US" dirty="0"/>
+          </a:p>
+        </p:txBody>
+      </p:sp>
+      <p:sp>
+        <p:nvSpPr>
+          <p:cNvPr id="3" name="TextBox 2"/>
+          <p:cNvSpPr txBox="1"/>
+          <p:nvPr/>
+        </p:nvSpPr>
+        <p:spPr>
+          <a:xfrm>
+            <a:off x="1919356" y="1962520"/>
+            <a:ext cx="4701327" cy="2554545"/>
+          </a:xfrm>
+          <a:prstGeom prst="rect">
+            <a:avLst/>
+          </a:prstGeom>
+          <a:noFill/>
+        </p:spPr>
+        <p:txBody>
+          <a:bodyPr wrap="none" rtlCol="0">
+            <a:spAutoFit/>
+          </a:bodyPr>
+          <a:lstStyle/>
+          <a:p>
+            <a:r>
+              <a:rPr lang="en-US" sz="3200" dirty="0"/>
+              <a:t>g</a:t>
+            </a:r>
+            <a:r>
+              <a:rPr lang="en-US" sz="3200" dirty="0" smtClean="0"/>
+              <a:t>em install </a:t>
+            </a:r>
+            <a:r>
+              <a:rPr lang="en-US" sz="3200" dirty="0" err="1" smtClean="0"/>
+              <a:t>awesome_print</a:t>
+            </a:r>
+            <a:endParaRPr lang="en-US" sz="3200" dirty="0" smtClean="0"/>
+          </a:p>
+          <a:p>
+            <a:endParaRPr lang="en-US" sz="3200" dirty="0" smtClean="0"/>
+          </a:p>
+          <a:p>
+            <a:r>
+              <a:rPr lang="en-US" sz="3200" dirty="0"/>
+              <a:t>r</a:t>
+            </a:r>
+            <a:r>
+              <a:rPr lang="en-US" sz="3200" dirty="0" smtClean="0"/>
+              <a:t>equire ‘</a:t>
+            </a:r>
+            <a:r>
+              <a:rPr lang="en-US" sz="3200" dirty="0" err="1" smtClean="0"/>
+              <a:t>awesome_print</a:t>
+            </a:r>
+            <a:r>
+              <a:rPr lang="en-US" sz="3200" dirty="0" smtClean="0"/>
+              <a:t>’</a:t>
+            </a:r>
+          </a:p>
+          <a:p>
+            <a:r>
+              <a:rPr lang="en-US" sz="3200" dirty="0" err="1"/>
+              <a:t>a</a:t>
+            </a:r>
+            <a:r>
+              <a:rPr lang="en-US" sz="3200" dirty="0" err="1" smtClean="0"/>
+              <a:t>p</a:t>
+            </a:r>
+            <a:r>
+              <a:rPr lang="en-US" sz="3200" dirty="0" smtClean="0"/>
+              <a:t> </a:t>
+            </a:r>
+            <a:r>
+              <a:rPr lang="en-US" sz="3200" dirty="0" err="1" smtClean="0"/>
+              <a:t>some_array</a:t>
+            </a:r>
+            <a:endParaRPr lang="en-US" sz="3200" dirty="0" smtClean="0"/>
+          </a:p>
+          <a:p>
+            <a:r>
+              <a:rPr lang="en-US" sz="3200" dirty="0" err="1"/>
+              <a:t>a</a:t>
+            </a:r>
+            <a:r>
+              <a:rPr lang="en-US" sz="3200" dirty="0" err="1" smtClean="0"/>
+              <a:t>p</a:t>
+            </a:r>
+            <a:r>
+              <a:rPr lang="en-US" sz="3200" dirty="0" smtClean="0"/>
+              <a:t> </a:t>
+            </a:r>
+            <a:r>
+              <a:rPr lang="en-US" sz="3200" dirty="0" err="1" smtClean="0"/>
+              <a:t>some_hash</a:t>
+            </a:r>
+            <a:endParaRPr lang="en-US" sz="3200" dirty="0"/>
+          </a:p>
+        </p:txBody>
+      </p:sp>
+    </p:spTree>
+    <p:extLst>
+      <p:ext uri="{BB962C8B-B14F-4D97-AF65-F5344CB8AC3E}">
+        <p14:creationId xmlns:p14="http://schemas.microsoft.com/office/powerpoint/2010/main" val="3704152760"/>
+      </p:ext>
+    </p:extLst>
+  </p:cSld>
+  <p:clrMapOvr>
+    <a:masterClrMapping/>
+  </p:clrMapOvr>
+  <p:timing>
+    <p:tnLst>
+      <p:par>
+        <p:cTn xmlns:p14="http://schemas.microsoft.com/office/powerpoint/2010/main" id="1" dur="indefinite" restart="never" nodeType="tmRoot"/>
+      </p:par>
+    </p:tnLst>
+  </p:timing>
+</p:sld>
+</file>
+
+<file path=ppt/slides/slide15.xml><?xml version="1.0" encoding="utf-8"?>
+<p:sld xmlns:a="http://schemas.openxmlformats.org/drawingml/2006/main" xmlns:r="http://schemas.openxmlformats.org/officeDocument/2006/relationships" xmlns:p="http://schemas.openxmlformats.org/presentationml/2006/main">
+  <p:cSld>
+    <p:spTree>
+      <p:nvGrpSpPr>
+        <p:cNvPr id="1" name=""/>
+        <p:cNvGrpSpPr/>
+        <p:nvPr/>
+      </p:nvGrpSpPr>
+      <p:grpSpPr>
+        <a:xfrm>
+          <a:off x="0" y="0"/>
+          <a:ext cx="0" cy="0"/>
+          <a:chOff x="0" y="0"/>
+          <a:chExt cx="0" cy="0"/>
+        </a:xfrm>
+      </p:grpSpPr>
+      <p:sp>
+        <p:nvSpPr>
+          <p:cNvPr id="2" name="Title 1"/>
+          <p:cNvSpPr>
+            <a:spLocks noGrp="1"/>
+          </p:cNvSpPr>
+          <p:nvPr>
+            <p:ph type="title"/>
+          </p:nvPr>
+        </p:nvSpPr>
+        <p:spPr/>
+        <p:txBody>
+          <a:bodyPr/>
+          <a:lstStyle/>
+          <a:p>
+            <a:r>
               <a:rPr lang="en-US" sz="4400" b="1" kern="1200" dirty="0" smtClean="0">
                 <a:solidFill>
                   <a:schemeClr val="accent1"/>
@@ -2687,8 +3047,500 @@
                 <a:ea typeface="+mj-ea"/>
                 <a:cs typeface="+mj-cs"/>
               </a:rPr>
-              <a:t>Debugging </a:t>
-            </a:r>
+              <a:t>PRY – Th</a:t>
+            </a:r>
+            <a:r>
+              <a:rPr lang="en-US" dirty="0" smtClean="0"/>
+              <a:t>e IRB Alternative</a:t>
+            </a:r>
+            <a:endParaRPr lang="en-US" dirty="0"/>
+          </a:p>
+        </p:txBody>
+      </p:sp>
+      <p:sp>
+        <p:nvSpPr>
+          <p:cNvPr id="4" name="Footer Placeholder 3"/>
+          <p:cNvSpPr>
+            <a:spLocks noGrp="1"/>
+          </p:cNvSpPr>
+          <p:nvPr>
+            <p:ph type="ftr" sz="quarter" idx="3"/>
+          </p:nvPr>
+        </p:nvSpPr>
+        <p:spPr/>
+        <p:txBody>
+          <a:bodyPr/>
+          <a:lstStyle/>
+          <a:p>
+            <a:r>
+              <a:rPr lang="en-US" dirty="0" smtClean="0"/>
+              <a:t>HT- Debugging</a:t>
+            </a:r>
+            <a:endParaRPr lang="en-US" dirty="0"/>
+          </a:p>
+        </p:txBody>
+      </p:sp>
+      <p:sp>
+        <p:nvSpPr>
+          <p:cNvPr id="7" name="TextBox 6"/>
+          <p:cNvSpPr txBox="1"/>
+          <p:nvPr/>
+        </p:nvSpPr>
+        <p:spPr>
+          <a:xfrm>
+            <a:off x="259762" y="1822592"/>
+            <a:ext cx="8741663" cy="3539430"/>
+          </a:xfrm>
+          <a:prstGeom prst="rect">
+            <a:avLst/>
+          </a:prstGeom>
+          <a:noFill/>
+        </p:spPr>
+        <p:txBody>
+          <a:bodyPr wrap="square" rtlCol="0">
+            <a:spAutoFit/>
+          </a:bodyPr>
+          <a:lstStyle/>
+          <a:p>
+            <a:r>
+              <a:rPr lang="en-US" sz="3200" dirty="0"/>
+              <a:t>Pry is a REPL (Read-</a:t>
+            </a:r>
+            <a:r>
+              <a:rPr lang="en-US" sz="3200" dirty="0" err="1"/>
+              <a:t>Eval</a:t>
+            </a:r>
+            <a:r>
+              <a:rPr lang="en-US" sz="3200" dirty="0"/>
+              <a:t>-Print-Loop) much like IRB but with 3 additional key features:</a:t>
+            </a:r>
+          </a:p>
+          <a:p>
+            <a:endParaRPr lang="en-US" sz="3200" dirty="0"/>
+          </a:p>
+          <a:p>
+            <a:pPr marL="457200" indent="-457200">
+              <a:buFont typeface="Arial"/>
+              <a:buChar char="•"/>
+            </a:pPr>
+            <a:r>
+              <a:rPr lang="en-US" sz="3200" dirty="0"/>
+              <a:t>Syntax Highlighting</a:t>
+            </a:r>
+          </a:p>
+          <a:p>
+            <a:pPr marL="457200" indent="-457200">
+              <a:buFont typeface="Arial"/>
+              <a:buChar char="•"/>
+            </a:pPr>
+            <a:r>
+              <a:rPr lang="en-US" sz="3200" dirty="0"/>
+              <a:t>Built in methods</a:t>
+            </a:r>
+          </a:p>
+          <a:p>
+            <a:pPr marL="457200" indent="-457200">
+              <a:buFont typeface="Arial"/>
+              <a:buChar char="•"/>
+            </a:pPr>
+            <a:r>
+              <a:rPr lang="en-US" sz="3200" dirty="0"/>
+              <a:t>A </a:t>
+            </a:r>
+            <a:r>
+              <a:rPr lang="en-US" sz="3200" dirty="0" smtClean="0"/>
+              <a:t>Debugger</a:t>
+            </a:r>
+          </a:p>
+          <a:p>
+            <a:pPr marL="457200" indent="-457200">
+              <a:buFont typeface="Arial"/>
+              <a:buChar char="•"/>
+            </a:pPr>
+            <a:r>
+              <a:rPr lang="en-US" sz="3200" dirty="0" smtClean="0"/>
+              <a:t>Tabbed completion</a:t>
+            </a:r>
+            <a:endParaRPr lang="en-US" sz="3200" dirty="0"/>
+          </a:p>
+        </p:txBody>
+      </p:sp>
+    </p:spTree>
+    <p:extLst>
+      <p:ext uri="{BB962C8B-B14F-4D97-AF65-F5344CB8AC3E}">
+        <p14:creationId xmlns:p14="http://schemas.microsoft.com/office/powerpoint/2010/main" val="2023413776"/>
+      </p:ext>
+    </p:extLst>
+  </p:cSld>
+  <p:clrMapOvr>
+    <a:masterClrMapping/>
+  </p:clrMapOvr>
+  <p:timing>
+    <p:tnLst>
+      <p:par>
+        <p:cTn xmlns:p14="http://schemas.microsoft.com/office/powerpoint/2010/main" id="1" dur="indefinite" restart="never" nodeType="tmRoot"/>
+      </p:par>
+    </p:tnLst>
+  </p:timing>
+</p:sld>
+</file>
+
+<file path=ppt/slides/slide16.xml><?xml version="1.0" encoding="utf-8"?>
+<p:sld xmlns:a="http://schemas.openxmlformats.org/drawingml/2006/main" xmlns:r="http://schemas.openxmlformats.org/officeDocument/2006/relationships" xmlns:p="http://schemas.openxmlformats.org/presentationml/2006/main">
+  <p:cSld>
+    <p:spTree>
+      <p:nvGrpSpPr>
+        <p:cNvPr id="1" name=""/>
+        <p:cNvGrpSpPr/>
+        <p:nvPr/>
+      </p:nvGrpSpPr>
+      <p:grpSpPr>
+        <a:xfrm>
+          <a:off x="0" y="0"/>
+          <a:ext cx="0" cy="0"/>
+          <a:chOff x="0" y="0"/>
+          <a:chExt cx="0" cy="0"/>
+        </a:xfrm>
+      </p:grpSpPr>
+      <p:sp>
+        <p:nvSpPr>
+          <p:cNvPr id="2" name="Title 1"/>
+          <p:cNvSpPr>
+            <a:spLocks noGrp="1"/>
+          </p:cNvSpPr>
+          <p:nvPr>
+            <p:ph type="title"/>
+          </p:nvPr>
+        </p:nvSpPr>
+        <p:spPr/>
+        <p:txBody>
+          <a:bodyPr/>
+          <a:lstStyle/>
+          <a:p>
+            <a:r>
+              <a:rPr lang="en-US" sz="4400" b="1" kern="1200" dirty="0" smtClean="0">
+                <a:solidFill>
+                  <a:schemeClr val="accent1"/>
+                </a:solidFill>
+                <a:effectLst/>
+                <a:latin typeface="+mj-lt"/>
+                <a:ea typeface="+mj-ea"/>
+                <a:cs typeface="+mj-cs"/>
+              </a:rPr>
+              <a:t>PRY – Install</a:t>
+            </a:r>
+            <a:endParaRPr lang="en-US" dirty="0"/>
+          </a:p>
+        </p:txBody>
+      </p:sp>
+      <p:sp>
+        <p:nvSpPr>
+          <p:cNvPr id="4" name="Footer Placeholder 3"/>
+          <p:cNvSpPr>
+            <a:spLocks noGrp="1"/>
+          </p:cNvSpPr>
+          <p:nvPr>
+            <p:ph type="ftr" sz="quarter" idx="3"/>
+          </p:nvPr>
+        </p:nvSpPr>
+        <p:spPr/>
+        <p:txBody>
+          <a:bodyPr/>
+          <a:lstStyle/>
+          <a:p>
+            <a:r>
+              <a:rPr lang="en-US" dirty="0" smtClean="0"/>
+              <a:t>HT- Debugging</a:t>
+            </a:r>
+            <a:endParaRPr lang="en-US" dirty="0"/>
+          </a:p>
+        </p:txBody>
+      </p:sp>
+      <p:sp>
+        <p:nvSpPr>
+          <p:cNvPr id="7" name="TextBox 6"/>
+          <p:cNvSpPr txBox="1"/>
+          <p:nvPr/>
+        </p:nvSpPr>
+        <p:spPr>
+          <a:xfrm>
+            <a:off x="259762" y="1822592"/>
+            <a:ext cx="8741663" cy="2554545"/>
+          </a:xfrm>
+          <a:prstGeom prst="rect">
+            <a:avLst/>
+          </a:prstGeom>
+          <a:noFill/>
+        </p:spPr>
+        <p:txBody>
+          <a:bodyPr wrap="square" rtlCol="0">
+            <a:spAutoFit/>
+          </a:bodyPr>
+          <a:lstStyle/>
+          <a:p>
+            <a:r>
+              <a:rPr lang="en-US" sz="3200" dirty="0"/>
+              <a:t>g</a:t>
+            </a:r>
+            <a:r>
+              <a:rPr lang="en-US" sz="3200" dirty="0" smtClean="0"/>
+              <a:t>em install pry</a:t>
+            </a:r>
+          </a:p>
+          <a:p>
+            <a:r>
+              <a:rPr lang="en-US" sz="3200" dirty="0"/>
+              <a:t>g</a:t>
+            </a:r>
+            <a:r>
+              <a:rPr lang="en-US" sz="3200" dirty="0" smtClean="0"/>
+              <a:t>em install pry-doc</a:t>
+            </a:r>
+          </a:p>
+          <a:p>
+            <a:r>
+              <a:rPr lang="en-US" sz="3200" dirty="0" smtClean="0"/>
+              <a:t>gem install pry-</a:t>
+            </a:r>
+            <a:r>
+              <a:rPr lang="en-US" sz="3200" dirty="0" err="1" smtClean="0"/>
+              <a:t>byebug</a:t>
+            </a:r>
+            <a:endParaRPr lang="en-US" sz="3200" dirty="0" smtClean="0"/>
+          </a:p>
+          <a:p>
+            <a:r>
+              <a:rPr lang="en-US" sz="3200" dirty="0" err="1"/>
+              <a:t>r</a:t>
+            </a:r>
+            <a:r>
+              <a:rPr lang="en-US" sz="3200" dirty="0" err="1" smtClean="0"/>
+              <a:t>benv</a:t>
+            </a:r>
+            <a:r>
+              <a:rPr lang="en-US" sz="3200" dirty="0" smtClean="0"/>
+              <a:t> rehash</a:t>
+            </a:r>
+          </a:p>
+          <a:p>
+            <a:endParaRPr lang="en-US" sz="3200" dirty="0"/>
+          </a:p>
+        </p:txBody>
+      </p:sp>
+    </p:spTree>
+    <p:extLst>
+      <p:ext uri="{BB962C8B-B14F-4D97-AF65-F5344CB8AC3E}">
+        <p14:creationId xmlns:p14="http://schemas.microsoft.com/office/powerpoint/2010/main" val="1635942972"/>
+      </p:ext>
+    </p:extLst>
+  </p:cSld>
+  <p:clrMapOvr>
+    <a:masterClrMapping/>
+  </p:clrMapOvr>
+  <p:timing>
+    <p:tnLst>
+      <p:par>
+        <p:cTn xmlns:p14="http://schemas.microsoft.com/office/powerpoint/2010/main" id="1" dur="indefinite" restart="never" nodeType="tmRoot"/>
+      </p:par>
+    </p:tnLst>
+  </p:timing>
+</p:sld>
+</file>
+
+<file path=ppt/slides/slide17.xml><?xml version="1.0" encoding="utf-8"?>
+<p:sld xmlns:a="http://schemas.openxmlformats.org/drawingml/2006/main" xmlns:r="http://schemas.openxmlformats.org/officeDocument/2006/relationships" xmlns:p="http://schemas.openxmlformats.org/presentationml/2006/main">
+  <p:cSld>
+    <p:spTree>
+      <p:nvGrpSpPr>
+        <p:cNvPr id="1" name=""/>
+        <p:cNvGrpSpPr/>
+        <p:nvPr/>
+      </p:nvGrpSpPr>
+      <p:grpSpPr>
+        <a:xfrm>
+          <a:off x="0" y="0"/>
+          <a:ext cx="0" cy="0"/>
+          <a:chOff x="0" y="0"/>
+          <a:chExt cx="0" cy="0"/>
+        </a:xfrm>
+      </p:grpSpPr>
+      <p:sp>
+        <p:nvSpPr>
+          <p:cNvPr id="2" name="Title 1"/>
+          <p:cNvSpPr>
+            <a:spLocks noGrp="1"/>
+          </p:cNvSpPr>
+          <p:nvPr>
+            <p:ph type="title"/>
+          </p:nvPr>
+        </p:nvSpPr>
+        <p:spPr/>
+        <p:txBody>
+          <a:bodyPr/>
+          <a:lstStyle/>
+          <a:p>
+            <a:r>
+              <a:rPr lang="en-US" sz="4400" b="1" kern="1200" dirty="0" smtClean="0">
+                <a:solidFill>
+                  <a:schemeClr val="accent1"/>
+                </a:solidFill>
+                <a:effectLst/>
+                <a:latin typeface="+mj-lt"/>
+                <a:ea typeface="+mj-ea"/>
+                <a:cs typeface="+mj-cs"/>
+              </a:rPr>
+              <a:t>PRY – terminal commands</a:t>
+            </a:r>
+            <a:endParaRPr lang="en-US" dirty="0"/>
+          </a:p>
+        </p:txBody>
+      </p:sp>
+      <p:sp>
+        <p:nvSpPr>
+          <p:cNvPr id="4" name="Footer Placeholder 3"/>
+          <p:cNvSpPr>
+            <a:spLocks noGrp="1"/>
+          </p:cNvSpPr>
+          <p:nvPr>
+            <p:ph type="ftr" sz="quarter" idx="3"/>
+          </p:nvPr>
+        </p:nvSpPr>
+        <p:spPr/>
+        <p:txBody>
+          <a:bodyPr/>
+          <a:lstStyle/>
+          <a:p>
+            <a:r>
+              <a:rPr lang="en-US" dirty="0" smtClean="0"/>
+              <a:t>HT- Debugging</a:t>
+            </a:r>
+            <a:endParaRPr lang="en-US" dirty="0"/>
+          </a:p>
+        </p:txBody>
+      </p:sp>
+      <p:sp>
+        <p:nvSpPr>
+          <p:cNvPr id="7" name="TextBox 6"/>
+          <p:cNvSpPr txBox="1"/>
+          <p:nvPr/>
+        </p:nvSpPr>
+        <p:spPr>
+          <a:xfrm>
+            <a:off x="259762" y="1822592"/>
+            <a:ext cx="8741663" cy="2554545"/>
+          </a:xfrm>
+          <a:prstGeom prst="rect">
+            <a:avLst/>
+          </a:prstGeom>
+          <a:noFill/>
+        </p:spPr>
+        <p:txBody>
+          <a:bodyPr wrap="square" rtlCol="0">
+            <a:spAutoFit/>
+          </a:bodyPr>
+          <a:lstStyle/>
+          <a:p>
+            <a:r>
+              <a:rPr lang="en-US" sz="3200" dirty="0" err="1" smtClean="0"/>
+              <a:t>ls</a:t>
+            </a:r>
+            <a:r>
+              <a:rPr lang="en-US" sz="3200" dirty="0" smtClean="0"/>
+              <a:t>  (list methods) </a:t>
+            </a:r>
+          </a:p>
+          <a:p>
+            <a:r>
+              <a:rPr lang="en-US" sz="3200" dirty="0" smtClean="0"/>
+              <a:t>_   (the last output)</a:t>
+            </a:r>
+            <a:endParaRPr lang="en-US" sz="3200" dirty="0" smtClean="0"/>
+          </a:p>
+          <a:p>
+            <a:r>
+              <a:rPr lang="en-US" sz="3200" dirty="0" smtClean="0"/>
+              <a:t>?   (show-doc)</a:t>
+            </a:r>
+          </a:p>
+          <a:p>
+            <a:r>
+              <a:rPr lang="en-US" sz="3200" dirty="0" smtClean="0"/>
+              <a:t>.    (send command to bash)</a:t>
+            </a:r>
+          </a:p>
+          <a:p>
+            <a:r>
+              <a:rPr lang="en-US" sz="3200" dirty="0"/>
+              <a:t>c</a:t>
+            </a:r>
+            <a:r>
+              <a:rPr lang="en-US" sz="3200" dirty="0" smtClean="0"/>
+              <a:t>at filename (displays the given file)</a:t>
+            </a:r>
+            <a:endParaRPr lang="en-US" sz="3200" dirty="0"/>
+          </a:p>
+        </p:txBody>
+      </p:sp>
+    </p:spTree>
+    <p:extLst>
+      <p:ext uri="{BB962C8B-B14F-4D97-AF65-F5344CB8AC3E}">
+        <p14:creationId xmlns:p14="http://schemas.microsoft.com/office/powerpoint/2010/main" val="514816359"/>
+      </p:ext>
+    </p:extLst>
+  </p:cSld>
+  <p:clrMapOvr>
+    <a:masterClrMapping/>
+  </p:clrMapOvr>
+  <p:timing>
+    <p:tnLst>
+      <p:par>
+        <p:cTn xmlns:p14="http://schemas.microsoft.com/office/powerpoint/2010/main" id="1" dur="indefinite" restart="never" nodeType="tmRoot"/>
+      </p:par>
+    </p:tnLst>
+  </p:timing>
+</p:sld>
+</file>
+
+<file path=ppt/slides/slide18.xml><?xml version="1.0" encoding="utf-8"?>
+<p:sld xmlns:a="http://schemas.openxmlformats.org/drawingml/2006/main" xmlns:r="http://schemas.openxmlformats.org/officeDocument/2006/relationships" xmlns:p="http://schemas.openxmlformats.org/presentationml/2006/main">
+  <p:cSld>
+    <p:bg>
+      <p:bgPr>
+        <a:solidFill>
+          <a:schemeClr val="bg1"/>
+        </a:solidFill>
+        <a:effectLst/>
+      </p:bgPr>
+    </p:bg>
+    <p:spTree>
+      <p:nvGrpSpPr>
+        <p:cNvPr id="1" name=""/>
+        <p:cNvGrpSpPr/>
+        <p:nvPr/>
+      </p:nvGrpSpPr>
+      <p:grpSpPr>
+        <a:xfrm>
+          <a:off x="0" y="0"/>
+          <a:ext cx="0" cy="0"/>
+          <a:chOff x="0" y="0"/>
+          <a:chExt cx="0" cy="0"/>
+        </a:xfrm>
+      </p:grpSpPr>
+      <p:sp>
+        <p:nvSpPr>
+          <p:cNvPr id="2" name="Title 1"/>
+          <p:cNvSpPr>
+            <a:spLocks noGrp="1"/>
+          </p:cNvSpPr>
+          <p:nvPr>
+            <p:ph type="title"/>
+          </p:nvPr>
+        </p:nvSpPr>
+        <p:spPr/>
+        <p:txBody>
+          <a:bodyPr/>
+          <a:lstStyle/>
+          <a:p>
             <a:r>
               <a:rPr lang="en-US" sz="4400" b="1" kern="1200" dirty="0" err="1" smtClean="0">
                 <a:solidFill>
@@ -2699,7 +3551,7 @@
                 <a:ea typeface="+mj-ea"/>
                 <a:cs typeface="+mj-cs"/>
               </a:rPr>
-              <a:t>Wrapup</a:t>
+              <a:t>PRY#show-doc</a:t>
             </a:r>
             <a:endParaRPr lang="en-US" dirty="0"/>
           </a:p>
@@ -2728,40 +3580,269 @@
           </a:p>
         </p:txBody>
       </p:sp>
-      <p:sp>
-        <p:nvSpPr>
-          <p:cNvPr id="7" name="TextBox 6"/>
-          <p:cNvSpPr txBox="1"/>
+      <p:pic>
+        <p:nvPicPr>
+          <p:cNvPr id="3" name="Picture 2" descr="pry-show-doc.tiff"/>
+          <p:cNvPicPr>
+            <a:picLocks noChangeAspect="1"/>
+          </p:cNvPicPr>
           <p:nvPr/>
-        </p:nvSpPr>
+        </p:nvPicPr>
+        <p:blipFill>
+          <a:blip r:embed="rId2">
+            <a:extLst>
+              <a:ext uri="{28A0092B-C50C-407E-A947-70E740481C1C}">
+                <a14:useLocalDpi xmlns:a14="http://schemas.microsoft.com/office/drawing/2010/main" val="0"/>
+              </a:ext>
+            </a:extLst>
+          </a:blip>
+          <a:stretch>
+            <a:fillRect/>
+          </a:stretch>
+        </p:blipFill>
         <p:spPr>
           <a:xfrm>
-            <a:off x="3296550" y="2996474"/>
-            <a:ext cx="2986214" cy="830997"/>
+            <a:off x="1943180" y="1534938"/>
+            <a:ext cx="5283200" cy="4394200"/>
           </a:xfrm>
           <a:prstGeom prst="rect">
             <a:avLst/>
           </a:prstGeom>
-          <a:noFill/>
         </p:spPr>
-        <p:txBody>
-          <a:bodyPr wrap="none" rtlCol="0">
-            <a:spAutoFit/>
-          </a:bodyPr>
-          <a:lstStyle/>
-          <a:p>
-            <a:r>
-              <a:rPr lang="en-US" sz="4800" dirty="0" smtClean="0"/>
-              <a:t>Questions?</a:t>
-            </a:r>
-            <a:endParaRPr lang="en-US" sz="4800" dirty="0"/>
-          </a:p>
-        </p:txBody>
-      </p:sp>
+      </p:pic>
     </p:spTree>
     <p:extLst>
       <p:ext uri="{BB962C8B-B14F-4D97-AF65-F5344CB8AC3E}">
-        <p14:creationId xmlns:p14="http://schemas.microsoft.com/office/powerpoint/2010/main" val="791299107"/>
+        <p14:creationId xmlns:p14="http://schemas.microsoft.com/office/powerpoint/2010/main" val="3906024378"/>
+      </p:ext>
+    </p:extLst>
+  </p:cSld>
+  <p:clrMapOvr>
+    <a:masterClrMapping/>
+  </p:clrMapOvr>
+  <p:timing>
+    <p:tnLst>
+      <p:par>
+        <p:cTn xmlns:p14="http://schemas.microsoft.com/office/powerpoint/2010/main" id="1" dur="indefinite" restart="never" nodeType="tmRoot"/>
+      </p:par>
+    </p:tnLst>
+  </p:timing>
+</p:sld>
+</file>
+
+<file path=ppt/slides/slide19.xml><?xml version="1.0" encoding="utf-8"?>
+<p:sld xmlns:a="http://schemas.openxmlformats.org/drawingml/2006/main" xmlns:r="http://schemas.openxmlformats.org/officeDocument/2006/relationships" xmlns:p="http://schemas.openxmlformats.org/presentationml/2006/main">
+  <p:cSld>
+    <p:bg>
+      <p:bgPr>
+        <a:solidFill>
+          <a:schemeClr val="bg1"/>
+        </a:solidFill>
+        <a:effectLst/>
+      </p:bgPr>
+    </p:bg>
+    <p:spTree>
+      <p:nvGrpSpPr>
+        <p:cNvPr id="1" name=""/>
+        <p:cNvGrpSpPr/>
+        <p:nvPr/>
+      </p:nvGrpSpPr>
+      <p:grpSpPr>
+        <a:xfrm>
+          <a:off x="0" y="0"/>
+          <a:ext cx="0" cy="0"/>
+          <a:chOff x="0" y="0"/>
+          <a:chExt cx="0" cy="0"/>
+        </a:xfrm>
+      </p:grpSpPr>
+      <p:sp>
+        <p:nvSpPr>
+          <p:cNvPr id="2" name="Title 1"/>
+          <p:cNvSpPr>
+            <a:spLocks noGrp="1"/>
+          </p:cNvSpPr>
+          <p:nvPr>
+            <p:ph type="title"/>
+          </p:nvPr>
+        </p:nvSpPr>
+        <p:spPr/>
+        <p:txBody>
+          <a:bodyPr/>
+          <a:lstStyle/>
+          <a:p>
+            <a:r>
+              <a:rPr lang="en-US" dirty="0" smtClean="0"/>
+              <a:t>pry</a:t>
+            </a:r>
+            <a:r>
+              <a:rPr lang="en-US" sz="4400" b="1" kern="1200" dirty="0" smtClean="0">
+                <a:solidFill>
+                  <a:schemeClr val="accent1"/>
+                </a:solidFill>
+                <a:effectLst/>
+                <a:latin typeface="+mj-lt"/>
+                <a:ea typeface="+mj-ea"/>
+                <a:cs typeface="+mj-cs"/>
+              </a:rPr>
+              <a:t>-</a:t>
+            </a:r>
+            <a:r>
+              <a:rPr lang="en-US" sz="4400" b="1" kern="1200" dirty="0" err="1" smtClean="0">
+                <a:solidFill>
+                  <a:schemeClr val="accent1"/>
+                </a:solidFill>
+                <a:effectLst/>
+                <a:latin typeface="+mj-lt"/>
+                <a:ea typeface="+mj-ea"/>
+                <a:cs typeface="+mj-cs"/>
+              </a:rPr>
+              <a:t>byebug</a:t>
+            </a:r>
+            <a:r>
+              <a:rPr lang="en-US" sz="4400" b="1" kern="1200" dirty="0" smtClean="0">
+                <a:solidFill>
+                  <a:schemeClr val="accent1"/>
+                </a:solidFill>
+                <a:effectLst/>
+                <a:latin typeface="+mj-lt"/>
+                <a:ea typeface="+mj-ea"/>
+                <a:cs typeface="+mj-cs"/>
+              </a:rPr>
+              <a:t> commands</a:t>
+            </a:r>
+            <a:endParaRPr lang="en-US" dirty="0"/>
+          </a:p>
+        </p:txBody>
+      </p:sp>
+      <p:sp>
+        <p:nvSpPr>
+          <p:cNvPr id="4" name="Footer Placeholder 3"/>
+          <p:cNvSpPr>
+            <a:spLocks noGrp="1"/>
+          </p:cNvSpPr>
+          <p:nvPr>
+            <p:ph type="ftr" sz="quarter" idx="3"/>
+          </p:nvPr>
+        </p:nvSpPr>
+        <p:spPr/>
+        <p:txBody>
+          <a:bodyPr/>
+          <a:lstStyle/>
+          <a:p>
+            <a:r>
+              <a:rPr lang="en-US" dirty="0" smtClean="0"/>
+              <a:t>HT- Debugging</a:t>
+            </a:r>
+            <a:endParaRPr lang="en-US" dirty="0"/>
+          </a:p>
+        </p:txBody>
+      </p:sp>
+      <p:sp>
+        <p:nvSpPr>
+          <p:cNvPr id="5" name="Rectangle 4"/>
+          <p:cNvSpPr/>
+          <p:nvPr/>
+        </p:nvSpPr>
+        <p:spPr>
+          <a:xfrm>
+            <a:off x="512063" y="1587333"/>
+            <a:ext cx="8229599" cy="4247317"/>
+          </a:xfrm>
+          <a:prstGeom prst="rect">
+            <a:avLst/>
+          </a:prstGeom>
+        </p:spPr>
+        <p:txBody>
+          <a:bodyPr wrap="square">
+            <a:spAutoFit/>
+          </a:bodyPr>
+          <a:lstStyle/>
+          <a:p>
+            <a:r>
+              <a:rPr lang="en-US" b="1" dirty="0"/>
+              <a:t>step</a:t>
+            </a:r>
+            <a:r>
+              <a:rPr lang="en-US" dirty="0"/>
+              <a:t>: Step execution into the next line or method. Takes an optional numeric argument to step multiple times.</a:t>
+            </a:r>
+          </a:p>
+          <a:p>
+            <a:endParaRPr lang="en-US" dirty="0"/>
+          </a:p>
+          <a:p>
+            <a:r>
+              <a:rPr lang="en-US" b="1" dirty="0"/>
+              <a:t>next</a:t>
+            </a:r>
+            <a:r>
+              <a:rPr lang="en-US" dirty="0"/>
+              <a:t>: Step over to the next line within the same frame. Also takes an optional numeric argument to step multiple lines.</a:t>
+            </a:r>
+          </a:p>
+          <a:p>
+            <a:endParaRPr lang="en-US" dirty="0"/>
+          </a:p>
+          <a:p>
+            <a:r>
+              <a:rPr lang="en-US" b="1" dirty="0"/>
+              <a:t>finish</a:t>
+            </a:r>
+            <a:r>
+              <a:rPr lang="en-US" dirty="0"/>
+              <a:t>: Execute until current stack frame returns.</a:t>
+            </a:r>
+          </a:p>
+          <a:p>
+            <a:endParaRPr lang="en-US" dirty="0"/>
+          </a:p>
+          <a:p>
+            <a:r>
+              <a:rPr lang="en-US" b="1" dirty="0"/>
+              <a:t>continue</a:t>
+            </a:r>
+            <a:r>
+              <a:rPr lang="en-US" dirty="0"/>
+              <a:t>: Continue program execution and end the Pry session.</a:t>
+            </a:r>
+          </a:p>
+          <a:p>
+            <a:endParaRPr lang="en-US" dirty="0"/>
+          </a:p>
+          <a:p>
+            <a:r>
+              <a:rPr lang="en-US" b="1" dirty="0"/>
+              <a:t>up</a:t>
+            </a:r>
+            <a:r>
+              <a:rPr lang="en-US" dirty="0"/>
+              <a:t>: Moves the stack frame up. Takes an optional numeric argument to move multiple frames.</a:t>
+            </a:r>
+          </a:p>
+          <a:p>
+            <a:endParaRPr lang="en-US" dirty="0"/>
+          </a:p>
+          <a:p>
+            <a:r>
+              <a:rPr lang="en-US" b="1" dirty="0"/>
+              <a:t>down</a:t>
+            </a:r>
+            <a:r>
+              <a:rPr lang="en-US" dirty="0"/>
+              <a:t>: Moves the stack frame down. Takes an optional numeric argument to move multiple frames</a:t>
+            </a:r>
+            <a:r>
+              <a:rPr lang="en-US" dirty="0" smtClean="0"/>
+              <a:t>.</a:t>
+            </a:r>
+            <a:endParaRPr lang="en-US" dirty="0"/>
+          </a:p>
+        </p:txBody>
+      </p:sp>
+    </p:spTree>
+    <p:extLst>
+      <p:ext uri="{BB962C8B-B14F-4D97-AF65-F5344CB8AC3E}">
+        <p14:creationId xmlns:p14="http://schemas.microsoft.com/office/powerpoint/2010/main" val="2802799744"/>
       </p:ext>
     </p:extLst>
   </p:cSld>
@@ -2914,7 +3995,1030 @@
 </p:sld>
 </file>
 
+<file path=ppt/slides/slide20.xml><?xml version="1.0" encoding="utf-8"?>
+<p:sld xmlns:a="http://schemas.openxmlformats.org/drawingml/2006/main" xmlns:r="http://schemas.openxmlformats.org/officeDocument/2006/relationships" xmlns:p="http://schemas.openxmlformats.org/presentationml/2006/main">
+  <p:cSld>
+    <p:bg>
+      <p:bgPr>
+        <a:solidFill>
+          <a:schemeClr val="bg1"/>
+        </a:solidFill>
+        <a:effectLst/>
+      </p:bgPr>
+    </p:bg>
+    <p:spTree>
+      <p:nvGrpSpPr>
+        <p:cNvPr id="1" name=""/>
+        <p:cNvGrpSpPr/>
+        <p:nvPr/>
+      </p:nvGrpSpPr>
+      <p:grpSpPr>
+        <a:xfrm>
+          <a:off x="0" y="0"/>
+          <a:ext cx="0" cy="0"/>
+          <a:chOff x="0" y="0"/>
+          <a:chExt cx="0" cy="0"/>
+        </a:xfrm>
+      </p:grpSpPr>
+      <p:sp>
+        <p:nvSpPr>
+          <p:cNvPr id="2" name="Title 1"/>
+          <p:cNvSpPr>
+            <a:spLocks noGrp="1"/>
+          </p:cNvSpPr>
+          <p:nvPr>
+            <p:ph type="title"/>
+          </p:nvPr>
+        </p:nvSpPr>
+        <p:spPr/>
+        <p:txBody>
+          <a:bodyPr/>
+          <a:lstStyle/>
+          <a:p>
+            <a:r>
+              <a:rPr lang="en-US" dirty="0" smtClean="0"/>
+              <a:t>pry</a:t>
+            </a:r>
+            <a:r>
+              <a:rPr lang="en-US" sz="4400" b="1" kern="1200" dirty="0" smtClean="0">
+                <a:solidFill>
+                  <a:schemeClr val="accent1"/>
+                </a:solidFill>
+                <a:effectLst/>
+                <a:latin typeface="+mj-lt"/>
+                <a:ea typeface="+mj-ea"/>
+                <a:cs typeface="+mj-cs"/>
+              </a:rPr>
+              <a:t>-</a:t>
+            </a:r>
+            <a:r>
+              <a:rPr lang="en-US" sz="4400" b="1" kern="1200" dirty="0" err="1" smtClean="0">
+                <a:solidFill>
+                  <a:schemeClr val="accent1"/>
+                </a:solidFill>
+                <a:effectLst/>
+                <a:latin typeface="+mj-lt"/>
+                <a:ea typeface="+mj-ea"/>
+                <a:cs typeface="+mj-cs"/>
+              </a:rPr>
+              <a:t>byebug</a:t>
+            </a:r>
+            <a:endParaRPr lang="en-US" dirty="0"/>
+          </a:p>
+        </p:txBody>
+      </p:sp>
+      <p:sp>
+        <p:nvSpPr>
+          <p:cNvPr id="4" name="Footer Placeholder 3"/>
+          <p:cNvSpPr>
+            <a:spLocks noGrp="1"/>
+          </p:cNvSpPr>
+          <p:nvPr>
+            <p:ph type="ftr" sz="quarter" idx="3"/>
+          </p:nvPr>
+        </p:nvSpPr>
+        <p:spPr/>
+        <p:txBody>
+          <a:bodyPr/>
+          <a:lstStyle/>
+          <a:p>
+            <a:r>
+              <a:rPr lang="en-US" dirty="0" smtClean="0"/>
+              <a:t>HT- Debugging</a:t>
+            </a:r>
+            <a:endParaRPr lang="en-US" dirty="0"/>
+          </a:p>
+        </p:txBody>
+      </p:sp>
+      <p:sp>
+        <p:nvSpPr>
+          <p:cNvPr id="3" name="Rectangle 2"/>
+          <p:cNvSpPr/>
+          <p:nvPr/>
+        </p:nvSpPr>
+        <p:spPr>
+          <a:xfrm>
+            <a:off x="512064" y="1732133"/>
+            <a:ext cx="8377585" cy="2554545"/>
+          </a:xfrm>
+          <a:prstGeom prst="rect">
+            <a:avLst/>
+          </a:prstGeom>
+        </p:spPr>
+        <p:txBody>
+          <a:bodyPr wrap="square">
+            <a:spAutoFit/>
+          </a:bodyPr>
+          <a:lstStyle/>
+          <a:p>
+            <a:r>
+              <a:rPr lang="en-US" sz="3200" dirty="0"/>
+              <a:t>gem install pry-</a:t>
+            </a:r>
+            <a:r>
+              <a:rPr lang="en-US" sz="3200" dirty="0" err="1" smtClean="0"/>
+              <a:t>byebug</a:t>
+            </a:r>
+            <a:endParaRPr lang="en-US" sz="3200" dirty="0" smtClean="0"/>
+          </a:p>
+          <a:p>
+            <a:endParaRPr lang="en-US" sz="3200" dirty="0"/>
+          </a:p>
+          <a:p>
+            <a:r>
+              <a:rPr lang="en-US" sz="3200" dirty="0"/>
+              <a:t>require "pry-</a:t>
+            </a:r>
+            <a:r>
+              <a:rPr lang="en-US" sz="3200" dirty="0" err="1" smtClean="0"/>
+              <a:t>byebug</a:t>
+            </a:r>
+            <a:r>
+              <a:rPr lang="en-US" sz="3200" dirty="0" smtClean="0"/>
+              <a:t>”</a:t>
+            </a:r>
+          </a:p>
+          <a:p>
+            <a:endParaRPr lang="en-US" sz="3200" dirty="0"/>
+          </a:p>
+          <a:p>
+            <a:r>
+              <a:rPr lang="en-US" sz="3200" dirty="0" err="1"/>
+              <a:t>binding.pry</a:t>
+            </a:r>
+            <a:r>
+              <a:rPr lang="en-US" sz="3200" dirty="0"/>
+              <a:t> to stop execution and enter the REPL</a:t>
+            </a:r>
+          </a:p>
+        </p:txBody>
+      </p:sp>
+    </p:spTree>
+    <p:extLst>
+      <p:ext uri="{BB962C8B-B14F-4D97-AF65-F5344CB8AC3E}">
+        <p14:creationId xmlns:p14="http://schemas.microsoft.com/office/powerpoint/2010/main" val="406319157"/>
+      </p:ext>
+    </p:extLst>
+  </p:cSld>
+  <p:clrMapOvr>
+    <a:masterClrMapping/>
+  </p:clrMapOvr>
+  <p:timing>
+    <p:tnLst>
+      <p:par>
+        <p:cTn xmlns:p14="http://schemas.microsoft.com/office/powerpoint/2010/main" id="1" dur="indefinite" restart="never" nodeType="tmRoot"/>
+      </p:par>
+    </p:tnLst>
+  </p:timing>
+</p:sld>
+</file>
+
+<file path=ppt/slides/slide21.xml><?xml version="1.0" encoding="utf-8"?>
+<p:sld xmlns:a="http://schemas.openxmlformats.org/drawingml/2006/main" xmlns:r="http://schemas.openxmlformats.org/officeDocument/2006/relationships" xmlns:p="http://schemas.openxmlformats.org/presentationml/2006/main">
+  <p:cSld>
+    <p:spTree>
+      <p:nvGrpSpPr>
+        <p:cNvPr id="1" name=""/>
+        <p:cNvGrpSpPr/>
+        <p:nvPr/>
+      </p:nvGrpSpPr>
+      <p:grpSpPr>
+        <a:xfrm>
+          <a:off x="0" y="0"/>
+          <a:ext cx="0" cy="0"/>
+          <a:chOff x="0" y="0"/>
+          <a:chExt cx="0" cy="0"/>
+        </a:xfrm>
+      </p:grpSpPr>
+      <p:sp>
+        <p:nvSpPr>
+          <p:cNvPr id="2" name="Title 1"/>
+          <p:cNvSpPr>
+            <a:spLocks noGrp="1"/>
+          </p:cNvSpPr>
+          <p:nvPr>
+            <p:ph type="title"/>
+          </p:nvPr>
+        </p:nvSpPr>
+        <p:spPr/>
+        <p:txBody>
+          <a:bodyPr/>
+          <a:lstStyle/>
+          <a:p>
+            <a:r>
+              <a:rPr lang="en-US" dirty="0" smtClean="0"/>
+              <a:t>Exceptions</a:t>
+            </a:r>
+            <a:endParaRPr lang="en-US" dirty="0"/>
+          </a:p>
+        </p:txBody>
+      </p:sp>
+      <p:sp>
+        <p:nvSpPr>
+          <p:cNvPr id="4" name="Footer Placeholder 3"/>
+          <p:cNvSpPr>
+            <a:spLocks noGrp="1"/>
+          </p:cNvSpPr>
+          <p:nvPr>
+            <p:ph type="ftr" sz="quarter" idx="3"/>
+          </p:nvPr>
+        </p:nvSpPr>
+        <p:spPr/>
+        <p:txBody>
+          <a:bodyPr/>
+          <a:lstStyle/>
+          <a:p>
+            <a:r>
+              <a:rPr lang="en-US" dirty="0" smtClean="0"/>
+              <a:t>HT- Debugging</a:t>
+            </a:r>
+            <a:endParaRPr lang="en-US" dirty="0"/>
+          </a:p>
+        </p:txBody>
+      </p:sp>
+      <p:sp>
+        <p:nvSpPr>
+          <p:cNvPr id="8" name="Rectangle 7"/>
+          <p:cNvSpPr/>
+          <p:nvPr/>
+        </p:nvSpPr>
+        <p:spPr>
+          <a:xfrm>
+            <a:off x="457200" y="1709076"/>
+            <a:ext cx="8229600" cy="3046988"/>
+          </a:xfrm>
+          <a:prstGeom prst="rect">
+            <a:avLst/>
+          </a:prstGeom>
+        </p:spPr>
+        <p:txBody>
+          <a:bodyPr wrap="square">
+            <a:spAutoFit/>
+          </a:bodyPr>
+          <a:lstStyle/>
+          <a:p>
+            <a:pPr marL="285750" indent="-285750">
+              <a:buFont typeface="Arial"/>
+              <a:buChar char="•"/>
+            </a:pPr>
+            <a:r>
+              <a:rPr lang="en-US" sz="3200" dirty="0"/>
+              <a:t>An instance of the Exception class</a:t>
+            </a:r>
+          </a:p>
+          <a:p>
+            <a:pPr marL="285750" indent="-285750">
+              <a:buFont typeface="Arial"/>
+              <a:buChar char="•"/>
+            </a:pPr>
+            <a:r>
+              <a:rPr lang="en-US" sz="3200" dirty="0"/>
+              <a:t>A raised exception will propagate through each method in the call stack until it is stopped or reaches the point where the program started</a:t>
+            </a:r>
+          </a:p>
+          <a:p>
+            <a:pPr marL="285750" indent="-285750">
+              <a:buFont typeface="Arial"/>
+              <a:buChar char="•"/>
+            </a:pPr>
+            <a:r>
+              <a:rPr lang="en-US" sz="3200" dirty="0"/>
+              <a:t>Raising and rescuing exceptions</a:t>
+            </a:r>
+          </a:p>
+        </p:txBody>
+      </p:sp>
+    </p:spTree>
+    <p:extLst>
+      <p:ext uri="{BB962C8B-B14F-4D97-AF65-F5344CB8AC3E}">
+        <p14:creationId xmlns:p14="http://schemas.microsoft.com/office/powerpoint/2010/main" val="650808683"/>
+      </p:ext>
+    </p:extLst>
+  </p:cSld>
+  <p:clrMapOvr>
+    <a:masterClrMapping/>
+  </p:clrMapOvr>
+  <p:timing>
+    <p:tnLst>
+      <p:par>
+        <p:cTn xmlns:p14="http://schemas.microsoft.com/office/powerpoint/2010/main" id="1" dur="indefinite" restart="never" nodeType="tmRoot"/>
+      </p:par>
+    </p:tnLst>
+  </p:timing>
+</p:sld>
+</file>
+
+<file path=ppt/slides/slide22.xml><?xml version="1.0" encoding="utf-8"?>
+<p:sld xmlns:a="http://schemas.openxmlformats.org/drawingml/2006/main" xmlns:r="http://schemas.openxmlformats.org/officeDocument/2006/relationships" xmlns:p="http://schemas.openxmlformats.org/presentationml/2006/main">
+  <p:cSld>
+    <p:spTree>
+      <p:nvGrpSpPr>
+        <p:cNvPr id="1" name=""/>
+        <p:cNvGrpSpPr/>
+        <p:nvPr/>
+      </p:nvGrpSpPr>
+      <p:grpSpPr>
+        <a:xfrm>
+          <a:off x="0" y="0"/>
+          <a:ext cx="0" cy="0"/>
+          <a:chOff x="0" y="0"/>
+          <a:chExt cx="0" cy="0"/>
+        </a:xfrm>
+      </p:grpSpPr>
+      <p:sp>
+        <p:nvSpPr>
+          <p:cNvPr id="2" name="Title 1"/>
+          <p:cNvSpPr>
+            <a:spLocks noGrp="1"/>
+          </p:cNvSpPr>
+          <p:nvPr>
+            <p:ph type="title"/>
+          </p:nvPr>
+        </p:nvSpPr>
+        <p:spPr/>
+        <p:txBody>
+          <a:bodyPr/>
+          <a:lstStyle/>
+          <a:p>
+            <a:r>
+              <a:rPr lang="en-US" sz="4400" b="1" kern="1200" dirty="0" smtClean="0">
+                <a:solidFill>
+                  <a:schemeClr val="accent1"/>
+                </a:solidFill>
+                <a:effectLst/>
+                <a:latin typeface="+mj-lt"/>
+                <a:ea typeface="+mj-ea"/>
+                <a:cs typeface="+mj-cs"/>
+              </a:rPr>
+              <a:t> Raise leads to Rescue</a:t>
+            </a:r>
+            <a:endParaRPr lang="en-US" dirty="0"/>
+          </a:p>
+        </p:txBody>
+      </p:sp>
+      <p:sp>
+        <p:nvSpPr>
+          <p:cNvPr id="4" name="Footer Placeholder 3"/>
+          <p:cNvSpPr>
+            <a:spLocks noGrp="1"/>
+          </p:cNvSpPr>
+          <p:nvPr>
+            <p:ph type="ftr" sz="quarter" idx="3"/>
+          </p:nvPr>
+        </p:nvSpPr>
+        <p:spPr/>
+        <p:txBody>
+          <a:bodyPr/>
+          <a:lstStyle/>
+          <a:p>
+            <a:r>
+              <a:rPr lang="en-US" dirty="0" smtClean="0"/>
+              <a:t>HT- Debugging</a:t>
+            </a:r>
+            <a:endParaRPr lang="en-US" dirty="0"/>
+          </a:p>
+        </p:txBody>
+      </p:sp>
+      <p:sp>
+        <p:nvSpPr>
+          <p:cNvPr id="7" name="TextBox 6"/>
+          <p:cNvSpPr txBox="1"/>
+          <p:nvPr/>
+        </p:nvSpPr>
+        <p:spPr>
+          <a:xfrm>
+            <a:off x="259762" y="1822592"/>
+            <a:ext cx="8741663" cy="3046988"/>
+          </a:xfrm>
+          <a:prstGeom prst="rect">
+            <a:avLst/>
+          </a:prstGeom>
+          <a:noFill/>
+        </p:spPr>
+        <p:txBody>
+          <a:bodyPr wrap="square" rtlCol="0">
+            <a:spAutoFit/>
+          </a:bodyPr>
+          <a:lstStyle/>
+          <a:p>
+            <a:r>
+              <a:rPr lang="en-US" sz="3200" dirty="0" smtClean="0"/>
+              <a:t>If we just had a raise with no conditions our code would never run.</a:t>
+            </a:r>
+          </a:p>
+          <a:p>
+            <a:endParaRPr lang="en-US" sz="3200" dirty="0"/>
+          </a:p>
+          <a:p>
+            <a:r>
+              <a:rPr lang="en-US" sz="3200" dirty="0" smtClean="0"/>
+              <a:t>Use a rescue to handle the error generated by raise and render user useful data back instead of a giant fail whale.</a:t>
+            </a:r>
+            <a:endParaRPr lang="en-US" sz="3200" dirty="0"/>
+          </a:p>
+        </p:txBody>
+      </p:sp>
+    </p:spTree>
+    <p:extLst>
+      <p:ext uri="{BB962C8B-B14F-4D97-AF65-F5344CB8AC3E}">
+        <p14:creationId xmlns:p14="http://schemas.microsoft.com/office/powerpoint/2010/main" val="3627005062"/>
+      </p:ext>
+    </p:extLst>
+  </p:cSld>
+  <p:clrMapOvr>
+    <a:masterClrMapping/>
+  </p:clrMapOvr>
+  <p:timing>
+    <p:tnLst>
+      <p:par>
+        <p:cTn xmlns:p14="http://schemas.microsoft.com/office/powerpoint/2010/main" id="1" dur="indefinite" restart="never" nodeType="tmRoot"/>
+      </p:par>
+    </p:tnLst>
+  </p:timing>
+</p:sld>
+</file>
+
+<file path=ppt/slides/slide23.xml><?xml version="1.0" encoding="utf-8"?>
+<p:sld xmlns:a="http://schemas.openxmlformats.org/drawingml/2006/main" xmlns:r="http://schemas.openxmlformats.org/officeDocument/2006/relationships" xmlns:p="http://schemas.openxmlformats.org/presentationml/2006/main">
+  <p:cSld>
+    <p:spTree>
+      <p:nvGrpSpPr>
+        <p:cNvPr id="1" name=""/>
+        <p:cNvGrpSpPr/>
+        <p:nvPr/>
+      </p:nvGrpSpPr>
+      <p:grpSpPr>
+        <a:xfrm>
+          <a:off x="0" y="0"/>
+          <a:ext cx="0" cy="0"/>
+          <a:chOff x="0" y="0"/>
+          <a:chExt cx="0" cy="0"/>
+        </a:xfrm>
+      </p:grpSpPr>
+      <p:sp>
+        <p:nvSpPr>
+          <p:cNvPr id="2" name="Title 1"/>
+          <p:cNvSpPr>
+            <a:spLocks noGrp="1"/>
+          </p:cNvSpPr>
+          <p:nvPr>
+            <p:ph type="title"/>
+          </p:nvPr>
+        </p:nvSpPr>
+        <p:spPr/>
+        <p:txBody>
+          <a:bodyPr/>
+          <a:lstStyle/>
+          <a:p>
+            <a:r>
+              <a:rPr lang="en-US" sz="4400" b="1" kern="1200" dirty="0" smtClean="0">
+                <a:solidFill>
+                  <a:schemeClr val="accent1"/>
+                </a:solidFill>
+                <a:effectLst/>
+                <a:latin typeface="+mj-lt"/>
+                <a:ea typeface="+mj-ea"/>
+                <a:cs typeface="+mj-cs"/>
+              </a:rPr>
+              <a:t>Rescue to the Rescue?</a:t>
+            </a:r>
+            <a:endParaRPr lang="en-US" dirty="0"/>
+          </a:p>
+        </p:txBody>
+      </p:sp>
+      <p:sp>
+        <p:nvSpPr>
+          <p:cNvPr id="4" name="Footer Placeholder 3"/>
+          <p:cNvSpPr>
+            <a:spLocks noGrp="1"/>
+          </p:cNvSpPr>
+          <p:nvPr>
+            <p:ph type="ftr" sz="quarter" idx="3"/>
+          </p:nvPr>
+        </p:nvSpPr>
+        <p:spPr/>
+        <p:txBody>
+          <a:bodyPr/>
+          <a:lstStyle/>
+          <a:p>
+            <a:r>
+              <a:rPr lang="en-US" dirty="0" smtClean="0"/>
+              <a:t>HT- Debugging</a:t>
+            </a:r>
+            <a:endParaRPr lang="en-US" dirty="0"/>
+          </a:p>
+        </p:txBody>
+      </p:sp>
+      <p:sp>
+        <p:nvSpPr>
+          <p:cNvPr id="7" name="TextBox 6"/>
+          <p:cNvSpPr txBox="1"/>
+          <p:nvPr/>
+        </p:nvSpPr>
+        <p:spPr>
+          <a:xfrm>
+            <a:off x="259762" y="1822592"/>
+            <a:ext cx="8741663" cy="1077218"/>
+          </a:xfrm>
+          <a:prstGeom prst="rect">
+            <a:avLst/>
+          </a:prstGeom>
+          <a:noFill/>
+        </p:spPr>
+        <p:txBody>
+          <a:bodyPr wrap="square" rtlCol="0">
+            <a:spAutoFit/>
+          </a:bodyPr>
+          <a:lstStyle/>
+          <a:p>
+            <a:r>
+              <a:rPr lang="en-US" sz="3200" dirty="0" smtClean="0"/>
+              <a:t>Careful:</a:t>
+            </a:r>
+          </a:p>
+          <a:p>
+            <a:r>
+              <a:rPr lang="en-US" sz="3200" dirty="0" smtClean="0"/>
+              <a:t>Rescue isn’t the bug free savior you might think</a:t>
+            </a:r>
+            <a:endParaRPr lang="en-US" sz="3200" dirty="0"/>
+          </a:p>
+        </p:txBody>
+      </p:sp>
+      <p:sp>
+        <p:nvSpPr>
+          <p:cNvPr id="3" name="Rectangle 2"/>
+          <p:cNvSpPr/>
+          <p:nvPr/>
+        </p:nvSpPr>
+        <p:spPr>
+          <a:xfrm>
+            <a:off x="1962650" y="4184787"/>
+            <a:ext cx="6061124" cy="369332"/>
+          </a:xfrm>
+          <a:prstGeom prst="rect">
+            <a:avLst/>
+          </a:prstGeom>
+        </p:spPr>
+        <p:txBody>
+          <a:bodyPr wrap="square">
+            <a:spAutoFit/>
+          </a:bodyPr>
+          <a:lstStyle/>
+          <a:p>
+            <a:r>
+              <a:rPr lang="en-US" dirty="0" smtClean="0">
+                <a:solidFill>
+                  <a:srgbClr val="0000FF"/>
+                </a:solidFill>
+                <a:hlinkClick r:id="rId2"/>
+              </a:rPr>
+              <a:t>Why You Should Never Rescue Exception in Ruby</a:t>
+            </a:r>
+            <a:endParaRPr lang="en-US" dirty="0">
+              <a:solidFill>
+                <a:srgbClr val="0000FF"/>
+              </a:solidFill>
+            </a:endParaRPr>
+          </a:p>
+        </p:txBody>
+      </p:sp>
+    </p:spTree>
+    <p:extLst>
+      <p:ext uri="{BB962C8B-B14F-4D97-AF65-F5344CB8AC3E}">
+        <p14:creationId xmlns:p14="http://schemas.microsoft.com/office/powerpoint/2010/main" val="44699507"/>
+      </p:ext>
+    </p:extLst>
+  </p:cSld>
+  <p:clrMapOvr>
+    <a:masterClrMapping/>
+  </p:clrMapOvr>
+  <p:timing>
+    <p:tnLst>
+      <p:par>
+        <p:cTn xmlns:p14="http://schemas.microsoft.com/office/powerpoint/2010/main" id="1" dur="indefinite" restart="never" nodeType="tmRoot"/>
+      </p:par>
+    </p:tnLst>
+  </p:timing>
+</p:sld>
+</file>
+
+<file path=ppt/slides/slide24.xml><?xml version="1.0" encoding="utf-8"?>
+<p:sld xmlns:a="http://schemas.openxmlformats.org/drawingml/2006/main" xmlns:r="http://schemas.openxmlformats.org/officeDocument/2006/relationships" xmlns:p="http://schemas.openxmlformats.org/presentationml/2006/main">
+  <p:cSld>
+    <p:spTree>
+      <p:nvGrpSpPr>
+        <p:cNvPr id="1" name=""/>
+        <p:cNvGrpSpPr/>
+        <p:nvPr/>
+      </p:nvGrpSpPr>
+      <p:grpSpPr>
+        <a:xfrm>
+          <a:off x="0" y="0"/>
+          <a:ext cx="0" cy="0"/>
+          <a:chOff x="0" y="0"/>
+          <a:chExt cx="0" cy="0"/>
+        </a:xfrm>
+      </p:grpSpPr>
+      <p:sp>
+        <p:nvSpPr>
+          <p:cNvPr id="2" name="Title 1"/>
+          <p:cNvSpPr>
+            <a:spLocks noGrp="1"/>
+          </p:cNvSpPr>
+          <p:nvPr>
+            <p:ph type="title"/>
+          </p:nvPr>
+        </p:nvSpPr>
+        <p:spPr/>
+        <p:txBody>
+          <a:bodyPr/>
+          <a:lstStyle/>
+          <a:p>
+            <a:r>
+              <a:rPr lang="en-US" sz="4400" b="1" kern="1200" dirty="0" smtClean="0">
+                <a:solidFill>
+                  <a:schemeClr val="accent1"/>
+                </a:solidFill>
+                <a:effectLst/>
+                <a:latin typeface="+mj-lt"/>
+                <a:ea typeface="+mj-ea"/>
+                <a:cs typeface="+mj-cs"/>
+              </a:rPr>
+              <a:t>Debugging </a:t>
+            </a:r>
+            <a:r>
+              <a:rPr lang="en-US" sz="4400" b="1" kern="1200" dirty="0" err="1" smtClean="0">
+                <a:solidFill>
+                  <a:schemeClr val="accent1"/>
+                </a:solidFill>
+                <a:effectLst/>
+                <a:latin typeface="+mj-lt"/>
+                <a:ea typeface="+mj-ea"/>
+                <a:cs typeface="+mj-cs"/>
+              </a:rPr>
+              <a:t>Wrapup</a:t>
+            </a:r>
+            <a:endParaRPr lang="en-US" dirty="0"/>
+          </a:p>
+        </p:txBody>
+      </p:sp>
+      <p:sp>
+        <p:nvSpPr>
+          <p:cNvPr id="4" name="Footer Placeholder 3"/>
+          <p:cNvSpPr>
+            <a:spLocks noGrp="1"/>
+          </p:cNvSpPr>
+          <p:nvPr>
+            <p:ph type="ftr" sz="quarter" idx="3"/>
+          </p:nvPr>
+        </p:nvSpPr>
+        <p:spPr/>
+        <p:txBody>
+          <a:bodyPr/>
+          <a:lstStyle/>
+          <a:p>
+            <a:r>
+              <a:rPr lang="en-US" dirty="0" smtClean="0"/>
+              <a:t>HT- Debugging</a:t>
+            </a:r>
+            <a:endParaRPr lang="en-US" dirty="0"/>
+          </a:p>
+        </p:txBody>
+      </p:sp>
+      <p:sp>
+        <p:nvSpPr>
+          <p:cNvPr id="7" name="TextBox 6"/>
+          <p:cNvSpPr txBox="1"/>
+          <p:nvPr/>
+        </p:nvSpPr>
+        <p:spPr>
+          <a:xfrm>
+            <a:off x="3296550" y="2996474"/>
+            <a:ext cx="2986214" cy="830997"/>
+          </a:xfrm>
+          <a:prstGeom prst="rect">
+            <a:avLst/>
+          </a:prstGeom>
+          <a:noFill/>
+        </p:spPr>
+        <p:txBody>
+          <a:bodyPr wrap="none" rtlCol="0">
+            <a:spAutoFit/>
+          </a:bodyPr>
+          <a:lstStyle/>
+          <a:p>
+            <a:r>
+              <a:rPr lang="en-US" sz="4800" dirty="0" smtClean="0"/>
+              <a:t>Questions?</a:t>
+            </a:r>
+            <a:endParaRPr lang="en-US" sz="4800" dirty="0"/>
+          </a:p>
+        </p:txBody>
+      </p:sp>
+    </p:spTree>
+    <p:extLst>
+      <p:ext uri="{BB962C8B-B14F-4D97-AF65-F5344CB8AC3E}">
+        <p14:creationId xmlns:p14="http://schemas.microsoft.com/office/powerpoint/2010/main" val="791299107"/>
+      </p:ext>
+    </p:extLst>
+  </p:cSld>
+  <p:clrMapOvr>
+    <a:masterClrMapping/>
+  </p:clrMapOvr>
+  <p:timing>
+    <p:tnLst>
+      <p:par>
+        <p:cTn xmlns:p14="http://schemas.microsoft.com/office/powerpoint/2010/main" id="1" dur="indefinite" restart="never" nodeType="tmRoot"/>
+      </p:par>
+    </p:tnLst>
+  </p:timing>
+</p:sld>
+</file>
+
+<file path=ppt/slides/slide25.xml><?xml version="1.0" encoding="utf-8"?>
+<p:sld xmlns:a="http://schemas.openxmlformats.org/drawingml/2006/main" xmlns:r="http://schemas.openxmlformats.org/officeDocument/2006/relationships" xmlns:p="http://schemas.openxmlformats.org/presentationml/2006/main">
+  <p:cSld>
+    <p:spTree>
+      <p:nvGrpSpPr>
+        <p:cNvPr id="1" name=""/>
+        <p:cNvGrpSpPr/>
+        <p:nvPr/>
+      </p:nvGrpSpPr>
+      <p:grpSpPr>
+        <a:xfrm>
+          <a:off x="0" y="0"/>
+          <a:ext cx="0" cy="0"/>
+          <a:chOff x="0" y="0"/>
+          <a:chExt cx="0" cy="0"/>
+        </a:xfrm>
+      </p:grpSpPr>
+      <p:sp>
+        <p:nvSpPr>
+          <p:cNvPr id="2" name="Title 1"/>
+          <p:cNvSpPr>
+            <a:spLocks noGrp="1"/>
+          </p:cNvSpPr>
+          <p:nvPr>
+            <p:ph type="title"/>
+          </p:nvPr>
+        </p:nvSpPr>
+        <p:spPr/>
+        <p:txBody>
+          <a:bodyPr/>
+          <a:lstStyle/>
+          <a:p>
+            <a:r>
+              <a:rPr lang="en-US" dirty="0" smtClean="0"/>
+              <a:t>Sweet Links</a:t>
+            </a:r>
+            <a:endParaRPr lang="en-US" dirty="0"/>
+          </a:p>
+        </p:txBody>
+      </p:sp>
+      <p:sp>
+        <p:nvSpPr>
+          <p:cNvPr id="4" name="Footer Placeholder 3"/>
+          <p:cNvSpPr>
+            <a:spLocks noGrp="1"/>
+          </p:cNvSpPr>
+          <p:nvPr>
+            <p:ph type="ftr" sz="quarter" idx="3"/>
+          </p:nvPr>
+        </p:nvSpPr>
+        <p:spPr/>
+        <p:txBody>
+          <a:bodyPr/>
+          <a:lstStyle/>
+          <a:p>
+            <a:r>
+              <a:rPr lang="en-US" dirty="0" smtClean="0"/>
+              <a:t>HT- Debugging</a:t>
+            </a:r>
+            <a:endParaRPr lang="en-US" dirty="0"/>
+          </a:p>
+        </p:txBody>
+      </p:sp>
+      <p:sp>
+        <p:nvSpPr>
+          <p:cNvPr id="7" name="TextBox 6"/>
+          <p:cNvSpPr txBox="1"/>
+          <p:nvPr/>
+        </p:nvSpPr>
+        <p:spPr>
+          <a:xfrm>
+            <a:off x="1952821" y="1652565"/>
+            <a:ext cx="5455941" cy="1569660"/>
+          </a:xfrm>
+          <a:prstGeom prst="rect">
+            <a:avLst/>
+          </a:prstGeom>
+          <a:noFill/>
+        </p:spPr>
+        <p:txBody>
+          <a:bodyPr wrap="none" rtlCol="0">
+            <a:spAutoFit/>
+          </a:bodyPr>
+          <a:lstStyle/>
+          <a:p>
+            <a:r>
+              <a:rPr lang="en-US" sz="4800" dirty="0" smtClean="0">
+                <a:hlinkClick r:id="rId2"/>
+              </a:rPr>
+              <a:t>Pry Usage (youtube)</a:t>
+            </a:r>
+            <a:endParaRPr lang="en-US" sz="4800" dirty="0" smtClean="0"/>
+          </a:p>
+          <a:p>
+            <a:r>
+              <a:rPr lang="en-US" sz="4800" dirty="0" smtClean="0">
+                <a:hlinkClick r:id="rId3"/>
+              </a:rPr>
+              <a:t>Replace IRB </a:t>
+            </a:r>
+            <a:r>
+              <a:rPr lang="en-US" sz="4800" smtClean="0">
+                <a:hlinkClick r:id="rId3"/>
+              </a:rPr>
+              <a:t>with PRY</a:t>
+            </a:r>
+            <a:endParaRPr lang="en-US" sz="4800" dirty="0" smtClean="0"/>
+          </a:p>
+        </p:txBody>
+      </p:sp>
+    </p:spTree>
+    <p:extLst>
+      <p:ext uri="{BB962C8B-B14F-4D97-AF65-F5344CB8AC3E}">
+        <p14:creationId xmlns:p14="http://schemas.microsoft.com/office/powerpoint/2010/main" val="3076589042"/>
+      </p:ext>
+    </p:extLst>
+  </p:cSld>
+  <p:clrMapOvr>
+    <a:masterClrMapping/>
+  </p:clrMapOvr>
+  <p:timing>
+    <p:tnLst>
+      <p:par>
+        <p:cTn xmlns:p14="http://schemas.microsoft.com/office/powerpoint/2010/main" id="1" dur="indefinite" restart="never" nodeType="tmRoot"/>
+      </p:par>
+    </p:tnLst>
+  </p:timing>
+</p:sld>
+</file>
+
 <file path=ppt/slides/slide3.xml><?xml version="1.0" encoding="utf-8"?>
+<p:sld xmlns:a="http://schemas.openxmlformats.org/drawingml/2006/main" xmlns:r="http://schemas.openxmlformats.org/officeDocument/2006/relationships" xmlns:p="http://schemas.openxmlformats.org/presentationml/2006/main">
+  <p:cSld>
+    <p:spTree>
+      <p:nvGrpSpPr>
+        <p:cNvPr id="1" name=""/>
+        <p:cNvGrpSpPr/>
+        <p:nvPr/>
+      </p:nvGrpSpPr>
+      <p:grpSpPr>
+        <a:xfrm>
+          <a:off x="0" y="0"/>
+          <a:ext cx="0" cy="0"/>
+          <a:chOff x="0" y="0"/>
+          <a:chExt cx="0" cy="0"/>
+        </a:xfrm>
+      </p:grpSpPr>
+      <p:sp>
+        <p:nvSpPr>
+          <p:cNvPr id="2" name="Title 1"/>
+          <p:cNvSpPr>
+            <a:spLocks noGrp="1"/>
+          </p:cNvSpPr>
+          <p:nvPr>
+            <p:ph type="title"/>
+          </p:nvPr>
+        </p:nvSpPr>
+        <p:spPr/>
+        <p:txBody>
+          <a:bodyPr/>
+          <a:lstStyle/>
+          <a:p>
+            <a:r>
+              <a:rPr lang="en-US" dirty="0" smtClean="0"/>
+              <a:t>Why you care</a:t>
+            </a:r>
+            <a:endParaRPr lang="en-US" dirty="0"/>
+          </a:p>
+        </p:txBody>
+      </p:sp>
+      <p:sp>
+        <p:nvSpPr>
+          <p:cNvPr id="3" name="Content Placeholder 2"/>
+          <p:cNvSpPr>
+            <a:spLocks noGrp="1"/>
+          </p:cNvSpPr>
+          <p:nvPr>
+            <p:ph idx="1"/>
+          </p:nvPr>
+        </p:nvSpPr>
+        <p:spPr/>
+        <p:txBody>
+          <a:bodyPr/>
+          <a:lstStyle/>
+          <a:p>
+            <a:r>
+              <a:rPr lang="en-US" dirty="0" smtClean="0"/>
+              <a:t>80% of your time as a </a:t>
+            </a:r>
+            <a:r>
+              <a:rPr lang="en-US" dirty="0" err="1" smtClean="0"/>
+              <a:t>dev</a:t>
+            </a:r>
+            <a:r>
+              <a:rPr lang="en-US" dirty="0" smtClean="0"/>
+              <a:t> is spent </a:t>
+            </a:r>
+            <a:br>
+              <a:rPr lang="en-US" dirty="0" smtClean="0"/>
+            </a:br>
+            <a:r>
+              <a:rPr lang="en-US" dirty="0" smtClean="0"/>
+              <a:t>READING CODE</a:t>
+            </a:r>
+          </a:p>
+          <a:p>
+            <a:endParaRPr lang="en-US" dirty="0" smtClean="0"/>
+          </a:p>
+          <a:p>
+            <a:r>
+              <a:rPr lang="en-US" dirty="0"/>
+              <a:t>60% of </a:t>
+            </a:r>
+            <a:r>
+              <a:rPr lang="en-US" dirty="0" smtClean="0"/>
+              <a:t>that time is </a:t>
+            </a:r>
+            <a:r>
+              <a:rPr lang="en-US" dirty="0"/>
+              <a:t>spent </a:t>
+            </a:r>
+            <a:r>
+              <a:rPr lang="en-US" dirty="0" smtClean="0"/>
+              <a:t/>
+            </a:r>
+            <a:br>
+              <a:rPr lang="en-US" dirty="0" smtClean="0"/>
+            </a:br>
+            <a:r>
+              <a:rPr lang="en-US" dirty="0" smtClean="0"/>
+              <a:t>DEBUGGING</a:t>
+            </a:r>
+            <a:endParaRPr lang="en-US" dirty="0"/>
+          </a:p>
+          <a:p>
+            <a:endParaRPr lang="en-US" dirty="0"/>
+          </a:p>
+        </p:txBody>
+      </p:sp>
+      <p:sp>
+        <p:nvSpPr>
+          <p:cNvPr id="4" name="Footer Placeholder 3"/>
+          <p:cNvSpPr>
+            <a:spLocks noGrp="1"/>
+          </p:cNvSpPr>
+          <p:nvPr>
+            <p:ph type="ftr" sz="quarter" idx="3"/>
+          </p:nvPr>
+        </p:nvSpPr>
+        <p:spPr/>
+        <p:txBody>
+          <a:bodyPr/>
+          <a:lstStyle/>
+          <a:p>
+            <a:r>
+              <a:rPr lang="en-US" dirty="0" smtClean="0"/>
+              <a:t>HT- Debugging</a:t>
+            </a:r>
+            <a:endParaRPr lang="en-US" dirty="0"/>
+          </a:p>
+        </p:txBody>
+      </p:sp>
+    </p:spTree>
+    <p:extLst>
+      <p:ext uri="{BB962C8B-B14F-4D97-AF65-F5344CB8AC3E}">
+        <p14:creationId xmlns:p14="http://schemas.microsoft.com/office/powerpoint/2010/main" val="4202836584"/>
+      </p:ext>
+    </p:extLst>
+  </p:cSld>
+  <p:clrMapOvr>
+    <a:masterClrMapping/>
+  </p:clrMapOvr>
+  <p:timing>
+    <p:tnLst>
+      <p:par>
+        <p:cTn xmlns:p14="http://schemas.microsoft.com/office/powerpoint/2010/main" id="1" dur="indefinite" restart="never" nodeType="tmRoot"/>
+      </p:par>
+    </p:tnLst>
+  </p:timing>
+</p:sld>
+</file>
+
+<file path=ppt/slides/slide4.xml><?xml version="1.0" encoding="utf-8"?>
 <p:sld xmlns:a="http://schemas.openxmlformats.org/drawingml/2006/main" xmlns:r="http://schemas.openxmlformats.org/officeDocument/2006/relationships" xmlns:p="http://schemas.openxmlformats.org/presentationml/2006/main">
   <p:cSld>
     <p:spTree>
@@ -3021,7 +5125,165 @@
 </p:sld>
 </file>
 
-<file path=ppt/slides/slide4.xml><?xml version="1.0" encoding="utf-8"?>
+<file path=ppt/slides/slide5.xml><?xml version="1.0" encoding="utf-8"?>
+<p:sld xmlns:a="http://schemas.openxmlformats.org/drawingml/2006/main" xmlns:r="http://schemas.openxmlformats.org/officeDocument/2006/relationships" xmlns:p="http://schemas.openxmlformats.org/presentationml/2006/main">
+  <p:cSld>
+    <p:spTree>
+      <p:nvGrpSpPr>
+        <p:cNvPr id="1" name=""/>
+        <p:cNvGrpSpPr/>
+        <p:nvPr/>
+      </p:nvGrpSpPr>
+      <p:grpSpPr>
+        <a:xfrm>
+          <a:off x="0" y="0"/>
+          <a:ext cx="0" cy="0"/>
+          <a:chOff x="0" y="0"/>
+          <a:chExt cx="0" cy="0"/>
+        </a:xfrm>
+      </p:grpSpPr>
+      <p:sp>
+        <p:nvSpPr>
+          <p:cNvPr id="2" name="Title 1"/>
+          <p:cNvSpPr>
+            <a:spLocks noGrp="1"/>
+          </p:cNvSpPr>
+          <p:nvPr>
+            <p:ph type="title"/>
+          </p:nvPr>
+        </p:nvSpPr>
+        <p:spPr/>
+        <p:txBody>
+          <a:bodyPr/>
+          <a:lstStyle/>
+          <a:p>
+            <a:r>
+              <a:rPr lang="en-US" dirty="0" smtClean="0"/>
+              <a:t>Gen Knowledge</a:t>
+            </a:r>
+            <a:endParaRPr lang="en-US" dirty="0"/>
+          </a:p>
+        </p:txBody>
+      </p:sp>
+      <p:sp>
+        <p:nvSpPr>
+          <p:cNvPr id="4" name="Footer Placeholder 3"/>
+          <p:cNvSpPr>
+            <a:spLocks noGrp="1"/>
+          </p:cNvSpPr>
+          <p:nvPr>
+            <p:ph type="ftr" sz="quarter" idx="3"/>
+          </p:nvPr>
+        </p:nvSpPr>
+        <p:spPr/>
+        <p:txBody>
+          <a:bodyPr/>
+          <a:lstStyle/>
+          <a:p>
+            <a:r>
+              <a:rPr lang="en-US" dirty="0" smtClean="0"/>
+              <a:t>HT- Debugging</a:t>
+            </a:r>
+            <a:endParaRPr lang="en-US" dirty="0"/>
+          </a:p>
+        </p:txBody>
+      </p:sp>
+      <p:sp>
+        <p:nvSpPr>
+          <p:cNvPr id="3" name="Rectangle 2"/>
+          <p:cNvSpPr/>
+          <p:nvPr/>
+        </p:nvSpPr>
+        <p:spPr>
+          <a:xfrm>
+            <a:off x="457200" y="1501406"/>
+            <a:ext cx="8229600" cy="4524315"/>
+          </a:xfrm>
+          <a:prstGeom prst="rect">
+            <a:avLst/>
+          </a:prstGeom>
+        </p:spPr>
+        <p:txBody>
+          <a:bodyPr wrap="square">
+            <a:spAutoFit/>
+          </a:bodyPr>
+          <a:lstStyle/>
+          <a:p>
+            <a:pPr marL="285750" indent="-285750">
+              <a:buFont typeface="Arial"/>
+              <a:buChar char="•"/>
+            </a:pPr>
+            <a:r>
+              <a:rPr lang="en-US" sz="3200" dirty="0" smtClean="0"/>
+              <a:t>BUG: Whenever </a:t>
+            </a:r>
+            <a:r>
+              <a:rPr lang="en-US" sz="3200" dirty="0"/>
+              <a:t>a program/system is not behaving the way we </a:t>
+            </a:r>
+            <a:r>
+              <a:rPr lang="en-US" sz="3200" dirty="0" smtClean="0"/>
+              <a:t>expect</a:t>
+            </a:r>
+            <a:endParaRPr lang="en-US" sz="3200" dirty="0"/>
+          </a:p>
+          <a:p>
+            <a:pPr marL="285750" indent="-285750">
+              <a:buFont typeface="Arial"/>
+              <a:buChar char="•"/>
+            </a:pPr>
+            <a:r>
+              <a:rPr lang="en-US" sz="3200" dirty="0" smtClean="0"/>
+              <a:t>Debugging </a:t>
+            </a:r>
+            <a:r>
+              <a:rPr lang="en-US" sz="3200" dirty="0"/>
+              <a:t>is the process of figuring out the source of the error and fixing it.</a:t>
+            </a:r>
+          </a:p>
+          <a:p>
+            <a:pPr marL="285750" indent="-285750">
+              <a:buFont typeface="Arial"/>
+              <a:buChar char="•"/>
+            </a:pPr>
+            <a:r>
+              <a:rPr lang="en-US" sz="3200" dirty="0"/>
+              <a:t>I think of it as the disconnect between my assumptions and what the code is actually doing.</a:t>
+            </a:r>
+          </a:p>
+          <a:p>
+            <a:pPr marL="285750" indent="-285750">
+              <a:buFont typeface="Arial"/>
+              <a:buChar char="•"/>
+            </a:pPr>
+            <a:r>
+              <a:rPr lang="en-US" sz="3200" dirty="0"/>
+              <a:t>It's a skill, so you'll need to practice it. This is another great reason to help your peers.</a:t>
+            </a:r>
+          </a:p>
+        </p:txBody>
+      </p:sp>
+    </p:spTree>
+    <p:extLst>
+      <p:ext uri="{BB962C8B-B14F-4D97-AF65-F5344CB8AC3E}">
+        <p14:creationId xmlns:p14="http://schemas.microsoft.com/office/powerpoint/2010/main" val="3373590480"/>
+      </p:ext>
+    </p:extLst>
+  </p:cSld>
+  <p:clrMapOvr>
+    <a:masterClrMapping/>
+  </p:clrMapOvr>
+  <p:timing>
+    <p:tnLst>
+      <p:par>
+        <p:cTn xmlns:p14="http://schemas.microsoft.com/office/powerpoint/2010/main" id="1" dur="indefinite" restart="never" nodeType="tmRoot"/>
+      </p:par>
+    </p:tnLst>
+  </p:timing>
+</p:sld>
+</file>
+
+<file path=ppt/slides/slide6.xml><?xml version="1.0" encoding="utf-8"?>
 <p:sld xmlns:a="http://schemas.openxmlformats.org/drawingml/2006/main" xmlns:r="http://schemas.openxmlformats.org/officeDocument/2006/relationships" xmlns:p="http://schemas.openxmlformats.org/presentationml/2006/main">
   <p:cSld>
     <p:spTree>
@@ -3134,299 +5396,6 @@
 </p:sld>
 </file>
 
-<file path=ppt/slides/slide5.xml><?xml version="1.0" encoding="utf-8"?>
-<p:sld xmlns:a="http://schemas.openxmlformats.org/drawingml/2006/main" xmlns:r="http://schemas.openxmlformats.org/officeDocument/2006/relationships" xmlns:p="http://schemas.openxmlformats.org/presentationml/2006/main">
-  <p:cSld>
-    <p:spTree>
-      <p:nvGrpSpPr>
-        <p:cNvPr id="1" name=""/>
-        <p:cNvGrpSpPr/>
-        <p:nvPr/>
-      </p:nvGrpSpPr>
-      <p:grpSpPr>
-        <a:xfrm>
-          <a:off x="0" y="0"/>
-          <a:ext cx="0" cy="0"/>
-          <a:chOff x="0" y="0"/>
-          <a:chExt cx="0" cy="0"/>
-        </a:xfrm>
-      </p:grpSpPr>
-      <p:sp>
-        <p:nvSpPr>
-          <p:cNvPr id="2" name="Title 1"/>
-          <p:cNvSpPr>
-            <a:spLocks noGrp="1"/>
-          </p:cNvSpPr>
-          <p:nvPr>
-            <p:ph type="title"/>
-          </p:nvPr>
-        </p:nvSpPr>
-        <p:spPr/>
-        <p:txBody>
-          <a:bodyPr/>
-          <a:lstStyle/>
-          <a:p>
-            <a:r>
-              <a:rPr lang="en-US" dirty="0" smtClean="0"/>
-              <a:t>Error Messages</a:t>
-            </a:r>
-            <a:endParaRPr lang="en-US" dirty="0"/>
-          </a:p>
-        </p:txBody>
-      </p:sp>
-      <p:sp>
-        <p:nvSpPr>
-          <p:cNvPr id="4" name="Footer Placeholder 3"/>
-          <p:cNvSpPr>
-            <a:spLocks noGrp="1"/>
-          </p:cNvSpPr>
-          <p:nvPr>
-            <p:ph type="ftr" sz="quarter" idx="3"/>
-          </p:nvPr>
-        </p:nvSpPr>
-        <p:spPr/>
-        <p:txBody>
-          <a:bodyPr/>
-          <a:lstStyle/>
-          <a:p>
-            <a:r>
-              <a:rPr lang="en-US" dirty="0" smtClean="0"/>
-              <a:t>HT- Debugging</a:t>
-            </a:r>
-            <a:endParaRPr lang="en-US" dirty="0"/>
-          </a:p>
-        </p:txBody>
-      </p:sp>
-      <p:sp>
-        <p:nvSpPr>
-          <p:cNvPr id="3" name="TextBox 2"/>
-          <p:cNvSpPr txBox="1"/>
-          <p:nvPr/>
-        </p:nvSpPr>
-        <p:spPr>
-          <a:xfrm>
-            <a:off x="2049237" y="1875939"/>
-            <a:ext cx="4748014" cy="2554545"/>
-          </a:xfrm>
-          <a:prstGeom prst="rect">
-            <a:avLst/>
-          </a:prstGeom>
-          <a:noFill/>
-        </p:spPr>
-        <p:txBody>
-          <a:bodyPr wrap="none" rtlCol="0">
-            <a:spAutoFit/>
-          </a:bodyPr>
-          <a:lstStyle/>
-          <a:p>
-            <a:r>
-              <a:rPr lang="en-US" sz="3200" dirty="0" smtClean="0"/>
-              <a:t>The First rule of debugging:</a:t>
-            </a:r>
-          </a:p>
-          <a:p>
-            <a:endParaRPr lang="en-US" sz="3200" dirty="0" smtClean="0"/>
-          </a:p>
-          <a:p>
-            <a:pPr marL="457200" indent="-457200">
-              <a:buFont typeface="Arial"/>
-              <a:buChar char="•"/>
-            </a:pPr>
-            <a:r>
-              <a:rPr lang="en-US" sz="3200" dirty="0" smtClean="0"/>
-              <a:t>Read the error message!</a:t>
-            </a:r>
-          </a:p>
-          <a:p>
-            <a:endParaRPr lang="en-US" sz="3200" dirty="0" smtClean="0"/>
-          </a:p>
-          <a:p>
-            <a:endParaRPr lang="en-US" sz="3200" dirty="0"/>
-          </a:p>
-        </p:txBody>
-      </p:sp>
-    </p:spTree>
-    <p:extLst>
-      <p:ext uri="{BB962C8B-B14F-4D97-AF65-F5344CB8AC3E}">
-        <p14:creationId xmlns:p14="http://schemas.microsoft.com/office/powerpoint/2010/main" val="3883953552"/>
-      </p:ext>
-    </p:extLst>
-  </p:cSld>
-  <p:clrMapOvr>
-    <a:masterClrMapping/>
-  </p:clrMapOvr>
-  <p:timing>
-    <p:tnLst>
-      <p:par>
-        <p:cTn xmlns:p14="http://schemas.microsoft.com/office/powerpoint/2010/main" id="1" dur="indefinite" restart="never" nodeType="tmRoot"/>
-      </p:par>
-    </p:tnLst>
-  </p:timing>
-</p:sld>
-</file>
-
-<file path=ppt/slides/slide6.xml><?xml version="1.0" encoding="utf-8"?>
-<p:sld xmlns:a="http://schemas.openxmlformats.org/drawingml/2006/main" xmlns:r="http://schemas.openxmlformats.org/officeDocument/2006/relationships" xmlns:p="http://schemas.openxmlformats.org/presentationml/2006/main">
-  <p:cSld>
-    <p:spTree>
-      <p:nvGrpSpPr>
-        <p:cNvPr id="1" name=""/>
-        <p:cNvGrpSpPr/>
-        <p:nvPr/>
-      </p:nvGrpSpPr>
-      <p:grpSpPr>
-        <a:xfrm>
-          <a:off x="0" y="0"/>
-          <a:ext cx="0" cy="0"/>
-          <a:chOff x="0" y="0"/>
-          <a:chExt cx="0" cy="0"/>
-        </a:xfrm>
-      </p:grpSpPr>
-      <p:sp>
-        <p:nvSpPr>
-          <p:cNvPr id="2" name="Title 1"/>
-          <p:cNvSpPr>
-            <a:spLocks noGrp="1"/>
-          </p:cNvSpPr>
-          <p:nvPr>
-            <p:ph type="title"/>
-          </p:nvPr>
-        </p:nvSpPr>
-        <p:spPr/>
-        <p:txBody>
-          <a:bodyPr/>
-          <a:lstStyle/>
-          <a:p>
-            <a:r>
-              <a:rPr lang="en-US" dirty="0" smtClean="0"/>
-              <a:t>Error Messages</a:t>
-            </a:r>
-            <a:endParaRPr lang="en-US" dirty="0"/>
-          </a:p>
-        </p:txBody>
-      </p:sp>
-      <p:sp>
-        <p:nvSpPr>
-          <p:cNvPr id="4" name="Footer Placeholder 3"/>
-          <p:cNvSpPr>
-            <a:spLocks noGrp="1"/>
-          </p:cNvSpPr>
-          <p:nvPr>
-            <p:ph type="ftr" sz="quarter" idx="3"/>
-          </p:nvPr>
-        </p:nvSpPr>
-        <p:spPr/>
-        <p:txBody>
-          <a:bodyPr/>
-          <a:lstStyle/>
-          <a:p>
-            <a:r>
-              <a:rPr lang="en-US" dirty="0" smtClean="0"/>
-              <a:t>HT- Debugging</a:t>
-            </a:r>
-            <a:endParaRPr lang="en-US" dirty="0"/>
-          </a:p>
-        </p:txBody>
-      </p:sp>
-      <p:sp>
-        <p:nvSpPr>
-          <p:cNvPr id="3" name="TextBox 2"/>
-          <p:cNvSpPr txBox="1"/>
-          <p:nvPr/>
-        </p:nvSpPr>
-        <p:spPr>
-          <a:xfrm>
-            <a:off x="2049237" y="1875939"/>
-            <a:ext cx="5238133" cy="4031873"/>
-          </a:xfrm>
-          <a:prstGeom prst="rect">
-            <a:avLst/>
-          </a:prstGeom>
-          <a:noFill/>
-        </p:spPr>
-        <p:txBody>
-          <a:bodyPr wrap="none" rtlCol="0">
-            <a:spAutoFit/>
-          </a:bodyPr>
-          <a:lstStyle/>
-          <a:p>
-            <a:r>
-              <a:rPr lang="en-US" sz="3200" dirty="0" smtClean="0"/>
-              <a:t>The First rule of debugging:</a:t>
-            </a:r>
-          </a:p>
-          <a:p>
-            <a:endParaRPr lang="en-US" sz="3200" dirty="0" smtClean="0"/>
-          </a:p>
-          <a:p>
-            <a:pPr marL="457200" indent="-457200">
-              <a:buFont typeface="Arial"/>
-              <a:buChar char="•"/>
-            </a:pPr>
-            <a:r>
-              <a:rPr lang="en-US" sz="3200" dirty="0" smtClean="0"/>
-              <a:t>Read the error message!</a:t>
-            </a:r>
-          </a:p>
-          <a:p>
-            <a:endParaRPr lang="en-US" sz="3200" dirty="0" smtClean="0"/>
-          </a:p>
-          <a:p>
-            <a:r>
-              <a:rPr lang="en-US" sz="3200" dirty="0"/>
-              <a:t>The </a:t>
-            </a:r>
-            <a:r>
-              <a:rPr lang="en-US" sz="3200" dirty="0" smtClean="0"/>
-              <a:t>Second </a:t>
-            </a:r>
-            <a:r>
-              <a:rPr lang="en-US" sz="3200" dirty="0"/>
-              <a:t>rule of debugging</a:t>
-            </a:r>
-            <a:r>
-              <a:rPr lang="en-US" sz="3200" dirty="0" smtClean="0"/>
-              <a:t>:</a:t>
-            </a:r>
-          </a:p>
-          <a:p>
-            <a:endParaRPr lang="en-US" sz="3200" dirty="0"/>
-          </a:p>
-          <a:p>
-            <a:pPr marL="457200" indent="-457200">
-              <a:buFont typeface="Arial"/>
-              <a:buChar char="•"/>
-            </a:pPr>
-            <a:r>
-              <a:rPr lang="en-US" sz="3200" dirty="0"/>
-              <a:t>Read the error message!</a:t>
-            </a:r>
-          </a:p>
-          <a:p>
-            <a:endParaRPr lang="en-US" sz="3200" dirty="0"/>
-          </a:p>
-        </p:txBody>
-      </p:sp>
-    </p:spTree>
-    <p:extLst>
-      <p:ext uri="{BB962C8B-B14F-4D97-AF65-F5344CB8AC3E}">
-        <p14:creationId xmlns:p14="http://schemas.microsoft.com/office/powerpoint/2010/main" val="1542419866"/>
-      </p:ext>
-    </p:extLst>
-  </p:cSld>
-  <p:clrMapOvr>
-    <a:masterClrMapping/>
-  </p:clrMapOvr>
-  <p:timing>
-    <p:tnLst>
-      <p:par>
-        <p:cTn xmlns:p14="http://schemas.microsoft.com/office/powerpoint/2010/main" id="1" dur="indefinite" restart="never" nodeType="tmRoot"/>
-      </p:par>
-    </p:tnLst>
-  </p:timing>
-</p:sld>
-</file>
-
 <file path=ppt/slides/slide7.xml><?xml version="1.0" encoding="utf-8"?>
 <p:sld xmlns:a="http://schemas.openxmlformats.org/drawingml/2006/main" xmlns:r="http://schemas.openxmlformats.org/officeDocument/2006/relationships" xmlns:p="http://schemas.openxmlformats.org/presentationml/2006/main">
   <p:cSld>
@@ -3460,20 +5429,8 @@
           <a:lstStyle/>
           <a:p>
             <a:r>
-              <a:rPr lang="en-US" sz="4400" b="1" kern="1200" dirty="0" smtClean="0">
-                <a:solidFill>
-                  <a:schemeClr val="accent1"/>
-                </a:solidFill>
-                <a:effectLst/>
-                <a:latin typeface="+mj-lt"/>
-                <a:ea typeface="+mj-ea"/>
-                <a:cs typeface="+mj-cs"/>
-              </a:rPr>
-              <a:t>PRY – Th</a:t>
-            </a:r>
-            <a:r>
               <a:rPr lang="en-US" dirty="0" smtClean="0"/>
-              <a:t>e IRB Alternative</a:t>
+              <a:t>Error Messages</a:t>
             </a:r>
             <a:endParaRPr lang="en-US" dirty="0"/>
           </a:p>
@@ -3504,14 +5461,14 @@
       </p:sp>
       <p:sp>
         <p:nvSpPr>
-          <p:cNvPr id="7" name="TextBox 6"/>
+          <p:cNvPr id="3" name="TextBox 2"/>
           <p:cNvSpPr txBox="1"/>
           <p:nvPr/>
         </p:nvSpPr>
         <p:spPr>
           <a:xfrm>
-            <a:off x="259762" y="1822592"/>
-            <a:ext cx="8741663" cy="3046988"/>
+            <a:off x="2049237" y="1875939"/>
+            <a:ext cx="4748014" cy="2554545"/>
           </a:xfrm>
           <a:prstGeom prst="rect">
             <a:avLst/>
@@ -3519,26 +5476,18 @@
           <a:noFill/>
         </p:spPr>
         <p:txBody>
-          <a:bodyPr wrap="square" rtlCol="0">
+          <a:bodyPr wrap="none" rtlCol="0">
             <a:spAutoFit/>
           </a:bodyPr>
           <a:lstStyle/>
           <a:p>
             <a:r>
-              <a:rPr lang="en-US" sz="3200" dirty="0"/>
-              <a:t>Pry is a REPL (Read-</a:t>
-            </a:r>
-            <a:r>
-              <a:rPr lang="en-US" sz="3200" dirty="0" err="1"/>
-              <a:t>Eval</a:t>
-            </a:r>
-            <a:r>
-              <a:rPr lang="en-US" sz="3200" dirty="0"/>
-              <a:t>-Print-Loop) much like IRB but with 3 additional key features:</a:t>
-            </a:r>
-          </a:p>
-          <a:p>
-            <a:endParaRPr lang="en-US" sz="3200" dirty="0"/>
+              <a:rPr lang="en-US" sz="3200" dirty="0" smtClean="0"/>
+              <a:t>The First rule of debugging:</a:t>
+            </a:r>
+          </a:p>
+          <a:p>
+            <a:endParaRPr lang="en-US" sz="3200" dirty="0" smtClean="0"/>
           </a:p>
           <a:p>
             <a:pPr marL="457200" indent="-457200">
@@ -3546,29 +5495,14 @@
               <a:buChar char="•"/>
             </a:pPr>
             <a:r>
-              <a:rPr lang="en-US" sz="3200" dirty="0"/>
-              <a:t>Syntax Highlighting</a:t>
-            </a:r>
-          </a:p>
-          <a:p>
-            <a:pPr marL="457200" indent="-457200">
-              <a:buFont typeface="Arial"/>
-              <a:buChar char="•"/>
-            </a:pPr>
-            <a:r>
-              <a:rPr lang="en-US" sz="3200" dirty="0"/>
-              <a:t>Built in methods</a:t>
-            </a:r>
-          </a:p>
-          <a:p>
-            <a:pPr marL="457200" indent="-457200">
-              <a:buFont typeface="Arial"/>
-              <a:buChar char="•"/>
-            </a:pPr>
-            <a:r>
-              <a:rPr lang="en-US" sz="3200" dirty="0"/>
-              <a:t>A Debugger</a:t>
-            </a:r>
+              <a:rPr lang="en-US" sz="3200" dirty="0" smtClean="0"/>
+              <a:t>Read the error message!</a:t>
+            </a:r>
+          </a:p>
+          <a:p>
+            <a:endParaRPr lang="en-US" sz="3200" dirty="0" smtClean="0"/>
+          </a:p>
+          <a:p>
             <a:endParaRPr lang="en-US" sz="3200" dirty="0"/>
           </a:p>
         </p:txBody>
@@ -3576,7 +5510,7 @@
     </p:spTree>
     <p:extLst>
       <p:ext uri="{BB962C8B-B14F-4D97-AF65-F5344CB8AC3E}">
-        <p14:creationId xmlns:p14="http://schemas.microsoft.com/office/powerpoint/2010/main" val="2023413776"/>
+        <p14:creationId xmlns:p14="http://schemas.microsoft.com/office/powerpoint/2010/main" val="3883953552"/>
       </p:ext>
     </p:extLst>
   </p:cSld>
@@ -3626,16 +5560,8 @@
           <a:lstStyle/>
           <a:p>
             <a:r>
-              <a:rPr lang="en-US" sz="4400" b="1" kern="1200" dirty="0" smtClean="0">
-                <a:solidFill>
-                  <a:schemeClr val="accent1"/>
-                </a:solidFill>
-                <a:effectLst/>
-                <a:latin typeface="+mj-lt"/>
-                <a:ea typeface="+mj-ea"/>
-                <a:cs typeface="+mj-cs"/>
-              </a:rPr>
-              <a:t>PRY – Install</a:t>
+              <a:rPr lang="en-US" dirty="0" smtClean="0"/>
+              <a:t>Error Messages</a:t>
             </a:r>
             <a:endParaRPr lang="en-US" dirty="0"/>
           </a:p>
@@ -3666,14 +5592,14 @@
       </p:sp>
       <p:sp>
         <p:nvSpPr>
-          <p:cNvPr id="7" name="TextBox 6"/>
+          <p:cNvPr id="3" name="TextBox 2"/>
           <p:cNvSpPr txBox="1"/>
           <p:nvPr/>
         </p:nvSpPr>
         <p:spPr>
           <a:xfrm>
-            <a:off x="259762" y="1822592"/>
-            <a:ext cx="8741663" cy="2554545"/>
+            <a:off x="2049237" y="1875939"/>
+            <a:ext cx="5238133" cy="4031873"/>
           </a:xfrm>
           <a:prstGeom prst="rect">
             <a:avLst/>
@@ -3681,53 +5607,61 @@
           <a:noFill/>
         </p:spPr>
         <p:txBody>
-          <a:bodyPr wrap="square" rtlCol="0">
+          <a:bodyPr wrap="none" rtlCol="0">
             <a:spAutoFit/>
           </a:bodyPr>
           <a:lstStyle/>
           <a:p>
             <a:r>
+              <a:rPr lang="en-US" sz="3200" dirty="0" smtClean="0"/>
+              <a:t>The First rule of debugging:</a:t>
+            </a:r>
+          </a:p>
+          <a:p>
+            <a:endParaRPr lang="en-US" sz="3200" dirty="0" smtClean="0"/>
+          </a:p>
+          <a:p>
+            <a:pPr marL="457200" indent="-457200">
+              <a:buFont typeface="Arial"/>
+              <a:buChar char="•"/>
+            </a:pPr>
+            <a:r>
+              <a:rPr lang="en-US" sz="3200" dirty="0" smtClean="0"/>
+              <a:t>Read the error message!</a:t>
+            </a:r>
+          </a:p>
+          <a:p>
+            <a:endParaRPr lang="en-US" sz="3200" dirty="0" smtClean="0"/>
+          </a:p>
+          <a:p>
+            <a:r>
               <a:rPr lang="en-US" sz="3200" dirty="0"/>
-              <a:t>g</a:t>
+              <a:t>The </a:t>
             </a:r>
             <a:r>
               <a:rPr lang="en-US" sz="3200" dirty="0" smtClean="0"/>
-              <a:t>em install pry</a:t>
-            </a:r>
-          </a:p>
-          <a:p>
+              <a:t>Second </a:t>
+            </a:r>
             <a:r>
               <a:rPr lang="en-US" sz="3200" dirty="0"/>
-              <a:t>g</a:t>
+              <a:t>rule of debugging</a:t>
             </a:r>
             <a:r>
               <a:rPr lang="en-US" sz="3200" dirty="0" smtClean="0"/>
-              <a:t>em install pry-doc</a:t>
-            </a:r>
-          </a:p>
-          <a:p>
-            <a:r>
-              <a:rPr lang="en-US" sz="3200" dirty="0" smtClean="0"/>
-              <a:t>gem install pry-</a:t>
-            </a:r>
-            <a:r>
-              <a:rPr lang="en-US" sz="3200" dirty="0" err="1" smtClean="0"/>
-              <a:t>byebug</a:t>
-            </a:r>
-            <a:endParaRPr lang="en-US" sz="3200" dirty="0" smtClean="0"/>
-          </a:p>
-          <a:p>
-            <a:r>
-              <a:rPr lang="en-US" sz="3200" dirty="0" err="1"/>
-              <a:t>r</a:t>
-            </a:r>
-            <a:r>
-              <a:rPr lang="en-US" sz="3200" dirty="0" err="1" smtClean="0"/>
-              <a:t>benv</a:t>
-            </a:r>
-            <a:r>
-              <a:rPr lang="en-US" sz="3200" dirty="0" smtClean="0"/>
-              <a:t> rehash</a:t>
+              <a:t>:</a:t>
+            </a:r>
+          </a:p>
+          <a:p>
+            <a:endParaRPr lang="en-US" sz="3200" dirty="0"/>
+          </a:p>
+          <a:p>
+            <a:pPr marL="457200" indent="-457200">
+              <a:buFont typeface="Arial"/>
+              <a:buChar char="•"/>
+            </a:pPr>
+            <a:r>
+              <a:rPr lang="en-US" sz="3200" dirty="0"/>
+              <a:t>Read the error message!</a:t>
             </a:r>
           </a:p>
           <a:p>
@@ -3738,7 +5672,7 @@
     </p:spTree>
     <p:extLst>
       <p:ext uri="{BB962C8B-B14F-4D97-AF65-F5344CB8AC3E}">
-        <p14:creationId xmlns:p14="http://schemas.microsoft.com/office/powerpoint/2010/main" val="1635942972"/>
+        <p14:creationId xmlns:p14="http://schemas.microsoft.com/office/powerpoint/2010/main" val="1542419866"/>
       </p:ext>
     </p:extLst>
   </p:cSld>
@@ -3758,14 +5692,6 @@
 <file path=ppt/slides/slide9.xml><?xml version="1.0" encoding="utf-8"?>
 <p:sld xmlns:a="http://schemas.openxmlformats.org/drawingml/2006/main" xmlns:r="http://schemas.openxmlformats.org/officeDocument/2006/relationships" xmlns:p="http://schemas.openxmlformats.org/presentationml/2006/main">
   <p:cSld>
-    <p:bg>
-      <p:bgPr>
-        <a:solidFill>
-          <a:schemeClr val="bg1"/>
-        </a:solidFill>
-        <a:effectLst/>
-      </p:bgPr>
-    </p:bg>
     <p:spTree>
       <p:nvGrpSpPr>
         <p:cNvPr id="1" name=""/>
@@ -3796,16 +5722,8 @@
           <a:lstStyle/>
           <a:p>
             <a:r>
-              <a:rPr lang="en-US" sz="4400" b="1" kern="1200" dirty="0" smtClean="0">
-                <a:solidFill>
-                  <a:schemeClr val="accent1"/>
-                </a:solidFill>
-                <a:effectLst/>
-                <a:latin typeface="+mj-lt"/>
-                <a:ea typeface="+mj-ea"/>
-                <a:cs typeface="+mj-cs"/>
-              </a:rPr>
-              <a:t>show-doc</a:t>
+              <a:rPr lang="en-US" dirty="0" smtClean="0"/>
+              <a:t>Error Messages</a:t>
             </a:r>
             <a:endParaRPr lang="en-US" dirty="0"/>
           </a:p>
@@ -3834,40 +5752,82 @@
           </a:p>
         </p:txBody>
       </p:sp>
-      <p:pic>
-        <p:nvPicPr>
-          <p:cNvPr id="3" name="Picture 2" descr="pry-show-doc.tiff"/>
-          <p:cNvPicPr>
-            <a:picLocks noChangeAspect="1"/>
-          </p:cNvPicPr>
+      <p:sp>
+        <p:nvSpPr>
+          <p:cNvPr id="5" name="Rectangle 4"/>
+          <p:cNvSpPr/>
           <p:nvPr/>
-        </p:nvPicPr>
-        <p:blipFill>
-          <a:blip r:embed="rId2">
-            <a:extLst>
-              <a:ext uri="{28A0092B-C50C-407E-A947-70E740481C1C}">
-                <a14:useLocalDpi xmlns:a14="http://schemas.microsoft.com/office/drawing/2010/main" val="0"/>
-              </a:ext>
-            </a:extLst>
-          </a:blip>
-          <a:stretch>
-            <a:fillRect/>
-          </a:stretch>
-        </p:blipFill>
+        </p:nvSpPr>
         <p:spPr>
           <a:xfrm>
-            <a:off x="1930400" y="1534938"/>
-            <a:ext cx="5283200" cy="4394200"/>
+            <a:off x="1832769" y="2828836"/>
+            <a:ext cx="5657049" cy="3046988"/>
           </a:xfrm>
           <a:prstGeom prst="rect">
             <a:avLst/>
           </a:prstGeom>
         </p:spPr>
-      </p:pic>
+        <p:txBody>
+          <a:bodyPr wrap="square">
+            <a:spAutoFit/>
+          </a:bodyPr>
+          <a:lstStyle/>
+          <a:p>
+            <a:r>
+              <a:rPr lang="en-US" sz="3200" dirty="0"/>
+              <a:t>Errors are your friends</a:t>
+            </a:r>
+            <a:r>
+              <a:rPr lang="en-US" sz="3200" dirty="0" smtClean="0"/>
+              <a:t>!</a:t>
+            </a:r>
+          </a:p>
+          <a:p>
+            <a:endParaRPr lang="en-US" sz="3200" dirty="0"/>
+          </a:p>
+          <a:p>
+            <a:pPr marL="457200" indent="-457200">
+              <a:buFont typeface="Arial"/>
+              <a:buChar char="•"/>
+            </a:pPr>
+            <a:r>
+              <a:rPr lang="en-US" sz="3200" dirty="0" smtClean="0"/>
+              <a:t>Analyze the message </a:t>
+            </a:r>
+          </a:p>
+          <a:p>
+            <a:pPr marL="457200" indent="-457200">
+              <a:buFont typeface="Arial"/>
+              <a:buChar char="•"/>
+            </a:pPr>
+            <a:r>
+              <a:rPr lang="en-US" sz="3200" dirty="0" smtClean="0"/>
+              <a:t>Note the line number(s)</a:t>
+            </a:r>
+          </a:p>
+          <a:p>
+            <a:pPr marL="457200" indent="-457200">
+              <a:buFont typeface="Arial"/>
+              <a:buChar char="•"/>
+            </a:pPr>
+            <a:endParaRPr lang="en-US" sz="3200" dirty="0"/>
+          </a:p>
+          <a:p>
+            <a:pPr marL="457200" indent="-457200">
+              <a:buFont typeface="Arial"/>
+              <a:buChar char="•"/>
+            </a:pPr>
+            <a:r>
+              <a:rPr lang="en-US" sz="3200" dirty="0"/>
+              <a:t>stack trace</a:t>
+            </a:r>
+          </a:p>
+        </p:txBody>
+      </p:sp>
     </p:spTree>
     <p:extLst>
       <p:ext uri="{BB962C8B-B14F-4D97-AF65-F5344CB8AC3E}">
-        <p14:creationId xmlns:p14="http://schemas.microsoft.com/office/powerpoint/2010/main" val="3906024378"/>
+        <p14:creationId xmlns:p14="http://schemas.microsoft.com/office/powerpoint/2010/main" val="992259535"/>
       </p:ext>
     </p:extLst>
   </p:cSld>

</xml_diff>

<commit_message>
refactor notess & slides
</commit_message>
<xml_diff>
--- a/HT-debugging-basics.pptx
+++ b/HT-debugging-basics.pptx
@@ -5,10 +5,10 @@
     <p:sldMasterId id="2147483660" r:id="rId1"/>
   </p:sldMasterIdLst>
   <p:notesMasterIdLst>
-    <p:notesMasterId r:id="rId27"/>
+    <p:notesMasterId r:id="rId28"/>
   </p:notesMasterIdLst>
   <p:handoutMasterIdLst>
-    <p:handoutMasterId r:id="rId28"/>
+    <p:handoutMasterId r:id="rId29"/>
   </p:handoutMasterIdLst>
   <p:sldIdLst>
     <p:sldId id="256" r:id="rId2"/>
@@ -36,6 +36,7 @@
     <p:sldId id="343" r:id="rId24"/>
     <p:sldId id="341" r:id="rId25"/>
     <p:sldId id="357" r:id="rId26"/>
+    <p:sldId id="364" r:id="rId27"/>
   </p:sldIdLst>
   <p:sldSz cx="9144000" cy="6858000" type="screen4x3"/>
   <p:notesSz cx="6858000" cy="9144000"/>
@@ -219,7 +220,7 @@
           <a:p>
             <a:fld id="{CAA47771-BE1A-0F41-A2AB-502D986D5C71}" type="datetimeFigureOut">
               <a:rPr lang="en-US" smtClean="0"/>
-              <a:t>3/18/15</a:t>
+              <a:t>4/9/15</a:t>
             </a:fld>
             <a:endParaRPr lang="en-US"/>
           </a:p>
@@ -385,7 +386,7 @@
           <a:p>
             <a:fld id="{4083CDE4-3FA1-6A4B-862D-E61F193A4941}" type="datetimeFigureOut">
               <a:rPr lang="en-US" smtClean="0"/>
-              <a:t>3/18/15</a:t>
+              <a:t>4/9/15</a:t>
             </a:fld>
             <a:endParaRPr lang="en-US"/>
           </a:p>
@@ -2099,7 +2100,6 @@
               <a:rPr lang="en-US" dirty="0" smtClean="0"/>
               <a:t>behind your error messages…</a:t>
             </a:r>
-            <a:endParaRPr lang="en-US" dirty="0" smtClean="0"/>
           </a:p>
         </p:txBody>
       </p:sp>
@@ -2132,15 +2132,7 @@
                   <a:schemeClr val="accent3"/>
                 </a:solidFill>
               </a:rPr>
-              <a:t>Phase 1:  Day </a:t>
-            </a:r>
-            <a:r>
-              <a:rPr lang="en-US" dirty="0" smtClean="0">
-                <a:solidFill>
-                  <a:schemeClr val="accent3"/>
-                </a:solidFill>
-              </a:rPr>
-              <a:t>4</a:t>
+              <a:t>Phase 1:  Day 4</a:t>
             </a:r>
             <a:endParaRPr lang="en-US" dirty="0">
               <a:solidFill>
@@ -2474,7 +2466,7 @@
         </p:nvSpPr>
         <p:spPr>
           <a:xfrm>
-            <a:off x="457200" y="1671589"/>
+            <a:off x="2112610" y="2855909"/>
             <a:ext cx="8229599" cy="2062103"/>
           </a:xfrm>
           <a:prstGeom prst="rect">
@@ -3427,7 +3419,7 @@
         <p:spPr>
           <a:xfrm>
             <a:off x="259762" y="1822592"/>
-            <a:ext cx="8741663" cy="2554545"/>
+            <a:ext cx="8741663" cy="3046988"/>
           </a:xfrm>
           <a:prstGeom prst="rect">
             <a:avLst/>
@@ -3454,7 +3446,6 @@
               <a:rPr lang="en-US" sz="3200" dirty="0" smtClean="0"/>
               <a:t>_   (the last output)</a:t>
             </a:r>
-            <a:endParaRPr lang="en-US" sz="3200" dirty="0" smtClean="0"/>
           </a:p>
           <a:p>
             <a:r>
@@ -3476,6 +3467,28 @@
             <a:r>
               <a:rPr lang="en-US" sz="3200" dirty="0" smtClean="0"/>
               <a:t>at filename (displays the given file)</a:t>
+            </a:r>
+          </a:p>
+          <a:p>
+            <a:r>
+              <a:rPr lang="en-US" sz="3200" dirty="0" err="1"/>
+              <a:t>w</a:t>
+            </a:r>
+            <a:r>
+              <a:rPr lang="en-US" sz="3200" dirty="0" err="1" smtClean="0"/>
+              <a:t>tf</a:t>
+            </a:r>
+            <a:r>
+              <a:rPr lang="en-US" sz="3200" dirty="0" smtClean="0"/>
+              <a:t>? (</a:t>
+            </a:r>
+            <a:r>
+              <a:rPr lang="en-US" sz="3200" dirty="0" err="1" smtClean="0"/>
+              <a:t>wtf</a:t>
+            </a:r>
+            <a:r>
+              <a:rPr lang="en-US" sz="3200" dirty="0" smtClean="0"/>
+              <a:t>………)</a:t>
             </a:r>
             <a:endParaRPr lang="en-US" sz="3200" dirty="0"/>
           </a:p>
@@ -3918,14 +3931,12 @@
               <a:rPr lang="en-US" dirty="0" smtClean="0"/>
               <a:t>History</a:t>
             </a:r>
-            <a:endParaRPr lang="en-US" dirty="0" smtClean="0"/>
           </a:p>
           <a:p>
             <a:r>
               <a:rPr lang="en-US" dirty="0" smtClean="0"/>
               <a:t>Reading Error messages</a:t>
             </a:r>
-            <a:endParaRPr lang="en-US" dirty="0" smtClean="0"/>
           </a:p>
           <a:p>
             <a:r>
@@ -3943,8 +3954,20 @@
           <a:p>
             <a:r>
               <a:rPr lang="en-US" dirty="0" smtClean="0"/>
-              <a:t>Cleanup some code</a:t>
-            </a:r>
+              <a:t>Cleanup some code (maybe)</a:t>
+            </a:r>
+          </a:p>
+          <a:p>
+            <a:r>
+              <a:rPr lang="en-US" dirty="0" smtClean="0"/>
+              <a:t>Ten most common errors </a:t>
+            </a:r>
+            <a:r>
+              <a:rPr lang="en-US" smtClean="0"/>
+              <a:t>with examples</a:t>
+            </a:r>
+          </a:p>
+          <a:p>
             <a:endParaRPr lang="en-US" dirty="0" smtClean="0"/>
           </a:p>
           <a:p>
@@ -4834,13 +4857,7 @@
               <a:rPr lang="en-US" sz="4800" dirty="0" smtClean="0">
                 <a:hlinkClick r:id="rId3"/>
               </a:rPr>
-              <a:t>Replace IRB </a:t>
-            </a:r>
-            <a:r>
-              <a:rPr lang="en-US" sz="4800" smtClean="0">
-                <a:hlinkClick r:id="rId3"/>
-              </a:rPr>
-              <a:t>with PRY</a:t>
+              <a:t>Replace IRB with PRY</a:t>
             </a:r>
             <a:endParaRPr lang="en-US" sz="4800" dirty="0" smtClean="0"/>
           </a:p>
@@ -4850,6 +4867,157 @@
     <p:extLst>
       <p:ext uri="{BB962C8B-B14F-4D97-AF65-F5344CB8AC3E}">
         <p14:creationId xmlns:p14="http://schemas.microsoft.com/office/powerpoint/2010/main" val="3076589042"/>
+      </p:ext>
+    </p:extLst>
+  </p:cSld>
+  <p:clrMapOvr>
+    <a:masterClrMapping/>
+  </p:clrMapOvr>
+  <p:timing>
+    <p:tnLst>
+      <p:par>
+        <p:cTn xmlns:p14="http://schemas.microsoft.com/office/powerpoint/2010/main" id="1" dur="indefinite" restart="never" nodeType="tmRoot"/>
+      </p:par>
+    </p:tnLst>
+  </p:timing>
+</p:sld>
+</file>
+
+<file path=ppt/slides/slide26.xml><?xml version="1.0" encoding="utf-8"?>
+<p:sld xmlns:a="http://schemas.openxmlformats.org/drawingml/2006/main" xmlns:r="http://schemas.openxmlformats.org/officeDocument/2006/relationships" xmlns:p="http://schemas.openxmlformats.org/presentationml/2006/main">
+  <p:cSld>
+    <p:spTree>
+      <p:nvGrpSpPr>
+        <p:cNvPr id="1" name=""/>
+        <p:cNvGrpSpPr/>
+        <p:nvPr/>
+      </p:nvGrpSpPr>
+      <p:grpSpPr>
+        <a:xfrm>
+          <a:off x="0" y="0"/>
+          <a:ext cx="0" cy="0"/>
+          <a:chOff x="0" y="0"/>
+          <a:chExt cx="0" cy="0"/>
+        </a:xfrm>
+      </p:grpSpPr>
+      <p:sp>
+        <p:nvSpPr>
+          <p:cNvPr id="2" name="Title 1"/>
+          <p:cNvSpPr>
+            <a:spLocks noGrp="1"/>
+          </p:cNvSpPr>
+          <p:nvPr>
+            <p:ph type="title"/>
+          </p:nvPr>
+        </p:nvSpPr>
+        <p:spPr/>
+        <p:txBody>
+          <a:bodyPr/>
+          <a:lstStyle/>
+          <a:p>
+            <a:r>
+              <a:rPr lang="en-US" dirty="0" smtClean="0"/>
+              <a:t>Final Thought</a:t>
+            </a:r>
+            <a:endParaRPr lang="en-US" dirty="0"/>
+          </a:p>
+        </p:txBody>
+      </p:sp>
+      <p:sp>
+        <p:nvSpPr>
+          <p:cNvPr id="4" name="Footer Placeholder 3"/>
+          <p:cNvSpPr>
+            <a:spLocks noGrp="1"/>
+          </p:cNvSpPr>
+          <p:nvPr>
+            <p:ph type="ftr" sz="quarter" idx="3"/>
+          </p:nvPr>
+        </p:nvSpPr>
+        <p:spPr/>
+        <p:txBody>
+          <a:bodyPr/>
+          <a:lstStyle/>
+          <a:p>
+            <a:r>
+              <a:rPr lang="en-US" dirty="0" smtClean="0"/>
+              <a:t>HT- Debugging</a:t>
+            </a:r>
+            <a:endParaRPr lang="en-US" dirty="0"/>
+          </a:p>
+        </p:txBody>
+      </p:sp>
+      <p:sp>
+        <p:nvSpPr>
+          <p:cNvPr id="7" name="TextBox 6"/>
+          <p:cNvSpPr txBox="1"/>
+          <p:nvPr/>
+        </p:nvSpPr>
+        <p:spPr>
+          <a:xfrm>
+            <a:off x="512064" y="1652565"/>
+            <a:ext cx="8056571" cy="3046988"/>
+          </a:xfrm>
+          <a:prstGeom prst="rect">
+            <a:avLst/>
+          </a:prstGeom>
+          <a:noFill/>
+        </p:spPr>
+        <p:txBody>
+          <a:bodyPr wrap="square" rtlCol="0">
+            <a:spAutoFit/>
+          </a:bodyPr>
+          <a:lstStyle/>
+          <a:p>
+            <a:pPr algn="ctr"/>
+            <a:r>
+              <a:rPr lang="en-US" sz="4800" dirty="0" smtClean="0"/>
+              <a:t>Just saying; a well tested app</a:t>
+            </a:r>
+          </a:p>
+          <a:p>
+            <a:pPr algn="ctr"/>
+            <a:r>
+              <a:rPr lang="en-US" sz="4800" dirty="0"/>
+              <a:t>w</a:t>
+            </a:r>
+            <a:r>
+              <a:rPr lang="en-US" sz="4800" dirty="0" smtClean="0"/>
+              <a:t>ill greatly reduce the </a:t>
+            </a:r>
+          </a:p>
+          <a:p>
+            <a:pPr algn="ctr"/>
+            <a:r>
+              <a:rPr lang="en-US" sz="4800" dirty="0"/>
+              <a:t>a</a:t>
+            </a:r>
+            <a:r>
+              <a:rPr lang="en-US" sz="4800" dirty="0" smtClean="0"/>
+              <a:t>mount of debuggin</a:t>
+            </a:r>
+            <a:r>
+              <a:rPr lang="en-US" sz="4800" dirty="0" smtClean="0"/>
+              <a:t>g you</a:t>
+            </a:r>
+          </a:p>
+          <a:p>
+            <a:pPr algn="ctr"/>
+            <a:r>
+              <a:rPr lang="en-US" sz="4800" dirty="0"/>
+              <a:t>d</a:t>
+            </a:r>
+            <a:r>
+              <a:rPr lang="en-US" sz="4800" dirty="0" smtClean="0"/>
+              <a:t>o each day….</a:t>
+            </a:r>
+            <a:endParaRPr lang="en-US" sz="4800" dirty="0" smtClean="0"/>
+          </a:p>
+        </p:txBody>
+      </p:sp>
+    </p:spTree>
+    <p:extLst>
+      <p:ext uri="{BB962C8B-B14F-4D97-AF65-F5344CB8AC3E}">
+        <p14:creationId xmlns:p14="http://schemas.microsoft.com/office/powerpoint/2010/main" val="1221609672"/>
       </p:ext>
     </p:extLst>
   </p:cSld>
@@ -4916,9 +5084,16 @@
             <p:ph idx="1"/>
           </p:nvPr>
         </p:nvSpPr>
-        <p:spPr/>
-        <p:txBody>
-          <a:bodyPr/>
+        <p:spPr>
+          <a:xfrm>
+            <a:off x="457200" y="1703934"/>
+            <a:ext cx="8229600" cy="4371222"/>
+          </a:xfrm>
+        </p:spPr>
+        <p:txBody>
+          <a:bodyPr>
+            <a:normAutofit fontScale="92500" lnSpcReduction="10000"/>
+          </a:bodyPr>
           <a:lstStyle/>
           <a:p>
             <a:r>
@@ -4968,6 +5143,33 @@
               <a:rPr lang="en-US" dirty="0" smtClean="0"/>
               <a:t>DEBUGGING</a:t>
             </a:r>
+          </a:p>
+          <a:p>
+            <a:pPr marL="0" indent="0">
+              <a:buNone/>
+            </a:pPr>
+            <a:r>
+              <a:rPr lang="en-US" dirty="0"/>
+              <a:t/>
+            </a:r>
+            <a:br>
+              <a:rPr lang="en-US" dirty="0"/>
+            </a:br>
+            <a:endParaRPr lang="en-US" dirty="0"/>
+          </a:p>
+          <a:p>
+            <a:r>
+              <a:rPr lang="en-US" dirty="0" smtClean="0"/>
+              <a:t>Good Debugging skills is the one thing that will keep you sane in this </a:t>
+            </a:r>
+            <a:r>
+              <a:rPr lang="en-US" dirty="0" err="1" smtClean="0"/>
+              <a:t>jerb</a:t>
+            </a:r>
+            <a:r>
+              <a:rPr lang="en-US" dirty="0" smtClean="0"/>
+              <a:t>…</a:t>
+            </a:r>
             <a:endParaRPr lang="en-US" dirty="0"/>
           </a:p>
           <a:p>
@@ -4998,6 +5200,36 @@
           </a:p>
         </p:txBody>
       </p:sp>
+      <p:pic>
+        <p:nvPicPr>
+          <p:cNvPr id="5" name="Picture 4" descr="Ahhhhhhhh.gif"/>
+          <p:cNvPicPr>
+            <a:picLocks noChangeAspect="1"/>
+          </p:cNvPicPr>
+          <p:nvPr/>
+        </p:nvPicPr>
+        <p:blipFill>
+          <a:blip r:embed="rId2">
+            <a:extLst>
+              <a:ext uri="{28A0092B-C50C-407E-A947-70E740481C1C}">
+                <a14:useLocalDpi xmlns:a14="http://schemas.microsoft.com/office/drawing/2010/main" val="0"/>
+              </a:ext>
+            </a:extLst>
+          </a:blip>
+          <a:stretch>
+            <a:fillRect/>
+          </a:stretch>
+        </p:blipFill>
+        <p:spPr>
+          <a:xfrm>
+            <a:off x="5269382" y="2317733"/>
+            <a:ext cx="3111500" cy="2540000"/>
+          </a:xfrm>
+          <a:prstGeom prst="rect">
+            <a:avLst/>
+          </a:prstGeom>
+        </p:spPr>
+      </p:pic>
     </p:spTree>
     <p:extLst>
       <p:ext uri="{BB962C8B-B14F-4D97-AF65-F5344CB8AC3E}">
@@ -5760,8 +5992,8 @@
         </p:nvSpPr>
         <p:spPr>
           <a:xfrm>
-            <a:off x="1832769" y="2828836"/>
-            <a:ext cx="5657049" cy="3046988"/>
+            <a:off x="1370970" y="1934158"/>
+            <a:ext cx="6494062" cy="3293209"/>
           </a:xfrm>
           <a:prstGeom prst="rect">
             <a:avLst/>
@@ -5774,11 +6006,11 @@
           <a:lstStyle/>
           <a:p>
             <a:r>
-              <a:rPr lang="en-US" sz="3200" dirty="0"/>
+              <a:rPr lang="en-US" sz="4800" dirty="0"/>
               <a:t>Errors are your friends</a:t>
             </a:r>
             <a:r>
-              <a:rPr lang="en-US" sz="3200" dirty="0" smtClean="0"/>
+              <a:rPr lang="en-US" sz="4800" dirty="0" smtClean="0"/>
               <a:t>!</a:t>
             </a:r>
           </a:p>

</xml_diff>

<commit_message>
refactor slides and debugging notes
</commit_message>
<xml_diff>
--- a/HT-debugging-basics.pptx
+++ b/HT-debugging-basics.pptx
@@ -5,10 +5,10 @@
     <p:sldMasterId id="2147483660" r:id="rId1"/>
   </p:sldMasterIdLst>
   <p:notesMasterIdLst>
-    <p:notesMasterId r:id="rId28"/>
+    <p:notesMasterId r:id="rId32"/>
   </p:notesMasterIdLst>
   <p:handoutMasterIdLst>
-    <p:handoutMasterId r:id="rId29"/>
+    <p:handoutMasterId r:id="rId33"/>
   </p:handoutMasterIdLst>
   <p:sldIdLst>
     <p:sldId id="256" r:id="rId2"/>
@@ -20,23 +20,27 @@
     <p:sldId id="347" r:id="rId8"/>
     <p:sldId id="348" r:id="rId9"/>
     <p:sldId id="361" r:id="rId10"/>
-    <p:sldId id="360" r:id="rId11"/>
-    <p:sldId id="362" r:id="rId12"/>
-    <p:sldId id="363" r:id="rId13"/>
-    <p:sldId id="352" r:id="rId14"/>
-    <p:sldId id="353" r:id="rId15"/>
-    <p:sldId id="345" r:id="rId16"/>
-    <p:sldId id="349" r:id="rId17"/>
-    <p:sldId id="356" r:id="rId18"/>
-    <p:sldId id="350" r:id="rId19"/>
-    <p:sldId id="354" r:id="rId20"/>
-    <p:sldId id="358" r:id="rId21"/>
-    <p:sldId id="342" r:id="rId22"/>
-    <p:sldId id="344" r:id="rId23"/>
-    <p:sldId id="343" r:id="rId24"/>
-    <p:sldId id="341" r:id="rId25"/>
-    <p:sldId id="357" r:id="rId26"/>
-    <p:sldId id="364" r:id="rId27"/>
+    <p:sldId id="365" r:id="rId11"/>
+    <p:sldId id="366" r:id="rId12"/>
+    <p:sldId id="360" r:id="rId13"/>
+    <p:sldId id="362" r:id="rId14"/>
+    <p:sldId id="363" r:id="rId15"/>
+    <p:sldId id="368" r:id="rId16"/>
+    <p:sldId id="367" r:id="rId17"/>
+    <p:sldId id="352" r:id="rId18"/>
+    <p:sldId id="353" r:id="rId19"/>
+    <p:sldId id="345" r:id="rId20"/>
+    <p:sldId id="349" r:id="rId21"/>
+    <p:sldId id="356" r:id="rId22"/>
+    <p:sldId id="350" r:id="rId23"/>
+    <p:sldId id="354" r:id="rId24"/>
+    <p:sldId id="358" r:id="rId25"/>
+    <p:sldId id="342" r:id="rId26"/>
+    <p:sldId id="344" r:id="rId27"/>
+    <p:sldId id="343" r:id="rId28"/>
+    <p:sldId id="341" r:id="rId29"/>
+    <p:sldId id="357" r:id="rId30"/>
+    <p:sldId id="364" r:id="rId31"/>
   </p:sldIdLst>
   <p:sldSz cx="9144000" cy="6858000" type="screen4x3"/>
   <p:notesSz cx="6858000" cy="9144000"/>
@@ -220,7 +224,7 @@
           <a:p>
             <a:fld id="{CAA47771-BE1A-0F41-A2AB-502D986D5C71}" type="datetimeFigureOut">
               <a:rPr lang="en-US" smtClean="0"/>
-              <a:t>4/9/15</a:t>
+              <a:t>4/29/15</a:t>
             </a:fld>
             <a:endParaRPr lang="en-US"/>
           </a:p>
@@ -386,7 +390,7 @@
           <a:p>
             <a:fld id="{4083CDE4-3FA1-6A4B-862D-E61F193A4941}" type="datetimeFigureOut">
               <a:rPr lang="en-US" smtClean="0"/>
-              <a:t>4/9/15</a:t>
+              <a:t>4/29/15</a:t>
             </a:fld>
             <a:endParaRPr lang="en-US"/>
           </a:p>
@@ -2264,7 +2268,7 @@
           <a:p>
             <a:r>
               <a:rPr lang="en-US" dirty="0" smtClean="0"/>
-              <a:t>Strategies</a:t>
+              <a:t>Stack Trace</a:t>
             </a:r>
             <a:endParaRPr lang="en-US" dirty="0"/>
           </a:p>
@@ -2301,8 +2305,8 @@
         </p:nvSpPr>
         <p:spPr>
           <a:xfrm>
-            <a:off x="457200" y="1671589"/>
-            <a:ext cx="8229599" cy="3046988"/>
+            <a:off x="512064" y="2147533"/>
+            <a:ext cx="8174736" cy="2862322"/>
           </a:xfrm>
           <a:prstGeom prst="rect">
             <a:avLst/>
@@ -2314,71 +2318,64 @@
           </a:bodyPr>
           <a:lstStyle/>
           <a:p>
-            <a:pPr marL="457200" indent="-457200">
-              <a:buFont typeface="Arial"/>
-              <a:buChar char="•"/>
-            </a:pPr>
-            <a:r>
-              <a:rPr lang="en-US" sz="3200" dirty="0"/>
-              <a:t>Read the error messages!</a:t>
-            </a:r>
-          </a:p>
-          <a:p>
-            <a:pPr marL="457200" indent="-457200">
-              <a:buFont typeface="Arial"/>
-              <a:buChar char="•"/>
-            </a:pPr>
-            <a:r>
-              <a:rPr lang="en-US" sz="3200" dirty="0"/>
-              <a:t>Know what your expected behavior is.</a:t>
-            </a:r>
-          </a:p>
-          <a:p>
-            <a:pPr marL="457200" indent="-457200">
-              <a:buFont typeface="Arial"/>
-              <a:buChar char="•"/>
-            </a:pPr>
-            <a:r>
-              <a:rPr lang="en-US" sz="3200" dirty="0"/>
-              <a:t>Understand the input(s).</a:t>
-            </a:r>
-          </a:p>
-          <a:p>
-            <a:pPr marL="457200" indent="-457200">
-              <a:buFont typeface="Arial"/>
-              <a:buChar char="•"/>
-            </a:pPr>
-            <a:r>
-              <a:rPr lang="en-US" sz="3200" dirty="0"/>
-              <a:t>Understand the program state.</a:t>
-            </a:r>
-          </a:p>
-          <a:p>
-            <a:pPr marL="457200" indent="-457200">
-              <a:buFont typeface="Arial"/>
-              <a:buChar char="•"/>
-            </a:pPr>
-            <a:r>
-              <a:rPr lang="en-US" sz="3200" dirty="0"/>
-              <a:t>Make incremental changes.</a:t>
-            </a:r>
-          </a:p>
-          <a:p>
-            <a:pPr marL="457200" indent="-457200">
-              <a:buFont typeface="Arial"/>
-              <a:buChar char="•"/>
-            </a:pPr>
-            <a:r>
-              <a:rPr lang="en-US" sz="3200" dirty="0"/>
-              <a:t>Check your assumptions.</a:t>
-            </a:r>
+            <a:r>
+              <a:rPr lang="en-US" sz="3000" dirty="0"/>
+              <a:t>S</a:t>
+            </a:r>
+            <a:r>
+              <a:rPr lang="en-US" sz="3000" dirty="0" smtClean="0"/>
+              <a:t>tack </a:t>
+            </a:r>
+            <a:r>
+              <a:rPr lang="en-US" sz="3000" dirty="0"/>
+              <a:t>T</a:t>
+            </a:r>
+            <a:r>
+              <a:rPr lang="en-US" sz="3000" dirty="0" smtClean="0"/>
+              <a:t>race (aka </a:t>
+            </a:r>
+            <a:r>
+              <a:rPr lang="en-US" sz="3000" dirty="0"/>
+              <a:t>stack </a:t>
+            </a:r>
+            <a:r>
+              <a:rPr lang="en-US" sz="3000" dirty="0" err="1"/>
+              <a:t>backtrace</a:t>
+            </a:r>
+            <a:r>
+              <a:rPr lang="en-US" sz="3000" dirty="0"/>
+              <a:t> or stack </a:t>
+            </a:r>
+            <a:r>
+              <a:rPr lang="en-US" sz="3000" dirty="0" err="1"/>
+              <a:t>traceback</a:t>
+            </a:r>
+            <a:r>
+              <a:rPr lang="en-US" sz="3000" dirty="0"/>
+              <a:t>) is a report of the active stack frames </a:t>
+            </a:r>
+            <a:r>
+              <a:rPr lang="en-US" sz="3000" dirty="0" smtClean="0"/>
+              <a:t>upon error condition during a program’s execution. </a:t>
+            </a:r>
+            <a:endParaRPr lang="en-US" sz="3000" dirty="0"/>
+          </a:p>
+          <a:p>
+            <a:endParaRPr lang="en-US" sz="3000" dirty="0" smtClean="0"/>
+          </a:p>
+          <a:p>
+            <a:r>
+              <a:rPr lang="en-US" sz="3000" dirty="0" smtClean="0"/>
+              <a:t>We follow this path back to find the offending code segment and correct it.</a:t>
+            </a:r>
+            <a:endParaRPr lang="en-US" sz="3000" dirty="0"/>
           </a:p>
         </p:txBody>
       </p:sp>
     </p:spTree>
     <p:extLst>
       <p:ext uri="{BB962C8B-B14F-4D97-AF65-F5344CB8AC3E}">
-        <p14:creationId xmlns:p14="http://schemas.microsoft.com/office/powerpoint/2010/main" val="1054351687"/>
+        <p14:creationId xmlns:p14="http://schemas.microsoft.com/office/powerpoint/2010/main" val="3983079608"/>
       </p:ext>
     </p:extLst>
   </p:cSld>
@@ -2422,117 +2419,90 @@
             <p:ph type="title"/>
           </p:nvPr>
         </p:nvSpPr>
-        <p:spPr/>
-        <p:txBody>
-          <a:bodyPr/>
-          <a:lstStyle/>
-          <a:p>
-            <a:r>
-              <a:rPr lang="en-US" dirty="0" smtClean="0"/>
-              <a:t>Strategies</a:t>
-            </a:r>
-            <a:endParaRPr lang="en-US" dirty="0"/>
-          </a:p>
-        </p:txBody>
-      </p:sp>
-      <p:sp>
-        <p:nvSpPr>
-          <p:cNvPr id="4" name="Footer Placeholder 3"/>
-          <p:cNvSpPr>
-            <a:spLocks noGrp="1"/>
-          </p:cNvSpPr>
-          <p:nvPr>
-            <p:ph type="ftr" sz="quarter" idx="3"/>
-          </p:nvPr>
-        </p:nvSpPr>
-        <p:spPr/>
-        <p:txBody>
-          <a:bodyPr/>
-          <a:lstStyle/>
-          <a:p>
-            <a:r>
-              <a:rPr lang="en-US" dirty="0" smtClean="0"/>
-              <a:t>HT- Debugging</a:t>
-            </a:r>
-            <a:endParaRPr lang="en-US" dirty="0"/>
-          </a:p>
-        </p:txBody>
-      </p:sp>
-      <p:sp>
-        <p:nvSpPr>
-          <p:cNvPr id="3" name="Rectangle 2"/>
-          <p:cNvSpPr/>
-          <p:nvPr/>
-        </p:nvSpPr>
         <p:spPr>
           <a:xfrm>
-            <a:off x="2112610" y="2855909"/>
-            <a:ext cx="8229599" cy="2062103"/>
+            <a:off x="299672" y="2687578"/>
+            <a:ext cx="2614594" cy="1143000"/>
+          </a:xfrm>
+        </p:spPr>
+        <p:txBody>
+          <a:bodyPr>
+            <a:normAutofit fontScale="90000"/>
+          </a:bodyPr>
+          <a:lstStyle/>
+          <a:p>
+            <a:r>
+              <a:rPr lang="en-US" dirty="0" smtClean="0">
+                <a:solidFill>
+                  <a:schemeClr val="bg1"/>
+                </a:solidFill>
+              </a:rPr>
+              <a:t>Ruby Exception Classes</a:t>
+            </a:r>
+            <a:endParaRPr lang="en-US" dirty="0">
+              <a:solidFill>
+                <a:schemeClr val="bg1"/>
+              </a:solidFill>
+            </a:endParaRPr>
+          </a:p>
+        </p:txBody>
+      </p:sp>
+      <p:sp>
+        <p:nvSpPr>
+          <p:cNvPr id="4" name="Footer Placeholder 3"/>
+          <p:cNvSpPr>
+            <a:spLocks noGrp="1"/>
+          </p:cNvSpPr>
+          <p:nvPr>
+            <p:ph type="ftr" sz="quarter" idx="3"/>
+          </p:nvPr>
+        </p:nvSpPr>
+        <p:spPr/>
+        <p:txBody>
+          <a:bodyPr/>
+          <a:lstStyle/>
+          <a:p>
+            <a:r>
+              <a:rPr lang="en-US" dirty="0" smtClean="0"/>
+              <a:t>HT- Debugging</a:t>
+            </a:r>
+            <a:endParaRPr lang="en-US" dirty="0"/>
+          </a:p>
+        </p:txBody>
+      </p:sp>
+      <p:pic>
+        <p:nvPicPr>
+          <p:cNvPr id="5" name="Picture 4" descr="ruby-exceptions.jpg"/>
+          <p:cNvPicPr>
+            <a:picLocks noChangeAspect="1"/>
+          </p:cNvPicPr>
+          <p:nvPr/>
+        </p:nvPicPr>
+        <p:blipFill rotWithShape="1">
+          <a:blip r:embed="rId2">
+            <a:extLst>
+              <a:ext uri="{28A0092B-C50C-407E-A947-70E740481C1C}">
+                <a14:useLocalDpi xmlns:a14="http://schemas.microsoft.com/office/drawing/2010/main" val="0"/>
+              </a:ext>
+            </a:extLst>
+          </a:blip>
+          <a:srcRect l="3185"/>
+          <a:stretch/>
+        </p:blipFill>
+        <p:spPr>
+          <a:xfrm>
+            <a:off x="3268702" y="-449362"/>
+            <a:ext cx="5984577" cy="7417783"/>
           </a:xfrm>
           <a:prstGeom prst="rect">
             <a:avLst/>
           </a:prstGeom>
         </p:spPr>
-        <p:txBody>
-          <a:bodyPr wrap="square">
-            <a:spAutoFit/>
-          </a:bodyPr>
-          <a:lstStyle/>
-          <a:p>
-            <a:pPr marL="457200" indent="-457200">
-              <a:buFont typeface="Arial"/>
-              <a:buChar char="•"/>
-            </a:pPr>
-            <a:r>
-              <a:rPr lang="en-US" sz="3200" dirty="0" smtClean="0"/>
-              <a:t>Debug “inline”</a:t>
-            </a:r>
-          </a:p>
-          <a:p>
-            <a:pPr marL="457200" indent="-457200">
-              <a:buFont typeface="Arial"/>
-              <a:buChar char="•"/>
-            </a:pPr>
-            <a:r>
-              <a:rPr lang="en-US" sz="3200" dirty="0" smtClean="0"/>
-              <a:t>Use a REPL (</a:t>
-            </a:r>
-            <a:r>
-              <a:rPr lang="en-US" sz="3200" dirty="0" err="1" smtClean="0"/>
-              <a:t>irb</a:t>
-            </a:r>
-            <a:r>
-              <a:rPr lang="en-US" sz="3200" dirty="0" smtClean="0"/>
-              <a:t> || pry)</a:t>
-            </a:r>
-          </a:p>
-          <a:p>
-            <a:pPr marL="457200" indent="-457200">
-              <a:buFont typeface="Arial"/>
-              <a:buChar char="•"/>
-            </a:pPr>
-            <a:r>
-              <a:rPr lang="en-US" sz="3200" dirty="0" smtClean="0"/>
-              <a:t>Guess &amp;&amp; Check</a:t>
-            </a:r>
-          </a:p>
-          <a:p>
-            <a:pPr marL="457200" indent="-457200">
-              <a:buFont typeface="Arial"/>
-              <a:buChar char="•"/>
-            </a:pPr>
-            <a:r>
-              <a:rPr lang="en-US" sz="3200" dirty="0" smtClean="0"/>
-              <a:t>Raise – Rescue</a:t>
-            </a:r>
-            <a:endParaRPr lang="en-US" sz="3200" dirty="0"/>
-          </a:p>
-        </p:txBody>
-      </p:sp>
+      </p:pic>
     </p:spTree>
     <p:extLst>
       <p:ext uri="{BB962C8B-B14F-4D97-AF65-F5344CB8AC3E}">
-        <p14:creationId xmlns:p14="http://schemas.microsoft.com/office/powerpoint/2010/main" val="3214389839"/>
+        <p14:creationId xmlns:p14="http://schemas.microsoft.com/office/powerpoint/2010/main" val="3925979293"/>
       </p:ext>
     </p:extLst>
   </p:cSld>
@@ -2583,7 +2553,7 @@
           <a:p>
             <a:r>
               <a:rPr lang="en-US" dirty="0" smtClean="0"/>
-              <a:t>Debugging “inline”</a:t>
+              <a:t>Strategies</a:t>
             </a:r>
             <a:endParaRPr lang="en-US" dirty="0"/>
           </a:p>
@@ -2620,8 +2590,8 @@
         </p:nvSpPr>
         <p:spPr>
           <a:xfrm>
-            <a:off x="274194" y="1671589"/>
-            <a:ext cx="8412605" cy="2400657"/>
+            <a:off x="457200" y="1671589"/>
+            <a:ext cx="8229599" cy="3046988"/>
           </a:xfrm>
           <a:prstGeom prst="rect">
             <a:avLst/>
@@ -2638,8 +2608,375 @@
               <a:buChar char="•"/>
             </a:pPr>
             <a:r>
+              <a:rPr lang="en-US" sz="3200" dirty="0"/>
+              <a:t>Read the error messages</a:t>
+            </a:r>
+            <a:r>
+              <a:rPr lang="en-US" sz="3200" dirty="0" smtClean="0"/>
+              <a:t>!</a:t>
+            </a:r>
+            <a:endParaRPr lang="en-US" sz="3200" dirty="0"/>
+          </a:p>
+          <a:p>
+            <a:pPr marL="457200" indent="-457200">
+              <a:buFont typeface="Arial"/>
+              <a:buChar char="•"/>
+            </a:pPr>
+            <a:r>
+              <a:rPr lang="en-US" sz="3200" dirty="0"/>
+              <a:t>Know what your expected behavior is.</a:t>
+            </a:r>
+          </a:p>
+          <a:p>
+            <a:pPr marL="457200" indent="-457200">
+              <a:buFont typeface="Arial"/>
+              <a:buChar char="•"/>
+            </a:pPr>
+            <a:r>
+              <a:rPr lang="en-US" sz="3200" dirty="0" smtClean="0"/>
+              <a:t>Verify and understand </a:t>
+            </a:r>
+            <a:r>
+              <a:rPr lang="en-US" sz="3200" dirty="0"/>
+              <a:t>the input(s).</a:t>
+            </a:r>
+          </a:p>
+          <a:p>
+            <a:pPr marL="457200" indent="-457200">
+              <a:buFont typeface="Arial"/>
+              <a:buChar char="•"/>
+            </a:pPr>
+            <a:r>
+              <a:rPr lang="en-US" sz="3200" dirty="0" smtClean="0"/>
+              <a:t>Verify </a:t>
+            </a:r>
+            <a:r>
+              <a:rPr lang="en-US" sz="3200" dirty="0"/>
+              <a:t>the </a:t>
+            </a:r>
+            <a:r>
+              <a:rPr lang="en-US" sz="3200" dirty="0" smtClean="0"/>
+              <a:t>program / variable </a:t>
+            </a:r>
+            <a:r>
+              <a:rPr lang="en-US" sz="3200" dirty="0"/>
+              <a:t>state.</a:t>
+            </a:r>
+          </a:p>
+          <a:p>
+            <a:pPr marL="457200" indent="-457200">
+              <a:buFont typeface="Arial"/>
+              <a:buChar char="•"/>
+            </a:pPr>
+            <a:r>
+              <a:rPr lang="en-US" sz="3200" dirty="0"/>
+              <a:t>Make </a:t>
+            </a:r>
+            <a:r>
+              <a:rPr lang="en-US" sz="3200" dirty="0" smtClean="0"/>
+              <a:t>small incremental </a:t>
+            </a:r>
+            <a:r>
+              <a:rPr lang="en-US" sz="3200" dirty="0"/>
+              <a:t>changes.</a:t>
+            </a:r>
+          </a:p>
+          <a:p>
+            <a:pPr marL="457200" indent="-457200">
+              <a:buFont typeface="Arial"/>
+              <a:buChar char="•"/>
+            </a:pPr>
+            <a:r>
+              <a:rPr lang="en-US" sz="3200" dirty="0"/>
+              <a:t>Check your assumptions.</a:t>
+            </a:r>
+          </a:p>
+        </p:txBody>
+      </p:sp>
+    </p:spTree>
+    <p:extLst>
+      <p:ext uri="{BB962C8B-B14F-4D97-AF65-F5344CB8AC3E}">
+        <p14:creationId xmlns:p14="http://schemas.microsoft.com/office/powerpoint/2010/main" val="1054351687"/>
+      </p:ext>
+    </p:extLst>
+  </p:cSld>
+  <p:clrMapOvr>
+    <a:masterClrMapping/>
+  </p:clrMapOvr>
+  <p:timing>
+    <p:tnLst>
+      <p:par>
+        <p:cTn xmlns:p14="http://schemas.microsoft.com/office/powerpoint/2010/main" id="1" dur="indefinite" restart="never" nodeType="tmRoot"/>
+      </p:par>
+    </p:tnLst>
+  </p:timing>
+</p:sld>
+</file>
+
+<file path=ppt/slides/slide13.xml><?xml version="1.0" encoding="utf-8"?>
+<p:sld xmlns:a="http://schemas.openxmlformats.org/drawingml/2006/main" xmlns:r="http://schemas.openxmlformats.org/officeDocument/2006/relationships" xmlns:p="http://schemas.openxmlformats.org/presentationml/2006/main">
+  <p:cSld>
+    <p:spTree>
+      <p:nvGrpSpPr>
+        <p:cNvPr id="1" name=""/>
+        <p:cNvGrpSpPr/>
+        <p:nvPr/>
+      </p:nvGrpSpPr>
+      <p:grpSpPr>
+        <a:xfrm>
+          <a:off x="0" y="0"/>
+          <a:ext cx="0" cy="0"/>
+          <a:chOff x="0" y="0"/>
+          <a:chExt cx="0" cy="0"/>
+        </a:xfrm>
+      </p:grpSpPr>
+      <p:sp>
+        <p:nvSpPr>
+          <p:cNvPr id="2" name="Title 1"/>
+          <p:cNvSpPr>
+            <a:spLocks noGrp="1"/>
+          </p:cNvSpPr>
+          <p:nvPr>
+            <p:ph type="title"/>
+          </p:nvPr>
+        </p:nvSpPr>
+        <p:spPr/>
+        <p:txBody>
+          <a:bodyPr/>
+          <a:lstStyle/>
+          <a:p>
+            <a:r>
+              <a:rPr lang="en-US" dirty="0" smtClean="0"/>
+              <a:t>Strategies</a:t>
+            </a:r>
+            <a:endParaRPr lang="en-US" dirty="0"/>
+          </a:p>
+        </p:txBody>
+      </p:sp>
+      <p:sp>
+        <p:nvSpPr>
+          <p:cNvPr id="4" name="Footer Placeholder 3"/>
+          <p:cNvSpPr>
+            <a:spLocks noGrp="1"/>
+          </p:cNvSpPr>
+          <p:nvPr>
+            <p:ph type="ftr" sz="quarter" idx="3"/>
+          </p:nvPr>
+        </p:nvSpPr>
+        <p:spPr/>
+        <p:txBody>
+          <a:bodyPr/>
+          <a:lstStyle/>
+          <a:p>
+            <a:r>
+              <a:rPr lang="en-US" dirty="0" smtClean="0"/>
+              <a:t>HT- Debugging</a:t>
+            </a:r>
+            <a:endParaRPr lang="en-US" dirty="0"/>
+          </a:p>
+        </p:txBody>
+      </p:sp>
+      <p:sp>
+        <p:nvSpPr>
+          <p:cNvPr id="3" name="Rectangle 2"/>
+          <p:cNvSpPr/>
+          <p:nvPr/>
+        </p:nvSpPr>
+        <p:spPr>
+          <a:xfrm>
+            <a:off x="2112611" y="2533358"/>
+            <a:ext cx="5154212" cy="2062103"/>
+          </a:xfrm>
+          <a:prstGeom prst="rect">
+            <a:avLst/>
+          </a:prstGeom>
+        </p:spPr>
+        <p:txBody>
+          <a:bodyPr wrap="square">
+            <a:spAutoFit/>
+          </a:bodyPr>
+          <a:lstStyle/>
+          <a:p>
+            <a:pPr marL="457200" indent="-457200">
+              <a:buFont typeface="Arial"/>
+              <a:buChar char="•"/>
+            </a:pPr>
+            <a:r>
+              <a:rPr lang="en-US" sz="3200" dirty="0" smtClean="0"/>
+              <a:t>Debug “inline”</a:t>
+            </a:r>
+          </a:p>
+          <a:p>
+            <a:pPr marL="457200" indent="-457200">
+              <a:buFont typeface="Arial"/>
+              <a:buChar char="•"/>
+            </a:pPr>
+            <a:r>
+              <a:rPr lang="en-US" sz="3200" dirty="0" smtClean="0"/>
+              <a:t>Use a REPL (</a:t>
+            </a:r>
+            <a:r>
+              <a:rPr lang="en-US" sz="3200" dirty="0" err="1" smtClean="0"/>
+              <a:t>irb</a:t>
+            </a:r>
+            <a:r>
+              <a:rPr lang="en-US" sz="3200" dirty="0" smtClean="0"/>
+              <a:t> || pry)</a:t>
+            </a:r>
+          </a:p>
+          <a:p>
+            <a:pPr marL="457200" indent="-457200">
+              <a:buFont typeface="Arial"/>
+              <a:buChar char="•"/>
+            </a:pPr>
+            <a:r>
+              <a:rPr lang="en-US" sz="3200" dirty="0" smtClean="0"/>
+              <a:t>Guess &amp;&amp; Check</a:t>
+            </a:r>
+          </a:p>
+          <a:p>
+            <a:pPr marL="457200" indent="-457200">
+              <a:buFont typeface="Arial"/>
+              <a:buChar char="•"/>
+            </a:pPr>
+            <a:r>
+              <a:rPr lang="en-US" sz="3200" dirty="0" smtClean="0"/>
+              <a:t>Raise – Rescue</a:t>
+            </a:r>
+            <a:endParaRPr lang="en-US" sz="3200" dirty="0"/>
+          </a:p>
+        </p:txBody>
+      </p:sp>
+    </p:spTree>
+    <p:extLst>
+      <p:ext uri="{BB962C8B-B14F-4D97-AF65-F5344CB8AC3E}">
+        <p14:creationId xmlns:p14="http://schemas.microsoft.com/office/powerpoint/2010/main" val="3214389839"/>
+      </p:ext>
+    </p:extLst>
+  </p:cSld>
+  <p:clrMapOvr>
+    <a:masterClrMapping/>
+  </p:clrMapOvr>
+  <p:timing>
+    <p:tnLst>
+      <p:par>
+        <p:cTn xmlns:p14="http://schemas.microsoft.com/office/powerpoint/2010/main" id="1" dur="indefinite" restart="never" nodeType="tmRoot"/>
+      </p:par>
+    </p:tnLst>
+  </p:timing>
+</p:sld>
+</file>
+
+<file path=ppt/slides/slide14.xml><?xml version="1.0" encoding="utf-8"?>
+<p:sld xmlns:a="http://schemas.openxmlformats.org/drawingml/2006/main" xmlns:r="http://schemas.openxmlformats.org/officeDocument/2006/relationships" xmlns:p="http://schemas.openxmlformats.org/presentationml/2006/main">
+  <p:cSld>
+    <p:spTree>
+      <p:nvGrpSpPr>
+        <p:cNvPr id="1" name=""/>
+        <p:cNvGrpSpPr/>
+        <p:nvPr/>
+      </p:nvGrpSpPr>
+      <p:grpSpPr>
+        <a:xfrm>
+          <a:off x="0" y="0"/>
+          <a:ext cx="0" cy="0"/>
+          <a:chOff x="0" y="0"/>
+          <a:chExt cx="0" cy="0"/>
+        </a:xfrm>
+      </p:grpSpPr>
+      <p:sp>
+        <p:nvSpPr>
+          <p:cNvPr id="2" name="Title 1"/>
+          <p:cNvSpPr>
+            <a:spLocks noGrp="1"/>
+          </p:cNvSpPr>
+          <p:nvPr>
+            <p:ph type="title"/>
+          </p:nvPr>
+        </p:nvSpPr>
+        <p:spPr/>
+        <p:txBody>
+          <a:bodyPr/>
+          <a:lstStyle/>
+          <a:p>
+            <a:r>
+              <a:rPr lang="en-US" dirty="0" smtClean="0"/>
+              <a:t>Debugging “inline”</a:t>
+            </a:r>
+            <a:endParaRPr lang="en-US" dirty="0"/>
+          </a:p>
+        </p:txBody>
+      </p:sp>
+      <p:sp>
+        <p:nvSpPr>
+          <p:cNvPr id="4" name="Footer Placeholder 3"/>
+          <p:cNvSpPr>
+            <a:spLocks noGrp="1"/>
+          </p:cNvSpPr>
+          <p:nvPr>
+            <p:ph type="ftr" sz="quarter" idx="3"/>
+          </p:nvPr>
+        </p:nvSpPr>
+        <p:spPr/>
+        <p:txBody>
+          <a:bodyPr/>
+          <a:lstStyle/>
+          <a:p>
+            <a:r>
+              <a:rPr lang="en-US" dirty="0" smtClean="0"/>
+              <a:t>HT- Debugging</a:t>
+            </a:r>
+            <a:endParaRPr lang="en-US" dirty="0"/>
+          </a:p>
+        </p:txBody>
+      </p:sp>
+      <p:sp>
+        <p:nvSpPr>
+          <p:cNvPr id="3" name="Rectangle 2"/>
+          <p:cNvSpPr/>
+          <p:nvPr/>
+        </p:nvSpPr>
+        <p:spPr>
+          <a:xfrm>
+            <a:off x="274194" y="1671589"/>
+            <a:ext cx="8412605" cy="3323987"/>
+          </a:xfrm>
+          <a:prstGeom prst="rect">
+            <a:avLst/>
+          </a:prstGeom>
+        </p:spPr>
+        <p:txBody>
+          <a:bodyPr wrap="square">
+            <a:spAutoFit/>
+          </a:bodyPr>
+          <a:lstStyle/>
+          <a:p>
+            <a:pPr marL="457200" indent="-457200">
+              <a:buFont typeface="Arial"/>
+              <a:buChar char="•"/>
+            </a:pPr>
+            <a:r>
               <a:rPr lang="en-US" sz="3000" dirty="0" smtClean="0"/>
-              <a:t>Use p statements to quickly show variable’s value</a:t>
+              <a:t>Use p statements to quickly show variable’s </a:t>
+            </a:r>
+            <a:r>
+              <a:rPr lang="en-US" sz="3000" dirty="0" smtClean="0"/>
+              <a:t>value</a:t>
+            </a:r>
+            <a:br>
+              <a:rPr lang="en-US" sz="3000" dirty="0" smtClean="0"/>
+            </a:br>
+            <a:r>
+              <a:rPr lang="en-US" sz="3000" dirty="0" smtClean="0"/>
+              <a:t>p @</a:t>
+            </a:r>
+            <a:r>
+              <a:rPr lang="en-US" sz="3000" dirty="0" err="1" smtClean="0"/>
+              <a:t>some_variable</a:t>
+            </a:r>
+            <a:r>
+              <a:rPr lang="en-US" sz="3000" dirty="0" smtClean="0"/>
+              <a:t/>
             </a:r>
             <a:br>
               <a:rPr lang="en-US" sz="3000" dirty="0" smtClean="0"/>
@@ -2653,8 +2990,13 @@
             </a:pPr>
             <a:r>
               <a:rPr lang="en-US" sz="3000" dirty="0" smtClean="0"/>
-              <a:t>Quickly determine if you are reaching a method </a:t>
-            </a:r>
+              <a:t>Quickly </a:t>
+            </a:r>
+            <a:r>
+              <a:rPr lang="en-US" sz="3000" dirty="0" smtClean="0"/>
+              <a:t>determine if you are reaching a method </a:t>
+            </a:r>
+            <a:endParaRPr lang="en-US" sz="3000" dirty="0" smtClean="0"/>
           </a:p>
           <a:p>
             <a:pPr marL="457200" indent="-457200">
@@ -2662,21 +3004,43 @@
               <a:buChar char="•"/>
             </a:pPr>
             <a:r>
+              <a:rPr lang="en-US" sz="3000" dirty="0" err="1" smtClean="0"/>
+              <a:t>def</a:t>
+            </a:r>
+            <a:r>
               <a:rPr lang="en-US" sz="3000" dirty="0" smtClean="0"/>
-              <a:t>Use “signaling code” to easily flag your spot</a:t>
+              <a:t> </a:t>
+            </a:r>
+            <a:r>
+              <a:rPr lang="en-US" sz="3000" dirty="0" err="1" smtClean="0"/>
+              <a:t>some_method</a:t>
+            </a:r>
+            <a:r>
+              <a:rPr lang="en-US" sz="3000" dirty="0" smtClean="0"/>
+              <a:t/>
             </a:r>
             <a:br>
               <a:rPr lang="en-US" sz="3000" dirty="0" smtClean="0"/>
             </a:br>
             <a:r>
+              <a:rPr lang="en-US" sz="3000" dirty="0" smtClean="0"/>
+              <a:t>	p “HIT: </a:t>
+            </a:r>
+            <a:r>
               <a:rPr lang="en-US" sz="3000" dirty="0" err="1" smtClean="0"/>
-              <a:t>ie</a:t>
+              <a:t>some_method</a:t>
             </a:r>
             <a:r>
               <a:rPr lang="en-US" sz="3000" dirty="0" smtClean="0"/>
-              <a:t>: p “~” * 80</a:t>
-            </a:r>
-            <a:endParaRPr lang="en-US" sz="3000" dirty="0"/>
+              <a:t>”</a:t>
+            </a:r>
+            <a:br>
+              <a:rPr lang="en-US" sz="3000" dirty="0" smtClean="0"/>
+            </a:br>
+            <a:r>
+              <a:rPr lang="en-US" sz="3000" dirty="0" smtClean="0"/>
+              <a:t>end</a:t>
+            </a:r>
           </a:p>
         </p:txBody>
       </p:sp>
@@ -2700,7 +3064,376 @@
 </p:sld>
 </file>
 
-<file path=ppt/slides/slide13.xml><?xml version="1.0" encoding="utf-8"?>
+<file path=ppt/slides/slide15.xml><?xml version="1.0" encoding="utf-8"?>
+<p:sld xmlns:a="http://schemas.openxmlformats.org/drawingml/2006/main" xmlns:r="http://schemas.openxmlformats.org/officeDocument/2006/relationships" xmlns:p="http://schemas.openxmlformats.org/presentationml/2006/main">
+  <p:cSld>
+    <p:spTree>
+      <p:nvGrpSpPr>
+        <p:cNvPr id="1" name=""/>
+        <p:cNvGrpSpPr/>
+        <p:nvPr/>
+      </p:nvGrpSpPr>
+      <p:grpSpPr>
+        <a:xfrm>
+          <a:off x="0" y="0"/>
+          <a:ext cx="0" cy="0"/>
+          <a:chOff x="0" y="0"/>
+          <a:chExt cx="0" cy="0"/>
+        </a:xfrm>
+      </p:grpSpPr>
+      <p:sp>
+        <p:nvSpPr>
+          <p:cNvPr id="2" name="Title 1"/>
+          <p:cNvSpPr>
+            <a:spLocks noGrp="1"/>
+          </p:cNvSpPr>
+          <p:nvPr>
+            <p:ph type="title"/>
+          </p:nvPr>
+        </p:nvSpPr>
+        <p:spPr/>
+        <p:txBody>
+          <a:bodyPr/>
+          <a:lstStyle/>
+          <a:p>
+            <a:r>
+              <a:rPr lang="en-US" dirty="0" smtClean="0"/>
+              <a:t>Debugging “inline”</a:t>
+            </a:r>
+            <a:endParaRPr lang="en-US" dirty="0"/>
+          </a:p>
+        </p:txBody>
+      </p:sp>
+      <p:sp>
+        <p:nvSpPr>
+          <p:cNvPr id="4" name="Footer Placeholder 3"/>
+          <p:cNvSpPr>
+            <a:spLocks noGrp="1"/>
+          </p:cNvSpPr>
+          <p:nvPr>
+            <p:ph type="ftr" sz="quarter" idx="3"/>
+          </p:nvPr>
+        </p:nvSpPr>
+        <p:spPr/>
+        <p:txBody>
+          <a:bodyPr/>
+          <a:lstStyle/>
+          <a:p>
+            <a:r>
+              <a:rPr lang="en-US" dirty="0" smtClean="0"/>
+              <a:t>HT- Debugging</a:t>
+            </a:r>
+            <a:endParaRPr lang="en-US" dirty="0"/>
+          </a:p>
+        </p:txBody>
+      </p:sp>
+      <p:sp>
+        <p:nvSpPr>
+          <p:cNvPr id="3" name="Rectangle 2"/>
+          <p:cNvSpPr/>
+          <p:nvPr/>
+        </p:nvSpPr>
+        <p:spPr>
+          <a:xfrm>
+            <a:off x="274194" y="1671589"/>
+            <a:ext cx="8412605" cy="3785652"/>
+          </a:xfrm>
+          <a:prstGeom prst="rect">
+            <a:avLst/>
+          </a:prstGeom>
+        </p:spPr>
+        <p:txBody>
+          <a:bodyPr wrap="square">
+            <a:spAutoFit/>
+          </a:bodyPr>
+          <a:lstStyle/>
+          <a:p>
+            <a:pPr marL="457200" indent="-457200">
+              <a:buFont typeface="Arial"/>
+              <a:buChar char="•"/>
+            </a:pPr>
+            <a:r>
+              <a:rPr lang="en-US" sz="3000" dirty="0" smtClean="0"/>
+              <a:t>Terrific way to determine </a:t>
+            </a:r>
+            <a:r>
+              <a:rPr lang="en-US" sz="3000" dirty="0"/>
+              <a:t>flow </a:t>
+            </a:r>
+            <a:r>
+              <a:rPr lang="en-US" sz="3000" dirty="0" smtClean="0"/>
+              <a:t>control around conditional statements</a:t>
+            </a:r>
+            <a:br>
+              <a:rPr lang="en-US" sz="3000" dirty="0" smtClean="0"/>
+            </a:br>
+            <a:r>
+              <a:rPr lang="en-US" sz="3000" dirty="0" smtClean="0"/>
+              <a:t/>
+            </a:r>
+            <a:br>
+              <a:rPr lang="en-US" sz="3000" dirty="0" smtClean="0"/>
+            </a:br>
+            <a:r>
+              <a:rPr lang="en-US" sz="3000" dirty="0" smtClean="0"/>
+              <a:t>if </a:t>
+            </a:r>
+            <a:r>
+              <a:rPr lang="en-US" sz="3000" dirty="0" err="1" smtClean="0"/>
+              <a:t>num</a:t>
+            </a:r>
+            <a:r>
+              <a:rPr lang="en-US" sz="3000" dirty="0" smtClean="0"/>
+              <a:t> = 1</a:t>
+            </a:r>
+            <a:br>
+              <a:rPr lang="en-US" sz="3000" dirty="0" smtClean="0"/>
+            </a:br>
+            <a:r>
+              <a:rPr lang="en-US" sz="3000" dirty="0" smtClean="0"/>
+              <a:t>  p “inside if”</a:t>
+            </a:r>
+            <a:br>
+              <a:rPr lang="en-US" sz="3000" dirty="0" smtClean="0"/>
+            </a:br>
+            <a:r>
+              <a:rPr lang="en-US" sz="3000" dirty="0" smtClean="0"/>
+              <a:t>else</a:t>
+            </a:r>
+            <a:br>
+              <a:rPr lang="en-US" sz="3000" dirty="0" smtClean="0"/>
+            </a:br>
+            <a:r>
+              <a:rPr lang="en-US" sz="3000" dirty="0" smtClean="0"/>
+              <a:t>  p “inside else”</a:t>
+            </a:r>
+            <a:br>
+              <a:rPr lang="en-US" sz="3000" dirty="0" smtClean="0"/>
+            </a:br>
+            <a:r>
+              <a:rPr lang="en-US" sz="3000" dirty="0" smtClean="0"/>
+              <a:t>end</a:t>
+            </a:r>
+          </a:p>
+        </p:txBody>
+      </p:sp>
+    </p:spTree>
+    <p:extLst>
+      <p:ext uri="{BB962C8B-B14F-4D97-AF65-F5344CB8AC3E}">
+        <p14:creationId xmlns:p14="http://schemas.microsoft.com/office/powerpoint/2010/main" val="1158113537"/>
+      </p:ext>
+    </p:extLst>
+  </p:cSld>
+  <p:clrMapOvr>
+    <a:masterClrMapping/>
+  </p:clrMapOvr>
+  <p:timing>
+    <p:tnLst>
+      <p:par>
+        <p:cTn xmlns:p14="http://schemas.microsoft.com/office/powerpoint/2010/main" id="1" dur="indefinite" restart="never" nodeType="tmRoot"/>
+      </p:par>
+    </p:tnLst>
+  </p:timing>
+</p:sld>
+</file>
+
+<file path=ppt/slides/slide16.xml><?xml version="1.0" encoding="utf-8"?>
+<p:sld xmlns:a="http://schemas.openxmlformats.org/drawingml/2006/main" xmlns:r="http://schemas.openxmlformats.org/officeDocument/2006/relationships" xmlns:p="http://schemas.openxmlformats.org/presentationml/2006/main">
+  <p:cSld>
+    <p:spTree>
+      <p:nvGrpSpPr>
+        <p:cNvPr id="1" name=""/>
+        <p:cNvGrpSpPr/>
+        <p:nvPr/>
+      </p:nvGrpSpPr>
+      <p:grpSpPr>
+        <a:xfrm>
+          <a:off x="0" y="0"/>
+          <a:ext cx="0" cy="0"/>
+          <a:chOff x="0" y="0"/>
+          <a:chExt cx="0" cy="0"/>
+        </a:xfrm>
+      </p:grpSpPr>
+      <p:sp>
+        <p:nvSpPr>
+          <p:cNvPr id="2" name="Title 1"/>
+          <p:cNvSpPr>
+            <a:spLocks noGrp="1"/>
+          </p:cNvSpPr>
+          <p:nvPr>
+            <p:ph type="title"/>
+          </p:nvPr>
+        </p:nvSpPr>
+        <p:spPr/>
+        <p:txBody>
+          <a:bodyPr/>
+          <a:lstStyle/>
+          <a:p>
+            <a:r>
+              <a:rPr lang="en-US" dirty="0" smtClean="0"/>
+              <a:t>Debugging “inline”</a:t>
+            </a:r>
+            <a:endParaRPr lang="en-US" dirty="0"/>
+          </a:p>
+        </p:txBody>
+      </p:sp>
+      <p:sp>
+        <p:nvSpPr>
+          <p:cNvPr id="4" name="Footer Placeholder 3"/>
+          <p:cNvSpPr>
+            <a:spLocks noGrp="1"/>
+          </p:cNvSpPr>
+          <p:nvPr>
+            <p:ph type="ftr" sz="quarter" idx="3"/>
+          </p:nvPr>
+        </p:nvSpPr>
+        <p:spPr/>
+        <p:txBody>
+          <a:bodyPr/>
+          <a:lstStyle/>
+          <a:p>
+            <a:r>
+              <a:rPr lang="en-US" dirty="0" smtClean="0"/>
+              <a:t>HT- Debugging</a:t>
+            </a:r>
+            <a:endParaRPr lang="en-US" dirty="0"/>
+          </a:p>
+        </p:txBody>
+      </p:sp>
+      <p:sp>
+        <p:nvSpPr>
+          <p:cNvPr id="3" name="Rectangle 2"/>
+          <p:cNvSpPr/>
+          <p:nvPr/>
+        </p:nvSpPr>
+        <p:spPr>
+          <a:xfrm>
+            <a:off x="274194" y="1671589"/>
+            <a:ext cx="8412605" cy="4247317"/>
+          </a:xfrm>
+          <a:prstGeom prst="rect">
+            <a:avLst/>
+          </a:prstGeom>
+        </p:spPr>
+        <p:txBody>
+          <a:bodyPr wrap="square">
+            <a:spAutoFit/>
+          </a:bodyPr>
+          <a:lstStyle/>
+          <a:p>
+            <a:endParaRPr lang="en-US" sz="3000" dirty="0" smtClean="0"/>
+          </a:p>
+          <a:p>
+            <a:pPr marL="457200" indent="-457200">
+              <a:buFont typeface="Arial"/>
+              <a:buChar char="•"/>
+            </a:pPr>
+            <a:r>
+              <a:rPr lang="en-US" sz="3000" dirty="0" smtClean="0"/>
+              <a:t>Use </a:t>
+            </a:r>
+            <a:r>
+              <a:rPr lang="en-US" sz="3000" dirty="0" smtClean="0"/>
+              <a:t>“signaling code” to easily flag your </a:t>
+            </a:r>
+            <a:r>
+              <a:rPr lang="en-US" sz="3000" dirty="0" smtClean="0"/>
+              <a:t>spot in conjunction with a variable check</a:t>
+            </a:r>
+            <a:r>
+              <a:rPr lang="en-US" sz="3000" dirty="0" smtClean="0"/>
+              <a:t/>
+            </a:r>
+            <a:br>
+              <a:rPr lang="en-US" sz="3000" dirty="0" smtClean="0"/>
+            </a:br>
+            <a:r>
+              <a:rPr lang="en-US" sz="3000" dirty="0" smtClean="0"/>
+              <a:t>p </a:t>
+            </a:r>
+            <a:r>
+              <a:rPr lang="en-US" sz="3000" dirty="0" smtClean="0"/>
+              <a:t>“~” * </a:t>
+            </a:r>
+            <a:r>
+              <a:rPr lang="en-US" sz="3000" dirty="0" smtClean="0"/>
+              <a:t>80</a:t>
+            </a:r>
+          </a:p>
+          <a:p>
+            <a:pPr marL="457200" indent="-457200">
+              <a:buFont typeface="Arial"/>
+              <a:buChar char="•"/>
+            </a:pPr>
+            <a:r>
+              <a:rPr lang="en-US" sz="3000" dirty="0" smtClean="0"/>
+              <a:t>p @</a:t>
+            </a:r>
+            <a:r>
+              <a:rPr lang="en-US" sz="3000" dirty="0" err="1" smtClean="0"/>
+              <a:t>variable_in_question</a:t>
+            </a:r>
+            <a:endParaRPr lang="en-US" sz="3000" dirty="0" smtClean="0"/>
+          </a:p>
+          <a:p>
+            <a:pPr marL="457200" indent="-457200">
+              <a:buFont typeface="Arial"/>
+              <a:buChar char="•"/>
+            </a:pPr>
+            <a:r>
+              <a:rPr lang="en-US" sz="3000" dirty="0" smtClean="0"/>
+              <a:t>p “~” * 80</a:t>
+            </a:r>
+          </a:p>
+          <a:p>
+            <a:pPr marL="457200" indent="-457200">
+              <a:buFont typeface="Arial"/>
+              <a:buChar char="•"/>
+            </a:pPr>
+            <a:endParaRPr lang="en-US" sz="3000" dirty="0"/>
+          </a:p>
+          <a:p>
+            <a:pPr marL="457200" indent="-457200">
+              <a:buFont typeface="Arial"/>
+              <a:buChar char="•"/>
+            </a:pPr>
+            <a:r>
+              <a:rPr lang="en-US" sz="3000" dirty="0" smtClean="0"/>
+              <a:t>This is very useful in larger applications and when p-</a:t>
+            </a:r>
+            <a:r>
+              <a:rPr lang="en-US" sz="3000" dirty="0" err="1" smtClean="0"/>
+              <a:t>ing</a:t>
+            </a:r>
+            <a:r>
+              <a:rPr lang="en-US" sz="3000" dirty="0" smtClean="0"/>
+              <a:t> to a server console.</a:t>
+            </a:r>
+            <a:endParaRPr lang="en-US" sz="3000" dirty="0"/>
+          </a:p>
+        </p:txBody>
+      </p:sp>
+    </p:spTree>
+    <p:extLst>
+      <p:ext uri="{BB962C8B-B14F-4D97-AF65-F5344CB8AC3E}">
+        <p14:creationId xmlns:p14="http://schemas.microsoft.com/office/powerpoint/2010/main" val="1026277586"/>
+      </p:ext>
+    </p:extLst>
+  </p:cSld>
+  <p:clrMapOvr>
+    <a:masterClrMapping/>
+  </p:clrMapOvr>
+  <p:timing>
+    <p:tnLst>
+      <p:par>
+        <p:cTn xmlns:p14="http://schemas.microsoft.com/office/powerpoint/2010/main" id="1" dur="indefinite" restart="never" nodeType="tmRoot"/>
+      </p:par>
+    </p:tnLst>
+  </p:timing>
+</p:sld>
+</file>
+
+<file path=ppt/slides/slide17.xml><?xml version="1.0" encoding="utf-8"?>
 <p:sld xmlns:a="http://schemas.openxmlformats.org/drawingml/2006/main" xmlns:r="http://schemas.openxmlformats.org/officeDocument/2006/relationships" xmlns:p="http://schemas.openxmlformats.org/presentationml/2006/main">
   <p:cSld>
     <p:spTree>
@@ -2813,7 +3546,7 @@
 </p:sld>
 </file>
 
-<file path=ppt/slides/slide14.xml><?xml version="1.0" encoding="utf-8"?>
+<file path=ppt/slides/slide18.xml><?xml version="1.0" encoding="utf-8"?>
 <p:sld xmlns:a="http://schemas.openxmlformats.org/drawingml/2006/main" xmlns:r="http://schemas.openxmlformats.org/officeDocument/2006/relationships" xmlns:p="http://schemas.openxmlformats.org/presentationml/2006/main">
   <p:cSld>
     <p:spTree>
@@ -2997,7 +3730,7 @@
 </p:sld>
 </file>
 
-<file path=ppt/slides/slide15.xml><?xml version="1.0" encoding="utf-8"?>
+<file path=ppt/slides/slide19.xml><?xml version="1.0" encoding="utf-8"?>
 <p:sld xmlns:a="http://schemas.openxmlformats.org/drawingml/2006/main" xmlns:r="http://schemas.openxmlformats.org/officeDocument/2006/relationships" xmlns:p="http://schemas.openxmlformats.org/presentationml/2006/main">
   <p:cSld>
     <p:spTree>
@@ -3177,7 +3910,7 @@
 </p:sld>
 </file>
 
-<file path=ppt/slides/slide16.xml><?xml version="1.0" encoding="utf-8"?>
+<file path=ppt/slides/slide2.xml><?xml version="1.0" encoding="utf-8"?>
 <p:sld xmlns:a="http://schemas.openxmlformats.org/drawingml/2006/main" xmlns:r="http://schemas.openxmlformats.org/officeDocument/2006/relationships" xmlns:p="http://schemas.openxmlformats.org/presentationml/2006/main">
   <p:cSld>
     <p:spTree>
@@ -3210,6 +3943,152 @@
           <a:lstStyle/>
           <a:p>
             <a:r>
+              <a:rPr lang="en-US" dirty="0" smtClean="0"/>
+              <a:t>Topics Covered</a:t>
+            </a:r>
+            <a:endParaRPr lang="en-US" dirty="0"/>
+          </a:p>
+        </p:txBody>
+      </p:sp>
+      <p:sp>
+        <p:nvSpPr>
+          <p:cNvPr id="3" name="Content Placeholder 2"/>
+          <p:cNvSpPr>
+            <a:spLocks noGrp="1"/>
+          </p:cNvSpPr>
+          <p:nvPr>
+            <p:ph idx="1"/>
+          </p:nvPr>
+        </p:nvSpPr>
+        <p:spPr/>
+        <p:txBody>
+          <a:bodyPr/>
+          <a:lstStyle/>
+          <a:p>
+            <a:r>
+              <a:rPr lang="en-US" dirty="0" smtClean="0"/>
+              <a:t>History</a:t>
+            </a:r>
+          </a:p>
+          <a:p>
+            <a:r>
+              <a:rPr lang="en-US" dirty="0" smtClean="0"/>
+              <a:t>Reading Error messages</a:t>
+            </a:r>
+          </a:p>
+          <a:p>
+            <a:r>
+              <a:rPr lang="en-US" dirty="0" smtClean="0"/>
+              <a:t>Different Strategies for attack</a:t>
+            </a:r>
+            <a:endParaRPr lang="en-US" dirty="0"/>
+          </a:p>
+          <a:p>
+            <a:r>
+              <a:rPr lang="en-US" dirty="0" smtClean="0"/>
+              <a:t>Tools</a:t>
+            </a:r>
+          </a:p>
+          <a:p>
+            <a:r>
+              <a:rPr lang="en-US" dirty="0" smtClean="0"/>
+              <a:t>Cleanup some code (maybe)</a:t>
+            </a:r>
+          </a:p>
+          <a:p>
+            <a:r>
+              <a:rPr lang="en-US" dirty="0" smtClean="0"/>
+              <a:t>Ten most common errors </a:t>
+            </a:r>
+            <a:r>
+              <a:rPr lang="en-US" smtClean="0"/>
+              <a:t>with examples</a:t>
+            </a:r>
+          </a:p>
+          <a:p>
+            <a:endParaRPr lang="en-US" dirty="0" smtClean="0"/>
+          </a:p>
+          <a:p>
+            <a:endParaRPr lang="en-US" dirty="0"/>
+          </a:p>
+        </p:txBody>
+      </p:sp>
+      <p:sp>
+        <p:nvSpPr>
+          <p:cNvPr id="4" name="Footer Placeholder 3"/>
+          <p:cNvSpPr>
+            <a:spLocks noGrp="1"/>
+          </p:cNvSpPr>
+          <p:nvPr>
+            <p:ph type="ftr" sz="quarter" idx="3"/>
+          </p:nvPr>
+        </p:nvSpPr>
+        <p:spPr/>
+        <p:txBody>
+          <a:bodyPr/>
+          <a:lstStyle/>
+          <a:p>
+            <a:r>
+              <a:rPr lang="en-US" dirty="0" smtClean="0"/>
+              <a:t>HT- Debugging</a:t>
+            </a:r>
+            <a:endParaRPr lang="en-US" dirty="0"/>
+          </a:p>
+        </p:txBody>
+      </p:sp>
+    </p:spTree>
+    <p:extLst>
+      <p:ext uri="{BB962C8B-B14F-4D97-AF65-F5344CB8AC3E}">
+        <p14:creationId xmlns:p14="http://schemas.microsoft.com/office/powerpoint/2010/main" val="3810739364"/>
+      </p:ext>
+    </p:extLst>
+  </p:cSld>
+  <p:clrMapOvr>
+    <a:masterClrMapping/>
+  </p:clrMapOvr>
+  <p:timing>
+    <p:tnLst>
+      <p:par>
+        <p:cTn xmlns:p14="http://schemas.microsoft.com/office/powerpoint/2010/main" id="1" dur="indefinite" restart="never" nodeType="tmRoot"/>
+      </p:par>
+    </p:tnLst>
+  </p:timing>
+</p:sld>
+</file>
+
+<file path=ppt/slides/slide20.xml><?xml version="1.0" encoding="utf-8"?>
+<p:sld xmlns:a="http://schemas.openxmlformats.org/drawingml/2006/main" xmlns:r="http://schemas.openxmlformats.org/officeDocument/2006/relationships" xmlns:p="http://schemas.openxmlformats.org/presentationml/2006/main">
+  <p:cSld>
+    <p:spTree>
+      <p:nvGrpSpPr>
+        <p:cNvPr id="1" name=""/>
+        <p:cNvGrpSpPr/>
+        <p:nvPr/>
+      </p:nvGrpSpPr>
+      <p:grpSpPr>
+        <a:xfrm>
+          <a:off x="0" y="0"/>
+          <a:ext cx="0" cy="0"/>
+          <a:chOff x="0" y="0"/>
+          <a:chExt cx="0" cy="0"/>
+        </a:xfrm>
+      </p:grpSpPr>
+      <p:sp>
+        <p:nvSpPr>
+          <p:cNvPr id="2" name="Title 1"/>
+          <p:cNvSpPr>
+            <a:spLocks noGrp="1"/>
+          </p:cNvSpPr>
+          <p:nvPr>
+            <p:ph type="title"/>
+          </p:nvPr>
+        </p:nvSpPr>
+        <p:spPr/>
+        <p:txBody>
+          <a:bodyPr/>
+          <a:lstStyle/>
+          <a:p>
+            <a:r>
               <a:rPr lang="en-US" sz="4400" b="1" kern="1200" dirty="0" smtClean="0">
                 <a:solidFill>
                   <a:schemeClr val="accent1"/>
@@ -3256,8 +4135,8 @@
         </p:nvSpPr>
         <p:spPr>
           <a:xfrm>
-            <a:off x="259762" y="1822592"/>
-            <a:ext cx="8741663" cy="2554545"/>
+            <a:off x="2507338" y="2145144"/>
+            <a:ext cx="4174914" cy="2554545"/>
           </a:xfrm>
           <a:prstGeom prst="rect">
             <a:avLst/>
@@ -3339,7 +4218,7 @@
 </p:sld>
 </file>
 
-<file path=ppt/slides/slide17.xml><?xml version="1.0" encoding="utf-8"?>
+<file path=ppt/slides/slide21.xml><?xml version="1.0" encoding="utf-8"?>
 <p:sld xmlns:a="http://schemas.openxmlformats.org/drawingml/2006/main" xmlns:r="http://schemas.openxmlformats.org/officeDocument/2006/relationships" xmlns:p="http://schemas.openxmlformats.org/presentationml/2006/main">
   <p:cSld>
     <p:spTree>
@@ -3418,8 +4297,8 @@
         </p:nvSpPr>
         <p:spPr>
           <a:xfrm>
-            <a:off x="259762" y="1822592"/>
-            <a:ext cx="8741663" cy="3046988"/>
+            <a:off x="1539772" y="1822592"/>
+            <a:ext cx="6563592" cy="3046988"/>
           </a:xfrm>
           <a:prstGeom prst="rect">
             <a:avLst/>
@@ -3514,7 +4393,7 @@
 </p:sld>
 </file>
 
-<file path=ppt/slides/slide18.xml><?xml version="1.0" encoding="utf-8"?>
+<file path=ppt/slides/slide22.xml><?xml version="1.0" encoding="utf-8"?>
 <p:sld xmlns:a="http://schemas.openxmlformats.org/drawingml/2006/main" xmlns:r="http://schemas.openxmlformats.org/officeDocument/2006/relationships" xmlns:p="http://schemas.openxmlformats.org/presentationml/2006/main">
   <p:cSld>
     <p:bg>
@@ -3643,7 +4522,7 @@
 </p:sld>
 </file>
 
-<file path=ppt/slides/slide19.xml><?xml version="1.0" encoding="utf-8"?>
+<file path=ppt/slides/slide23.xml><?xml version="1.0" encoding="utf-8"?>
 <p:sld xmlns:a="http://schemas.openxmlformats.org/drawingml/2006/main" xmlns:r="http://schemas.openxmlformats.org/officeDocument/2006/relationships" xmlns:p="http://schemas.openxmlformats.org/presentationml/2006/main">
   <p:cSld>
     <p:bg>
@@ -3872,153 +4751,7 @@
 </p:sld>
 </file>
 
-<file path=ppt/slides/slide2.xml><?xml version="1.0" encoding="utf-8"?>
-<p:sld xmlns:a="http://schemas.openxmlformats.org/drawingml/2006/main" xmlns:r="http://schemas.openxmlformats.org/officeDocument/2006/relationships" xmlns:p="http://schemas.openxmlformats.org/presentationml/2006/main">
-  <p:cSld>
-    <p:spTree>
-      <p:nvGrpSpPr>
-        <p:cNvPr id="1" name=""/>
-        <p:cNvGrpSpPr/>
-        <p:nvPr/>
-      </p:nvGrpSpPr>
-      <p:grpSpPr>
-        <a:xfrm>
-          <a:off x="0" y="0"/>
-          <a:ext cx="0" cy="0"/>
-          <a:chOff x="0" y="0"/>
-          <a:chExt cx="0" cy="0"/>
-        </a:xfrm>
-      </p:grpSpPr>
-      <p:sp>
-        <p:nvSpPr>
-          <p:cNvPr id="2" name="Title 1"/>
-          <p:cNvSpPr>
-            <a:spLocks noGrp="1"/>
-          </p:cNvSpPr>
-          <p:nvPr>
-            <p:ph type="title"/>
-          </p:nvPr>
-        </p:nvSpPr>
-        <p:spPr/>
-        <p:txBody>
-          <a:bodyPr/>
-          <a:lstStyle/>
-          <a:p>
-            <a:r>
-              <a:rPr lang="en-US" dirty="0" smtClean="0"/>
-              <a:t>Lecture Topics</a:t>
-            </a:r>
-            <a:endParaRPr lang="en-US" dirty="0"/>
-          </a:p>
-        </p:txBody>
-      </p:sp>
-      <p:sp>
-        <p:nvSpPr>
-          <p:cNvPr id="3" name="Content Placeholder 2"/>
-          <p:cNvSpPr>
-            <a:spLocks noGrp="1"/>
-          </p:cNvSpPr>
-          <p:nvPr>
-            <p:ph idx="1"/>
-          </p:nvPr>
-        </p:nvSpPr>
-        <p:spPr/>
-        <p:txBody>
-          <a:bodyPr/>
-          <a:lstStyle/>
-          <a:p>
-            <a:r>
-              <a:rPr lang="en-US" dirty="0" smtClean="0"/>
-              <a:t>History</a:t>
-            </a:r>
-          </a:p>
-          <a:p>
-            <a:r>
-              <a:rPr lang="en-US" dirty="0" smtClean="0"/>
-              <a:t>Reading Error messages</a:t>
-            </a:r>
-          </a:p>
-          <a:p>
-            <a:r>
-              <a:rPr lang="en-US" dirty="0" smtClean="0"/>
-              <a:t>Different Strategies for attack</a:t>
-            </a:r>
-            <a:endParaRPr lang="en-US" dirty="0"/>
-          </a:p>
-          <a:p>
-            <a:r>
-              <a:rPr lang="en-US" dirty="0" smtClean="0"/>
-              <a:t>Tools</a:t>
-            </a:r>
-          </a:p>
-          <a:p>
-            <a:r>
-              <a:rPr lang="en-US" dirty="0" smtClean="0"/>
-              <a:t>Cleanup some code (maybe)</a:t>
-            </a:r>
-          </a:p>
-          <a:p>
-            <a:r>
-              <a:rPr lang="en-US" dirty="0" smtClean="0"/>
-              <a:t>Ten most common errors </a:t>
-            </a:r>
-            <a:r>
-              <a:rPr lang="en-US" smtClean="0"/>
-              <a:t>with examples</a:t>
-            </a:r>
-          </a:p>
-          <a:p>
-            <a:endParaRPr lang="en-US" dirty="0" smtClean="0"/>
-          </a:p>
-          <a:p>
-            <a:endParaRPr lang="en-US" dirty="0"/>
-          </a:p>
-        </p:txBody>
-      </p:sp>
-      <p:sp>
-        <p:nvSpPr>
-          <p:cNvPr id="4" name="Footer Placeholder 3"/>
-          <p:cNvSpPr>
-            <a:spLocks noGrp="1"/>
-          </p:cNvSpPr>
-          <p:nvPr>
-            <p:ph type="ftr" sz="quarter" idx="3"/>
-          </p:nvPr>
-        </p:nvSpPr>
-        <p:spPr/>
-        <p:txBody>
-          <a:bodyPr/>
-          <a:lstStyle/>
-          <a:p>
-            <a:r>
-              <a:rPr lang="en-US" dirty="0" smtClean="0"/>
-              <a:t>HT- Debugging</a:t>
-            </a:r>
-            <a:endParaRPr lang="en-US" dirty="0"/>
-          </a:p>
-        </p:txBody>
-      </p:sp>
-    </p:spTree>
-    <p:extLst>
-      <p:ext uri="{BB962C8B-B14F-4D97-AF65-F5344CB8AC3E}">
-        <p14:creationId xmlns:p14="http://schemas.microsoft.com/office/powerpoint/2010/main" val="3810739364"/>
-      </p:ext>
-    </p:extLst>
-  </p:cSld>
-  <p:clrMapOvr>
-    <a:masterClrMapping/>
-  </p:clrMapOvr>
-  <p:timing>
-    <p:tnLst>
-      <p:par>
-        <p:cTn xmlns:p14="http://schemas.microsoft.com/office/powerpoint/2010/main" id="1" dur="indefinite" restart="never" nodeType="tmRoot"/>
-      </p:par>
-    </p:tnLst>
-  </p:timing>
-</p:sld>
-</file>
-
-<file path=ppt/slides/slide20.xml><?xml version="1.0" encoding="utf-8"?>
+<file path=ppt/slides/slide24.xml><?xml version="1.0" encoding="utf-8"?>
 <p:sld xmlns:a="http://schemas.openxmlformats.org/drawingml/2006/main" xmlns:r="http://schemas.openxmlformats.org/officeDocument/2006/relationships" xmlns:p="http://schemas.openxmlformats.org/presentationml/2006/main">
   <p:cSld>
     <p:bg>
@@ -4180,569 +4913,6 @@
     <p:extLst>
       <p:ext uri="{BB962C8B-B14F-4D97-AF65-F5344CB8AC3E}">
         <p14:creationId xmlns:p14="http://schemas.microsoft.com/office/powerpoint/2010/main" val="406319157"/>
-      </p:ext>
-    </p:extLst>
-  </p:cSld>
-  <p:clrMapOvr>
-    <a:masterClrMapping/>
-  </p:clrMapOvr>
-  <p:timing>
-    <p:tnLst>
-      <p:par>
-        <p:cTn xmlns:p14="http://schemas.microsoft.com/office/powerpoint/2010/main" id="1" dur="indefinite" restart="never" nodeType="tmRoot"/>
-      </p:par>
-    </p:tnLst>
-  </p:timing>
-</p:sld>
-</file>
-
-<file path=ppt/slides/slide21.xml><?xml version="1.0" encoding="utf-8"?>
-<p:sld xmlns:a="http://schemas.openxmlformats.org/drawingml/2006/main" xmlns:r="http://schemas.openxmlformats.org/officeDocument/2006/relationships" xmlns:p="http://schemas.openxmlformats.org/presentationml/2006/main">
-  <p:cSld>
-    <p:spTree>
-      <p:nvGrpSpPr>
-        <p:cNvPr id="1" name=""/>
-        <p:cNvGrpSpPr/>
-        <p:nvPr/>
-      </p:nvGrpSpPr>
-      <p:grpSpPr>
-        <a:xfrm>
-          <a:off x="0" y="0"/>
-          <a:ext cx="0" cy="0"/>
-          <a:chOff x="0" y="0"/>
-          <a:chExt cx="0" cy="0"/>
-        </a:xfrm>
-      </p:grpSpPr>
-      <p:sp>
-        <p:nvSpPr>
-          <p:cNvPr id="2" name="Title 1"/>
-          <p:cNvSpPr>
-            <a:spLocks noGrp="1"/>
-          </p:cNvSpPr>
-          <p:nvPr>
-            <p:ph type="title"/>
-          </p:nvPr>
-        </p:nvSpPr>
-        <p:spPr/>
-        <p:txBody>
-          <a:bodyPr/>
-          <a:lstStyle/>
-          <a:p>
-            <a:r>
-              <a:rPr lang="en-US" dirty="0" smtClean="0"/>
-              <a:t>Exceptions</a:t>
-            </a:r>
-            <a:endParaRPr lang="en-US" dirty="0"/>
-          </a:p>
-        </p:txBody>
-      </p:sp>
-      <p:sp>
-        <p:nvSpPr>
-          <p:cNvPr id="4" name="Footer Placeholder 3"/>
-          <p:cNvSpPr>
-            <a:spLocks noGrp="1"/>
-          </p:cNvSpPr>
-          <p:nvPr>
-            <p:ph type="ftr" sz="quarter" idx="3"/>
-          </p:nvPr>
-        </p:nvSpPr>
-        <p:spPr/>
-        <p:txBody>
-          <a:bodyPr/>
-          <a:lstStyle/>
-          <a:p>
-            <a:r>
-              <a:rPr lang="en-US" dirty="0" smtClean="0"/>
-              <a:t>HT- Debugging</a:t>
-            </a:r>
-            <a:endParaRPr lang="en-US" dirty="0"/>
-          </a:p>
-        </p:txBody>
-      </p:sp>
-      <p:sp>
-        <p:nvSpPr>
-          <p:cNvPr id="8" name="Rectangle 7"/>
-          <p:cNvSpPr/>
-          <p:nvPr/>
-        </p:nvSpPr>
-        <p:spPr>
-          <a:xfrm>
-            <a:off x="457200" y="1709076"/>
-            <a:ext cx="8229600" cy="3046988"/>
-          </a:xfrm>
-          <a:prstGeom prst="rect">
-            <a:avLst/>
-          </a:prstGeom>
-        </p:spPr>
-        <p:txBody>
-          <a:bodyPr wrap="square">
-            <a:spAutoFit/>
-          </a:bodyPr>
-          <a:lstStyle/>
-          <a:p>
-            <a:pPr marL="285750" indent="-285750">
-              <a:buFont typeface="Arial"/>
-              <a:buChar char="•"/>
-            </a:pPr>
-            <a:r>
-              <a:rPr lang="en-US" sz="3200" dirty="0"/>
-              <a:t>An instance of the Exception class</a:t>
-            </a:r>
-          </a:p>
-          <a:p>
-            <a:pPr marL="285750" indent="-285750">
-              <a:buFont typeface="Arial"/>
-              <a:buChar char="•"/>
-            </a:pPr>
-            <a:r>
-              <a:rPr lang="en-US" sz="3200" dirty="0"/>
-              <a:t>A raised exception will propagate through each method in the call stack until it is stopped or reaches the point where the program started</a:t>
-            </a:r>
-          </a:p>
-          <a:p>
-            <a:pPr marL="285750" indent="-285750">
-              <a:buFont typeface="Arial"/>
-              <a:buChar char="•"/>
-            </a:pPr>
-            <a:r>
-              <a:rPr lang="en-US" sz="3200" dirty="0"/>
-              <a:t>Raising and rescuing exceptions</a:t>
-            </a:r>
-          </a:p>
-        </p:txBody>
-      </p:sp>
-    </p:spTree>
-    <p:extLst>
-      <p:ext uri="{BB962C8B-B14F-4D97-AF65-F5344CB8AC3E}">
-        <p14:creationId xmlns:p14="http://schemas.microsoft.com/office/powerpoint/2010/main" val="650808683"/>
-      </p:ext>
-    </p:extLst>
-  </p:cSld>
-  <p:clrMapOvr>
-    <a:masterClrMapping/>
-  </p:clrMapOvr>
-  <p:timing>
-    <p:tnLst>
-      <p:par>
-        <p:cTn xmlns:p14="http://schemas.microsoft.com/office/powerpoint/2010/main" id="1" dur="indefinite" restart="never" nodeType="tmRoot"/>
-      </p:par>
-    </p:tnLst>
-  </p:timing>
-</p:sld>
-</file>
-
-<file path=ppt/slides/slide22.xml><?xml version="1.0" encoding="utf-8"?>
-<p:sld xmlns:a="http://schemas.openxmlformats.org/drawingml/2006/main" xmlns:r="http://schemas.openxmlformats.org/officeDocument/2006/relationships" xmlns:p="http://schemas.openxmlformats.org/presentationml/2006/main">
-  <p:cSld>
-    <p:spTree>
-      <p:nvGrpSpPr>
-        <p:cNvPr id="1" name=""/>
-        <p:cNvGrpSpPr/>
-        <p:nvPr/>
-      </p:nvGrpSpPr>
-      <p:grpSpPr>
-        <a:xfrm>
-          <a:off x="0" y="0"/>
-          <a:ext cx="0" cy="0"/>
-          <a:chOff x="0" y="0"/>
-          <a:chExt cx="0" cy="0"/>
-        </a:xfrm>
-      </p:grpSpPr>
-      <p:sp>
-        <p:nvSpPr>
-          <p:cNvPr id="2" name="Title 1"/>
-          <p:cNvSpPr>
-            <a:spLocks noGrp="1"/>
-          </p:cNvSpPr>
-          <p:nvPr>
-            <p:ph type="title"/>
-          </p:nvPr>
-        </p:nvSpPr>
-        <p:spPr/>
-        <p:txBody>
-          <a:bodyPr/>
-          <a:lstStyle/>
-          <a:p>
-            <a:r>
-              <a:rPr lang="en-US" sz="4400" b="1" kern="1200" dirty="0" smtClean="0">
-                <a:solidFill>
-                  <a:schemeClr val="accent1"/>
-                </a:solidFill>
-                <a:effectLst/>
-                <a:latin typeface="+mj-lt"/>
-                <a:ea typeface="+mj-ea"/>
-                <a:cs typeface="+mj-cs"/>
-              </a:rPr>
-              <a:t> Raise leads to Rescue</a:t>
-            </a:r>
-            <a:endParaRPr lang="en-US" dirty="0"/>
-          </a:p>
-        </p:txBody>
-      </p:sp>
-      <p:sp>
-        <p:nvSpPr>
-          <p:cNvPr id="4" name="Footer Placeholder 3"/>
-          <p:cNvSpPr>
-            <a:spLocks noGrp="1"/>
-          </p:cNvSpPr>
-          <p:nvPr>
-            <p:ph type="ftr" sz="quarter" idx="3"/>
-          </p:nvPr>
-        </p:nvSpPr>
-        <p:spPr/>
-        <p:txBody>
-          <a:bodyPr/>
-          <a:lstStyle/>
-          <a:p>
-            <a:r>
-              <a:rPr lang="en-US" dirty="0" smtClean="0"/>
-              <a:t>HT- Debugging</a:t>
-            </a:r>
-            <a:endParaRPr lang="en-US" dirty="0"/>
-          </a:p>
-        </p:txBody>
-      </p:sp>
-      <p:sp>
-        <p:nvSpPr>
-          <p:cNvPr id="7" name="TextBox 6"/>
-          <p:cNvSpPr txBox="1"/>
-          <p:nvPr/>
-        </p:nvSpPr>
-        <p:spPr>
-          <a:xfrm>
-            <a:off x="259762" y="1822592"/>
-            <a:ext cx="8741663" cy="3046988"/>
-          </a:xfrm>
-          <a:prstGeom prst="rect">
-            <a:avLst/>
-          </a:prstGeom>
-          <a:noFill/>
-        </p:spPr>
-        <p:txBody>
-          <a:bodyPr wrap="square" rtlCol="0">
-            <a:spAutoFit/>
-          </a:bodyPr>
-          <a:lstStyle/>
-          <a:p>
-            <a:r>
-              <a:rPr lang="en-US" sz="3200" dirty="0" smtClean="0"/>
-              <a:t>If we just had a raise with no conditions our code would never run.</a:t>
-            </a:r>
-          </a:p>
-          <a:p>
-            <a:endParaRPr lang="en-US" sz="3200" dirty="0"/>
-          </a:p>
-          <a:p>
-            <a:r>
-              <a:rPr lang="en-US" sz="3200" dirty="0" smtClean="0"/>
-              <a:t>Use a rescue to handle the error generated by raise and render user useful data back instead of a giant fail whale.</a:t>
-            </a:r>
-            <a:endParaRPr lang="en-US" sz="3200" dirty="0"/>
-          </a:p>
-        </p:txBody>
-      </p:sp>
-    </p:spTree>
-    <p:extLst>
-      <p:ext uri="{BB962C8B-B14F-4D97-AF65-F5344CB8AC3E}">
-        <p14:creationId xmlns:p14="http://schemas.microsoft.com/office/powerpoint/2010/main" val="3627005062"/>
-      </p:ext>
-    </p:extLst>
-  </p:cSld>
-  <p:clrMapOvr>
-    <a:masterClrMapping/>
-  </p:clrMapOvr>
-  <p:timing>
-    <p:tnLst>
-      <p:par>
-        <p:cTn xmlns:p14="http://schemas.microsoft.com/office/powerpoint/2010/main" id="1" dur="indefinite" restart="never" nodeType="tmRoot"/>
-      </p:par>
-    </p:tnLst>
-  </p:timing>
-</p:sld>
-</file>
-
-<file path=ppt/slides/slide23.xml><?xml version="1.0" encoding="utf-8"?>
-<p:sld xmlns:a="http://schemas.openxmlformats.org/drawingml/2006/main" xmlns:r="http://schemas.openxmlformats.org/officeDocument/2006/relationships" xmlns:p="http://schemas.openxmlformats.org/presentationml/2006/main">
-  <p:cSld>
-    <p:spTree>
-      <p:nvGrpSpPr>
-        <p:cNvPr id="1" name=""/>
-        <p:cNvGrpSpPr/>
-        <p:nvPr/>
-      </p:nvGrpSpPr>
-      <p:grpSpPr>
-        <a:xfrm>
-          <a:off x="0" y="0"/>
-          <a:ext cx="0" cy="0"/>
-          <a:chOff x="0" y="0"/>
-          <a:chExt cx="0" cy="0"/>
-        </a:xfrm>
-      </p:grpSpPr>
-      <p:sp>
-        <p:nvSpPr>
-          <p:cNvPr id="2" name="Title 1"/>
-          <p:cNvSpPr>
-            <a:spLocks noGrp="1"/>
-          </p:cNvSpPr>
-          <p:nvPr>
-            <p:ph type="title"/>
-          </p:nvPr>
-        </p:nvSpPr>
-        <p:spPr/>
-        <p:txBody>
-          <a:bodyPr/>
-          <a:lstStyle/>
-          <a:p>
-            <a:r>
-              <a:rPr lang="en-US" sz="4400" b="1" kern="1200" dirty="0" smtClean="0">
-                <a:solidFill>
-                  <a:schemeClr val="accent1"/>
-                </a:solidFill>
-                <a:effectLst/>
-                <a:latin typeface="+mj-lt"/>
-                <a:ea typeface="+mj-ea"/>
-                <a:cs typeface="+mj-cs"/>
-              </a:rPr>
-              <a:t>Rescue to the Rescue?</a:t>
-            </a:r>
-            <a:endParaRPr lang="en-US" dirty="0"/>
-          </a:p>
-        </p:txBody>
-      </p:sp>
-      <p:sp>
-        <p:nvSpPr>
-          <p:cNvPr id="4" name="Footer Placeholder 3"/>
-          <p:cNvSpPr>
-            <a:spLocks noGrp="1"/>
-          </p:cNvSpPr>
-          <p:nvPr>
-            <p:ph type="ftr" sz="quarter" idx="3"/>
-          </p:nvPr>
-        </p:nvSpPr>
-        <p:spPr/>
-        <p:txBody>
-          <a:bodyPr/>
-          <a:lstStyle/>
-          <a:p>
-            <a:r>
-              <a:rPr lang="en-US" dirty="0" smtClean="0"/>
-              <a:t>HT- Debugging</a:t>
-            </a:r>
-            <a:endParaRPr lang="en-US" dirty="0"/>
-          </a:p>
-        </p:txBody>
-      </p:sp>
-      <p:sp>
-        <p:nvSpPr>
-          <p:cNvPr id="7" name="TextBox 6"/>
-          <p:cNvSpPr txBox="1"/>
-          <p:nvPr/>
-        </p:nvSpPr>
-        <p:spPr>
-          <a:xfrm>
-            <a:off x="259762" y="1822592"/>
-            <a:ext cx="8741663" cy="1077218"/>
-          </a:xfrm>
-          <a:prstGeom prst="rect">
-            <a:avLst/>
-          </a:prstGeom>
-          <a:noFill/>
-        </p:spPr>
-        <p:txBody>
-          <a:bodyPr wrap="square" rtlCol="0">
-            <a:spAutoFit/>
-          </a:bodyPr>
-          <a:lstStyle/>
-          <a:p>
-            <a:r>
-              <a:rPr lang="en-US" sz="3200" dirty="0" smtClean="0"/>
-              <a:t>Careful:</a:t>
-            </a:r>
-          </a:p>
-          <a:p>
-            <a:r>
-              <a:rPr lang="en-US" sz="3200" dirty="0" smtClean="0"/>
-              <a:t>Rescue isn’t the bug free savior you might think</a:t>
-            </a:r>
-            <a:endParaRPr lang="en-US" sz="3200" dirty="0"/>
-          </a:p>
-        </p:txBody>
-      </p:sp>
-      <p:sp>
-        <p:nvSpPr>
-          <p:cNvPr id="3" name="Rectangle 2"/>
-          <p:cNvSpPr/>
-          <p:nvPr/>
-        </p:nvSpPr>
-        <p:spPr>
-          <a:xfrm>
-            <a:off x="1962650" y="4184787"/>
-            <a:ext cx="6061124" cy="369332"/>
-          </a:xfrm>
-          <a:prstGeom prst="rect">
-            <a:avLst/>
-          </a:prstGeom>
-        </p:spPr>
-        <p:txBody>
-          <a:bodyPr wrap="square">
-            <a:spAutoFit/>
-          </a:bodyPr>
-          <a:lstStyle/>
-          <a:p>
-            <a:r>
-              <a:rPr lang="en-US" dirty="0" smtClean="0">
-                <a:solidFill>
-                  <a:srgbClr val="0000FF"/>
-                </a:solidFill>
-                <a:hlinkClick r:id="rId2"/>
-              </a:rPr>
-              <a:t>Why You Should Never Rescue Exception in Ruby</a:t>
-            </a:r>
-            <a:endParaRPr lang="en-US" dirty="0">
-              <a:solidFill>
-                <a:srgbClr val="0000FF"/>
-              </a:solidFill>
-            </a:endParaRPr>
-          </a:p>
-        </p:txBody>
-      </p:sp>
-    </p:spTree>
-    <p:extLst>
-      <p:ext uri="{BB962C8B-B14F-4D97-AF65-F5344CB8AC3E}">
-        <p14:creationId xmlns:p14="http://schemas.microsoft.com/office/powerpoint/2010/main" val="44699507"/>
-      </p:ext>
-    </p:extLst>
-  </p:cSld>
-  <p:clrMapOvr>
-    <a:masterClrMapping/>
-  </p:clrMapOvr>
-  <p:timing>
-    <p:tnLst>
-      <p:par>
-        <p:cTn xmlns:p14="http://schemas.microsoft.com/office/powerpoint/2010/main" id="1" dur="indefinite" restart="never" nodeType="tmRoot"/>
-      </p:par>
-    </p:tnLst>
-  </p:timing>
-</p:sld>
-</file>
-
-<file path=ppt/slides/slide24.xml><?xml version="1.0" encoding="utf-8"?>
-<p:sld xmlns:a="http://schemas.openxmlformats.org/drawingml/2006/main" xmlns:r="http://schemas.openxmlformats.org/officeDocument/2006/relationships" xmlns:p="http://schemas.openxmlformats.org/presentationml/2006/main">
-  <p:cSld>
-    <p:spTree>
-      <p:nvGrpSpPr>
-        <p:cNvPr id="1" name=""/>
-        <p:cNvGrpSpPr/>
-        <p:nvPr/>
-      </p:nvGrpSpPr>
-      <p:grpSpPr>
-        <a:xfrm>
-          <a:off x="0" y="0"/>
-          <a:ext cx="0" cy="0"/>
-          <a:chOff x="0" y="0"/>
-          <a:chExt cx="0" cy="0"/>
-        </a:xfrm>
-      </p:grpSpPr>
-      <p:sp>
-        <p:nvSpPr>
-          <p:cNvPr id="2" name="Title 1"/>
-          <p:cNvSpPr>
-            <a:spLocks noGrp="1"/>
-          </p:cNvSpPr>
-          <p:nvPr>
-            <p:ph type="title"/>
-          </p:nvPr>
-        </p:nvSpPr>
-        <p:spPr/>
-        <p:txBody>
-          <a:bodyPr/>
-          <a:lstStyle/>
-          <a:p>
-            <a:r>
-              <a:rPr lang="en-US" sz="4400" b="1" kern="1200" dirty="0" smtClean="0">
-                <a:solidFill>
-                  <a:schemeClr val="accent1"/>
-                </a:solidFill>
-                <a:effectLst/>
-                <a:latin typeface="+mj-lt"/>
-                <a:ea typeface="+mj-ea"/>
-                <a:cs typeface="+mj-cs"/>
-              </a:rPr>
-              <a:t>Debugging </a:t>
-            </a:r>
-            <a:r>
-              <a:rPr lang="en-US" sz="4400" b="1" kern="1200" dirty="0" err="1" smtClean="0">
-                <a:solidFill>
-                  <a:schemeClr val="accent1"/>
-                </a:solidFill>
-                <a:effectLst/>
-                <a:latin typeface="+mj-lt"/>
-                <a:ea typeface="+mj-ea"/>
-                <a:cs typeface="+mj-cs"/>
-              </a:rPr>
-              <a:t>Wrapup</a:t>
-            </a:r>
-            <a:endParaRPr lang="en-US" dirty="0"/>
-          </a:p>
-        </p:txBody>
-      </p:sp>
-      <p:sp>
-        <p:nvSpPr>
-          <p:cNvPr id="4" name="Footer Placeholder 3"/>
-          <p:cNvSpPr>
-            <a:spLocks noGrp="1"/>
-          </p:cNvSpPr>
-          <p:nvPr>
-            <p:ph type="ftr" sz="quarter" idx="3"/>
-          </p:nvPr>
-        </p:nvSpPr>
-        <p:spPr/>
-        <p:txBody>
-          <a:bodyPr/>
-          <a:lstStyle/>
-          <a:p>
-            <a:r>
-              <a:rPr lang="en-US" dirty="0" smtClean="0"/>
-              <a:t>HT- Debugging</a:t>
-            </a:r>
-            <a:endParaRPr lang="en-US" dirty="0"/>
-          </a:p>
-        </p:txBody>
-      </p:sp>
-      <p:sp>
-        <p:nvSpPr>
-          <p:cNvPr id="7" name="TextBox 6"/>
-          <p:cNvSpPr txBox="1"/>
-          <p:nvPr/>
-        </p:nvSpPr>
-        <p:spPr>
-          <a:xfrm>
-            <a:off x="3296550" y="2996474"/>
-            <a:ext cx="2986214" cy="830997"/>
-          </a:xfrm>
-          <a:prstGeom prst="rect">
-            <a:avLst/>
-          </a:prstGeom>
-          <a:noFill/>
-        </p:spPr>
-        <p:txBody>
-          <a:bodyPr wrap="none" rtlCol="0">
-            <a:spAutoFit/>
-          </a:bodyPr>
-          <a:lstStyle/>
-          <a:p>
-            <a:r>
-              <a:rPr lang="en-US" sz="4800" dirty="0" smtClean="0"/>
-              <a:t>Questions?</a:t>
-            </a:r>
-            <a:endParaRPr lang="en-US" sz="4800" dirty="0"/>
-          </a:p>
-        </p:txBody>
-      </p:sp>
-    </p:spTree>
-    <p:extLst>
-      <p:ext uri="{BB962C8B-B14F-4D97-AF65-F5344CB8AC3E}">
-        <p14:creationId xmlns:p14="http://schemas.microsoft.com/office/powerpoint/2010/main" val="791299107"/>
       </p:ext>
     </p:extLst>
   </p:cSld>
@@ -4793,7 +4963,7 @@
           <a:p>
             <a:r>
               <a:rPr lang="en-US" dirty="0" smtClean="0"/>
-              <a:t>Sweet Links</a:t>
+              <a:t>Exceptions</a:t>
             </a:r>
             <a:endParaRPr lang="en-US" dirty="0"/>
           </a:p>
@@ -4824,49 +4994,60 @@
       </p:sp>
       <p:sp>
         <p:nvSpPr>
-          <p:cNvPr id="7" name="TextBox 6"/>
-          <p:cNvSpPr txBox="1"/>
+          <p:cNvPr id="8" name="Rectangle 7"/>
+          <p:cNvSpPr/>
           <p:nvPr/>
         </p:nvSpPr>
         <p:spPr>
           <a:xfrm>
-            <a:off x="1952821" y="1652565"/>
-            <a:ext cx="5455941" cy="1569660"/>
+            <a:off x="457200" y="1709076"/>
+            <a:ext cx="8229600" cy="3046988"/>
           </a:xfrm>
           <a:prstGeom prst="rect">
             <a:avLst/>
           </a:prstGeom>
-          <a:noFill/>
         </p:spPr>
         <p:txBody>
-          <a:bodyPr wrap="none" rtlCol="0">
+          <a:bodyPr wrap="square">
             <a:spAutoFit/>
           </a:bodyPr>
           <a:lstStyle/>
           <a:p>
-            <a:r>
-              <a:rPr lang="en-US" sz="4800" dirty="0" smtClean="0">
-                <a:hlinkClick r:id="rId2"/>
-              </a:rPr>
-              <a:t>Pry Usage (youtube)</a:t>
-            </a:r>
-            <a:endParaRPr lang="en-US" sz="4800" dirty="0" smtClean="0"/>
-          </a:p>
-          <a:p>
-            <a:r>
-              <a:rPr lang="en-US" sz="4800" dirty="0" smtClean="0">
-                <a:hlinkClick r:id="rId3"/>
-              </a:rPr>
-              <a:t>Replace IRB with PRY</a:t>
-            </a:r>
-            <a:endParaRPr lang="en-US" sz="4800" dirty="0" smtClean="0"/>
+            <a:pPr marL="285750" indent="-285750">
+              <a:buFont typeface="Arial"/>
+              <a:buChar char="•"/>
+            </a:pPr>
+            <a:r>
+              <a:rPr lang="en-US" sz="3200" dirty="0"/>
+              <a:t>An instance of the Exception class</a:t>
+            </a:r>
+          </a:p>
+          <a:p>
+            <a:pPr marL="285750" indent="-285750">
+              <a:buFont typeface="Arial"/>
+              <a:buChar char="•"/>
+            </a:pPr>
+            <a:r>
+              <a:rPr lang="en-US" sz="3200" dirty="0"/>
+              <a:t>A raised exception will propagate through each method in the call stack until it is stopped or reaches the point where the program started</a:t>
+            </a:r>
+          </a:p>
+          <a:p>
+            <a:pPr marL="285750" indent="-285750">
+              <a:buFont typeface="Arial"/>
+              <a:buChar char="•"/>
+            </a:pPr>
+            <a:r>
+              <a:rPr lang="en-US" sz="3200" dirty="0"/>
+              <a:t>Raising and rescuing exceptions</a:t>
+            </a:r>
           </a:p>
         </p:txBody>
       </p:sp>
     </p:spTree>
     <p:extLst>
       <p:ext uri="{BB962C8B-B14F-4D97-AF65-F5344CB8AC3E}">
-        <p14:creationId xmlns:p14="http://schemas.microsoft.com/office/powerpoint/2010/main" val="3076589042"/>
+        <p14:creationId xmlns:p14="http://schemas.microsoft.com/office/powerpoint/2010/main" val="650808683"/>
       </p:ext>
     </p:extLst>
   </p:cSld>
@@ -4916,8 +5097,16 @@
           <a:lstStyle/>
           <a:p>
             <a:r>
-              <a:rPr lang="en-US" dirty="0" smtClean="0"/>
-              <a:t>Final Thought</a:t>
+              <a:rPr lang="en-US" sz="4400" b="1" kern="1200" dirty="0" smtClean="0">
+                <a:solidFill>
+                  <a:schemeClr val="accent1"/>
+                </a:solidFill>
+                <a:effectLst/>
+                <a:latin typeface="+mj-lt"/>
+                <a:ea typeface="+mj-ea"/>
+                <a:cs typeface="+mj-cs"/>
+              </a:rPr>
+              <a:t> Raise leads to Rescue</a:t>
             </a:r>
             <a:endParaRPr lang="en-US" dirty="0"/>
           </a:p>
@@ -4954,8 +5143,8 @@
         </p:nvSpPr>
         <p:spPr>
           <a:xfrm>
-            <a:off x="512064" y="1652565"/>
-            <a:ext cx="8056571" cy="3046988"/>
+            <a:off x="259762" y="1822592"/>
+            <a:ext cx="8741663" cy="2554545"/>
           </a:xfrm>
           <a:prstGeom prst="rect">
             <a:avLst/>
@@ -4968,56 +5157,461 @@
           </a:bodyPr>
           <a:lstStyle/>
           <a:p>
-            <a:pPr algn="ctr"/>
-            <a:r>
-              <a:rPr lang="en-US" sz="4800" dirty="0" smtClean="0"/>
-              <a:t>Just saying; a well tested app</a:t>
-            </a:r>
-          </a:p>
-          <a:p>
-            <a:pPr algn="ctr"/>
-            <a:r>
-              <a:rPr lang="en-US" sz="4800" dirty="0"/>
-              <a:t>w</a:t>
-            </a:r>
-            <a:r>
-              <a:rPr lang="en-US" sz="4800" dirty="0" smtClean="0"/>
-              <a:t>ill greatly reduce the </a:t>
-            </a:r>
-          </a:p>
-          <a:p>
-            <a:pPr algn="ctr"/>
-            <a:r>
-              <a:rPr lang="en-US" sz="4800" dirty="0"/>
-              <a:t>a</a:t>
-            </a:r>
-            <a:r>
-              <a:rPr lang="en-US" sz="4800" dirty="0" smtClean="0"/>
-              <a:t>mount of debuggin</a:t>
-            </a:r>
-            <a:r>
-              <a:rPr lang="en-US" sz="4800" dirty="0" smtClean="0"/>
-              <a:t>g you</a:t>
-            </a:r>
-          </a:p>
-          <a:p>
-            <a:pPr algn="ctr"/>
-            <a:r>
-              <a:rPr lang="en-US" sz="4800" dirty="0"/>
-              <a:t>d</a:t>
-            </a:r>
-            <a:r>
-              <a:rPr lang="en-US" sz="4800" dirty="0" smtClean="0"/>
-              <a:t>o each day….</a:t>
-            </a:r>
-            <a:endParaRPr lang="en-US" sz="4800" dirty="0" smtClean="0"/>
+            <a:r>
+              <a:rPr lang="en-US" sz="3200" dirty="0" smtClean="0"/>
+              <a:t>Raise without rescue will always result in an error</a:t>
+            </a:r>
+            <a:endParaRPr lang="en-US" sz="3200" dirty="0" smtClean="0"/>
+          </a:p>
+          <a:p>
+            <a:endParaRPr lang="en-US" sz="3200" dirty="0"/>
+          </a:p>
+          <a:p>
+            <a:r>
+              <a:rPr lang="en-US" sz="3200" dirty="0" smtClean="0"/>
+              <a:t>Use a rescue to handle the error generated by raise and render </a:t>
+            </a:r>
+            <a:r>
+              <a:rPr lang="en-US" sz="3200" dirty="0" smtClean="0"/>
+              <a:t>useful </a:t>
+            </a:r>
+            <a:r>
+              <a:rPr lang="en-US" sz="3200" dirty="0" smtClean="0"/>
+              <a:t>data back instead of a giant fail whale.</a:t>
+            </a:r>
+            <a:endParaRPr lang="en-US" sz="3200" dirty="0"/>
           </a:p>
         </p:txBody>
       </p:sp>
     </p:spTree>
     <p:extLst>
       <p:ext uri="{BB962C8B-B14F-4D97-AF65-F5344CB8AC3E}">
-        <p14:creationId xmlns:p14="http://schemas.microsoft.com/office/powerpoint/2010/main" val="1221609672"/>
+        <p14:creationId xmlns:p14="http://schemas.microsoft.com/office/powerpoint/2010/main" val="3627005062"/>
+      </p:ext>
+    </p:extLst>
+  </p:cSld>
+  <p:clrMapOvr>
+    <a:masterClrMapping/>
+  </p:clrMapOvr>
+  <p:timing>
+    <p:tnLst>
+      <p:par>
+        <p:cTn xmlns:p14="http://schemas.microsoft.com/office/powerpoint/2010/main" id="1" dur="indefinite" restart="never" nodeType="tmRoot"/>
+      </p:par>
+    </p:tnLst>
+  </p:timing>
+</p:sld>
+</file>
+
+<file path=ppt/slides/slide27.xml><?xml version="1.0" encoding="utf-8"?>
+<p:sld xmlns:a="http://schemas.openxmlformats.org/drawingml/2006/main" xmlns:r="http://schemas.openxmlformats.org/officeDocument/2006/relationships" xmlns:p="http://schemas.openxmlformats.org/presentationml/2006/main">
+  <p:cSld>
+    <p:spTree>
+      <p:nvGrpSpPr>
+        <p:cNvPr id="1" name=""/>
+        <p:cNvGrpSpPr/>
+        <p:nvPr/>
+      </p:nvGrpSpPr>
+      <p:grpSpPr>
+        <a:xfrm>
+          <a:off x="0" y="0"/>
+          <a:ext cx="0" cy="0"/>
+          <a:chOff x="0" y="0"/>
+          <a:chExt cx="0" cy="0"/>
+        </a:xfrm>
+      </p:grpSpPr>
+      <p:sp>
+        <p:nvSpPr>
+          <p:cNvPr id="2" name="Title 1"/>
+          <p:cNvSpPr>
+            <a:spLocks noGrp="1"/>
+          </p:cNvSpPr>
+          <p:nvPr>
+            <p:ph type="title"/>
+          </p:nvPr>
+        </p:nvSpPr>
+        <p:spPr/>
+        <p:txBody>
+          <a:bodyPr/>
+          <a:lstStyle/>
+          <a:p>
+            <a:r>
+              <a:rPr lang="en-US" sz="4400" b="1" kern="1200" dirty="0" smtClean="0">
+                <a:solidFill>
+                  <a:schemeClr val="accent1"/>
+                </a:solidFill>
+                <a:effectLst/>
+                <a:latin typeface="+mj-lt"/>
+                <a:ea typeface="+mj-ea"/>
+                <a:cs typeface="+mj-cs"/>
+              </a:rPr>
+              <a:t>Rescue to the Rescue?</a:t>
+            </a:r>
+            <a:endParaRPr lang="en-US" dirty="0"/>
+          </a:p>
+        </p:txBody>
+      </p:sp>
+      <p:sp>
+        <p:nvSpPr>
+          <p:cNvPr id="4" name="Footer Placeholder 3"/>
+          <p:cNvSpPr>
+            <a:spLocks noGrp="1"/>
+          </p:cNvSpPr>
+          <p:nvPr>
+            <p:ph type="ftr" sz="quarter" idx="3"/>
+          </p:nvPr>
+        </p:nvSpPr>
+        <p:spPr/>
+        <p:txBody>
+          <a:bodyPr/>
+          <a:lstStyle/>
+          <a:p>
+            <a:r>
+              <a:rPr lang="en-US" dirty="0" smtClean="0"/>
+              <a:t>HT- Debugging</a:t>
+            </a:r>
+            <a:endParaRPr lang="en-US" dirty="0"/>
+          </a:p>
+        </p:txBody>
+      </p:sp>
+      <p:sp>
+        <p:nvSpPr>
+          <p:cNvPr id="7" name="TextBox 6"/>
+          <p:cNvSpPr txBox="1"/>
+          <p:nvPr/>
+        </p:nvSpPr>
+        <p:spPr>
+          <a:xfrm>
+            <a:off x="259762" y="1822592"/>
+            <a:ext cx="8741663" cy="1077218"/>
+          </a:xfrm>
+          <a:prstGeom prst="rect">
+            <a:avLst/>
+          </a:prstGeom>
+          <a:noFill/>
+        </p:spPr>
+        <p:txBody>
+          <a:bodyPr wrap="square" rtlCol="0">
+            <a:spAutoFit/>
+          </a:bodyPr>
+          <a:lstStyle/>
+          <a:p>
+            <a:r>
+              <a:rPr lang="en-US" sz="3200" dirty="0" smtClean="0"/>
+              <a:t>Careful:</a:t>
+            </a:r>
+          </a:p>
+          <a:p>
+            <a:r>
+              <a:rPr lang="en-US" sz="3200" dirty="0" smtClean="0"/>
+              <a:t>Rescue isn’t the bug free savior you might </a:t>
+            </a:r>
+            <a:r>
+              <a:rPr lang="en-US" sz="3200" dirty="0" smtClean="0"/>
+              <a:t>think</a:t>
+            </a:r>
+          </a:p>
+        </p:txBody>
+      </p:sp>
+      <p:sp>
+        <p:nvSpPr>
+          <p:cNvPr id="3" name="Rectangle 2"/>
+          <p:cNvSpPr/>
+          <p:nvPr/>
+        </p:nvSpPr>
+        <p:spPr>
+          <a:xfrm>
+            <a:off x="1962650" y="4184787"/>
+            <a:ext cx="6061124" cy="369332"/>
+          </a:xfrm>
+          <a:prstGeom prst="rect">
+            <a:avLst/>
+          </a:prstGeom>
+        </p:spPr>
+        <p:txBody>
+          <a:bodyPr wrap="square">
+            <a:spAutoFit/>
+          </a:bodyPr>
+          <a:lstStyle/>
+          <a:p>
+            <a:r>
+              <a:rPr lang="en-US" dirty="0" smtClean="0">
+                <a:solidFill>
+                  <a:srgbClr val="0000FF"/>
+                </a:solidFill>
+                <a:hlinkClick r:id="rId2"/>
+              </a:rPr>
+              <a:t>Why You Should Never Rescue Exception in Ruby</a:t>
+            </a:r>
+            <a:endParaRPr lang="en-US" dirty="0">
+              <a:solidFill>
+                <a:srgbClr val="0000FF"/>
+              </a:solidFill>
+            </a:endParaRPr>
+          </a:p>
+        </p:txBody>
+      </p:sp>
+    </p:spTree>
+    <p:extLst>
+      <p:ext uri="{BB962C8B-B14F-4D97-AF65-F5344CB8AC3E}">
+        <p14:creationId xmlns:p14="http://schemas.microsoft.com/office/powerpoint/2010/main" val="44699507"/>
+      </p:ext>
+    </p:extLst>
+  </p:cSld>
+  <p:clrMapOvr>
+    <a:masterClrMapping/>
+  </p:clrMapOvr>
+  <p:timing>
+    <p:tnLst>
+      <p:par>
+        <p:cTn xmlns:p14="http://schemas.microsoft.com/office/powerpoint/2010/main" id="1" dur="indefinite" restart="never" nodeType="tmRoot"/>
+      </p:par>
+    </p:tnLst>
+  </p:timing>
+</p:sld>
+</file>
+
+<file path=ppt/slides/slide28.xml><?xml version="1.0" encoding="utf-8"?>
+<p:sld xmlns:a="http://schemas.openxmlformats.org/drawingml/2006/main" xmlns:r="http://schemas.openxmlformats.org/officeDocument/2006/relationships" xmlns:p="http://schemas.openxmlformats.org/presentationml/2006/main">
+  <p:cSld>
+    <p:spTree>
+      <p:nvGrpSpPr>
+        <p:cNvPr id="1" name=""/>
+        <p:cNvGrpSpPr/>
+        <p:nvPr/>
+      </p:nvGrpSpPr>
+      <p:grpSpPr>
+        <a:xfrm>
+          <a:off x="0" y="0"/>
+          <a:ext cx="0" cy="0"/>
+          <a:chOff x="0" y="0"/>
+          <a:chExt cx="0" cy="0"/>
+        </a:xfrm>
+      </p:grpSpPr>
+      <p:sp>
+        <p:nvSpPr>
+          <p:cNvPr id="2" name="Title 1"/>
+          <p:cNvSpPr>
+            <a:spLocks noGrp="1"/>
+          </p:cNvSpPr>
+          <p:nvPr>
+            <p:ph type="title"/>
+          </p:nvPr>
+        </p:nvSpPr>
+        <p:spPr/>
+        <p:txBody>
+          <a:bodyPr/>
+          <a:lstStyle/>
+          <a:p>
+            <a:r>
+              <a:rPr lang="en-US" sz="4400" b="1" kern="1200" dirty="0" smtClean="0">
+                <a:solidFill>
+                  <a:schemeClr val="accent1"/>
+                </a:solidFill>
+                <a:effectLst/>
+                <a:latin typeface="+mj-lt"/>
+                <a:ea typeface="+mj-ea"/>
+                <a:cs typeface="+mj-cs"/>
+              </a:rPr>
+              <a:t>Debugging </a:t>
+            </a:r>
+            <a:r>
+              <a:rPr lang="en-US" sz="4400" b="1" kern="1200" dirty="0" err="1" smtClean="0">
+                <a:solidFill>
+                  <a:schemeClr val="accent1"/>
+                </a:solidFill>
+                <a:effectLst/>
+                <a:latin typeface="+mj-lt"/>
+                <a:ea typeface="+mj-ea"/>
+                <a:cs typeface="+mj-cs"/>
+              </a:rPr>
+              <a:t>Wrapup</a:t>
+            </a:r>
+            <a:endParaRPr lang="en-US" dirty="0"/>
+          </a:p>
+        </p:txBody>
+      </p:sp>
+      <p:sp>
+        <p:nvSpPr>
+          <p:cNvPr id="4" name="Footer Placeholder 3"/>
+          <p:cNvSpPr>
+            <a:spLocks noGrp="1"/>
+          </p:cNvSpPr>
+          <p:nvPr>
+            <p:ph type="ftr" sz="quarter" idx="3"/>
+          </p:nvPr>
+        </p:nvSpPr>
+        <p:spPr/>
+        <p:txBody>
+          <a:bodyPr/>
+          <a:lstStyle/>
+          <a:p>
+            <a:r>
+              <a:rPr lang="en-US" dirty="0" smtClean="0"/>
+              <a:t>HT- Debugging</a:t>
+            </a:r>
+            <a:endParaRPr lang="en-US" dirty="0"/>
+          </a:p>
+        </p:txBody>
+      </p:sp>
+      <p:sp>
+        <p:nvSpPr>
+          <p:cNvPr id="7" name="TextBox 6"/>
+          <p:cNvSpPr txBox="1"/>
+          <p:nvPr/>
+        </p:nvSpPr>
+        <p:spPr>
+          <a:xfrm>
+            <a:off x="3296550" y="2996474"/>
+            <a:ext cx="2986214" cy="830997"/>
+          </a:xfrm>
+          <a:prstGeom prst="rect">
+            <a:avLst/>
+          </a:prstGeom>
+          <a:noFill/>
+        </p:spPr>
+        <p:txBody>
+          <a:bodyPr wrap="none" rtlCol="0">
+            <a:spAutoFit/>
+          </a:bodyPr>
+          <a:lstStyle/>
+          <a:p>
+            <a:r>
+              <a:rPr lang="en-US" sz="4800" dirty="0" smtClean="0"/>
+              <a:t>Questions?</a:t>
+            </a:r>
+            <a:endParaRPr lang="en-US" sz="4800" dirty="0"/>
+          </a:p>
+        </p:txBody>
+      </p:sp>
+    </p:spTree>
+    <p:extLst>
+      <p:ext uri="{BB962C8B-B14F-4D97-AF65-F5344CB8AC3E}">
+        <p14:creationId xmlns:p14="http://schemas.microsoft.com/office/powerpoint/2010/main" val="791299107"/>
+      </p:ext>
+    </p:extLst>
+  </p:cSld>
+  <p:clrMapOvr>
+    <a:masterClrMapping/>
+  </p:clrMapOvr>
+  <p:timing>
+    <p:tnLst>
+      <p:par>
+        <p:cTn xmlns:p14="http://schemas.microsoft.com/office/powerpoint/2010/main" id="1" dur="indefinite" restart="never" nodeType="tmRoot"/>
+      </p:par>
+    </p:tnLst>
+  </p:timing>
+</p:sld>
+</file>
+
+<file path=ppt/slides/slide29.xml><?xml version="1.0" encoding="utf-8"?>
+<p:sld xmlns:a="http://schemas.openxmlformats.org/drawingml/2006/main" xmlns:r="http://schemas.openxmlformats.org/officeDocument/2006/relationships" xmlns:p="http://schemas.openxmlformats.org/presentationml/2006/main">
+  <p:cSld>
+    <p:spTree>
+      <p:nvGrpSpPr>
+        <p:cNvPr id="1" name=""/>
+        <p:cNvGrpSpPr/>
+        <p:nvPr/>
+      </p:nvGrpSpPr>
+      <p:grpSpPr>
+        <a:xfrm>
+          <a:off x="0" y="0"/>
+          <a:ext cx="0" cy="0"/>
+          <a:chOff x="0" y="0"/>
+          <a:chExt cx="0" cy="0"/>
+        </a:xfrm>
+      </p:grpSpPr>
+      <p:sp>
+        <p:nvSpPr>
+          <p:cNvPr id="2" name="Title 1"/>
+          <p:cNvSpPr>
+            <a:spLocks noGrp="1"/>
+          </p:cNvSpPr>
+          <p:nvPr>
+            <p:ph type="title"/>
+          </p:nvPr>
+        </p:nvSpPr>
+        <p:spPr/>
+        <p:txBody>
+          <a:bodyPr/>
+          <a:lstStyle/>
+          <a:p>
+            <a:r>
+              <a:rPr lang="en-US" dirty="0" smtClean="0"/>
+              <a:t>Sweet Links</a:t>
+            </a:r>
+            <a:endParaRPr lang="en-US" dirty="0"/>
+          </a:p>
+        </p:txBody>
+      </p:sp>
+      <p:sp>
+        <p:nvSpPr>
+          <p:cNvPr id="4" name="Footer Placeholder 3"/>
+          <p:cNvSpPr>
+            <a:spLocks noGrp="1"/>
+          </p:cNvSpPr>
+          <p:nvPr>
+            <p:ph type="ftr" sz="quarter" idx="3"/>
+          </p:nvPr>
+        </p:nvSpPr>
+        <p:spPr/>
+        <p:txBody>
+          <a:bodyPr/>
+          <a:lstStyle/>
+          <a:p>
+            <a:r>
+              <a:rPr lang="en-US" dirty="0" smtClean="0"/>
+              <a:t>HT- Debugging</a:t>
+            </a:r>
+            <a:endParaRPr lang="en-US" dirty="0"/>
+          </a:p>
+        </p:txBody>
+      </p:sp>
+      <p:sp>
+        <p:nvSpPr>
+          <p:cNvPr id="7" name="TextBox 6"/>
+          <p:cNvSpPr txBox="1"/>
+          <p:nvPr/>
+        </p:nvSpPr>
+        <p:spPr>
+          <a:xfrm>
+            <a:off x="1952821" y="1652565"/>
+            <a:ext cx="5455941" cy="1569660"/>
+          </a:xfrm>
+          <a:prstGeom prst="rect">
+            <a:avLst/>
+          </a:prstGeom>
+          <a:noFill/>
+        </p:spPr>
+        <p:txBody>
+          <a:bodyPr wrap="none" rtlCol="0">
+            <a:spAutoFit/>
+          </a:bodyPr>
+          <a:lstStyle/>
+          <a:p>
+            <a:r>
+              <a:rPr lang="en-US" sz="4800" dirty="0" smtClean="0">
+                <a:hlinkClick r:id="rId2"/>
+              </a:rPr>
+              <a:t>Pry Usage (youtube)</a:t>
+            </a:r>
+            <a:endParaRPr lang="en-US" sz="4800" dirty="0" smtClean="0"/>
+          </a:p>
+          <a:p>
+            <a:r>
+              <a:rPr lang="en-US" sz="4800" dirty="0" smtClean="0">
+                <a:hlinkClick r:id="rId3"/>
+              </a:rPr>
+              <a:t>Replace IRB with PRY</a:t>
+            </a:r>
+            <a:endParaRPr lang="en-US" sz="4800" dirty="0" smtClean="0"/>
+          </a:p>
+        </p:txBody>
+      </p:sp>
+    </p:spTree>
+    <p:extLst>
+      <p:ext uri="{BB962C8B-B14F-4D97-AF65-F5344CB8AC3E}">
+        <p14:creationId xmlns:p14="http://schemas.microsoft.com/office/powerpoint/2010/main" val="3076589042"/>
       </p:ext>
     </p:extLst>
   </p:cSld>
@@ -5160,7 +5754,23 @@
           <a:p>
             <a:r>
               <a:rPr lang="en-US" dirty="0" smtClean="0"/>
-              <a:t>Good Debugging skills is the one thing that will keep you sane in this </a:t>
+              <a:t>Good Debugging skills </a:t>
+            </a:r>
+            <a:r>
+              <a:rPr lang="en-US" dirty="0" smtClean="0"/>
+              <a:t>is </a:t>
+            </a:r>
+            <a:r>
+              <a:rPr lang="en-US" dirty="0" smtClean="0"/>
+              <a:t>one </a:t>
+            </a:r>
+            <a:r>
+              <a:rPr lang="en-US" dirty="0" smtClean="0"/>
+              <a:t>of the things </a:t>
+            </a:r>
+            <a:r>
+              <a:rPr lang="en-US" dirty="0" smtClean="0"/>
+              <a:t>that will keep you sane in this </a:t>
             </a:r>
             <a:r>
               <a:rPr lang="en-US" dirty="0" err="1" smtClean="0"/>
@@ -5234,6 +5844,162 @@
     <p:extLst>
       <p:ext uri="{BB962C8B-B14F-4D97-AF65-F5344CB8AC3E}">
         <p14:creationId xmlns:p14="http://schemas.microsoft.com/office/powerpoint/2010/main" val="4202836584"/>
+      </p:ext>
+    </p:extLst>
+  </p:cSld>
+  <p:clrMapOvr>
+    <a:masterClrMapping/>
+  </p:clrMapOvr>
+  <p:timing>
+    <p:tnLst>
+      <p:par>
+        <p:cTn xmlns:p14="http://schemas.microsoft.com/office/powerpoint/2010/main" id="1" dur="indefinite" restart="never" nodeType="tmRoot"/>
+      </p:par>
+    </p:tnLst>
+  </p:timing>
+</p:sld>
+</file>
+
+<file path=ppt/slides/slide30.xml><?xml version="1.0" encoding="utf-8"?>
+<p:sld xmlns:a="http://schemas.openxmlformats.org/drawingml/2006/main" xmlns:r="http://schemas.openxmlformats.org/officeDocument/2006/relationships" xmlns:p="http://schemas.openxmlformats.org/presentationml/2006/main">
+  <p:cSld>
+    <p:spTree>
+      <p:nvGrpSpPr>
+        <p:cNvPr id="1" name=""/>
+        <p:cNvGrpSpPr/>
+        <p:nvPr/>
+      </p:nvGrpSpPr>
+      <p:grpSpPr>
+        <a:xfrm>
+          <a:off x="0" y="0"/>
+          <a:ext cx="0" cy="0"/>
+          <a:chOff x="0" y="0"/>
+          <a:chExt cx="0" cy="0"/>
+        </a:xfrm>
+      </p:grpSpPr>
+      <p:sp>
+        <p:nvSpPr>
+          <p:cNvPr id="2" name="Title 1"/>
+          <p:cNvSpPr>
+            <a:spLocks noGrp="1"/>
+          </p:cNvSpPr>
+          <p:nvPr>
+            <p:ph type="title"/>
+          </p:nvPr>
+        </p:nvSpPr>
+        <p:spPr/>
+        <p:txBody>
+          <a:bodyPr/>
+          <a:lstStyle/>
+          <a:p>
+            <a:r>
+              <a:rPr lang="en-US" dirty="0" smtClean="0"/>
+              <a:t>Final Thought</a:t>
+            </a:r>
+            <a:endParaRPr lang="en-US" dirty="0"/>
+          </a:p>
+        </p:txBody>
+      </p:sp>
+      <p:sp>
+        <p:nvSpPr>
+          <p:cNvPr id="4" name="Footer Placeholder 3"/>
+          <p:cNvSpPr>
+            <a:spLocks noGrp="1"/>
+          </p:cNvSpPr>
+          <p:nvPr>
+            <p:ph type="ftr" sz="quarter" idx="3"/>
+          </p:nvPr>
+        </p:nvSpPr>
+        <p:spPr/>
+        <p:txBody>
+          <a:bodyPr/>
+          <a:lstStyle/>
+          <a:p>
+            <a:r>
+              <a:rPr lang="en-US" dirty="0" smtClean="0"/>
+              <a:t>HT- Debugging</a:t>
+            </a:r>
+            <a:endParaRPr lang="en-US" dirty="0"/>
+          </a:p>
+        </p:txBody>
+      </p:sp>
+      <p:sp>
+        <p:nvSpPr>
+          <p:cNvPr id="7" name="TextBox 6"/>
+          <p:cNvSpPr txBox="1"/>
+          <p:nvPr/>
+        </p:nvSpPr>
+        <p:spPr>
+          <a:xfrm>
+            <a:off x="512064" y="1652565"/>
+            <a:ext cx="8056571" cy="3046988"/>
+          </a:xfrm>
+          <a:prstGeom prst="rect">
+            <a:avLst/>
+          </a:prstGeom>
+          <a:noFill/>
+        </p:spPr>
+        <p:txBody>
+          <a:bodyPr wrap="square" rtlCol="0">
+            <a:spAutoFit/>
+          </a:bodyPr>
+          <a:lstStyle/>
+          <a:p>
+            <a:pPr algn="ctr"/>
+            <a:r>
+              <a:rPr lang="en-US" sz="4800" dirty="0" smtClean="0"/>
+              <a:t>Just saying; a well tested app</a:t>
+            </a:r>
+          </a:p>
+          <a:p>
+            <a:pPr algn="ctr"/>
+            <a:r>
+              <a:rPr lang="en-US" sz="4800" dirty="0"/>
+              <a:t>w</a:t>
+            </a:r>
+            <a:r>
+              <a:rPr lang="en-US" sz="4800" dirty="0" smtClean="0"/>
+              <a:t>ill greatly reduce the </a:t>
+            </a:r>
+          </a:p>
+          <a:p>
+            <a:pPr algn="ctr"/>
+            <a:r>
+              <a:rPr lang="en-US" sz="4800" dirty="0"/>
+              <a:t>a</a:t>
+            </a:r>
+            <a:r>
+              <a:rPr lang="en-US" sz="4800" dirty="0" smtClean="0"/>
+              <a:t>mount of debugging </a:t>
+            </a:r>
+            <a:endParaRPr lang="en-US" sz="4800" dirty="0" smtClean="0"/>
+          </a:p>
+          <a:p>
+            <a:pPr algn="ctr"/>
+            <a:r>
+              <a:rPr lang="en-US" sz="4800"/>
+              <a:t>y</a:t>
+            </a:r>
+            <a:r>
+              <a:rPr lang="en-US" sz="4800" smtClean="0"/>
+              <a:t>ou</a:t>
+            </a:r>
+            <a:r>
+              <a:rPr lang="en-US" sz="4800" smtClean="0"/>
+              <a:t> </a:t>
+            </a:r>
+            <a:r>
+              <a:rPr lang="en-US" sz="4800" dirty="0" smtClean="0"/>
+              <a:t>do. </a:t>
+            </a:r>
+            <a:endParaRPr lang="en-US" sz="4800" dirty="0" smtClean="0"/>
+          </a:p>
+        </p:txBody>
+      </p:sp>
+    </p:spTree>
+    <p:extLst>
+      <p:ext uri="{BB962C8B-B14F-4D97-AF65-F5344CB8AC3E}">
+        <p14:creationId xmlns:p14="http://schemas.microsoft.com/office/powerpoint/2010/main" val="1221609672"/>
       </p:ext>
     </p:extLst>
   </p:cSld>

</xml_diff>